<commit_message>
fix the grid and map
</commit_message>
<xml_diff>
--- a/Traffic Optimization Final Speech.pptx
+++ b/Traffic Optimization Final Speech.pptx
@@ -5937,11 +5937,11 @@
           <a:lstStyle/>
           <a:p>
             <a:r>
-              <a:rPr lang="en-US" altLang="ko-KR" dirty="0" smtClean="0"/>
+              <a:rPr lang="en-US" altLang="ko-KR" dirty="0"/>
               <a:t>Decentralized</a:t>
             </a:r>
             <a:r>
-              <a:rPr lang="ko-KR" altLang="en-US" dirty="0" smtClean="0"/>
+              <a:rPr lang="ko-KR" altLang="en-US" dirty="0"/>
               <a:t> </a:t>
             </a:r>
             <a:r>
@@ -5998,28 +5998,28 @@
           <a:lstStyle/>
           <a:p>
             <a:r>
-              <a:rPr lang="en-US" altLang="ko-KR" dirty="0" smtClean="0"/>
+              <a:rPr lang="en-US" altLang="ko-KR" dirty="0"/>
               <a:t> 3x3 grid</a:t>
             </a:r>
           </a:p>
           <a:p>
             <a:pPr lvl="1"/>
             <a:r>
-              <a:rPr lang="en-US" altLang="ko-KR" dirty="0" smtClean="0"/>
+              <a:rPr lang="en-US" altLang="ko-KR" dirty="0"/>
               <a:t>9 Agents</a:t>
             </a:r>
           </a:p>
           <a:p>
             <a:pPr lvl="1"/>
             <a:r>
-              <a:rPr lang="en-US" altLang="ko-KR" dirty="0" smtClean="0"/>
+              <a:rPr lang="en-US" altLang="ko-KR" dirty="0"/>
               <a:t>Random Routing Generation</a:t>
             </a:r>
             <a:br>
-              <a:rPr lang="en-US" altLang="ko-KR" dirty="0" smtClean="0"/>
+              <a:rPr lang="en-US" altLang="ko-KR" dirty="0"/>
             </a:br>
             <a:r>
-              <a:rPr lang="en-US" altLang="ko-KR" dirty="0" smtClean="0">
+              <a:rPr lang="en-US" altLang="ko-KR" dirty="0">
                 <a:sym typeface="Wingdings" panose="05000000000000000000" pitchFamily="2" charset="2"/>
               </a:rPr>
               <a:t> 1 period, 1.5 scaled</a:t>
@@ -6283,33 +6283,33 @@
           </a:lstStyle>
           <a:p>
             <a:r>
-              <a:rPr lang="en-US" altLang="ko-KR" dirty="0" smtClean="0"/>
+              <a:rPr lang="en-US" altLang="ko-KR" dirty="0"/>
               <a:t> </a:t>
             </a:r>
             <a:r>
-              <a:rPr lang="en-US" altLang="ko-KR" dirty="0" err="1" smtClean="0"/>
+              <a:rPr lang="en-US" altLang="ko-KR" dirty="0" err="1"/>
               <a:t>Dunsan</a:t>
             </a:r>
-            <a:endParaRPr lang="en-US" altLang="ko-KR" dirty="0" smtClean="0"/>
+            <a:endParaRPr lang="en-US" altLang="ko-KR" dirty="0"/>
           </a:p>
           <a:p>
             <a:pPr lvl="1"/>
             <a:r>
-              <a:rPr lang="en-US" altLang="ko-KR" dirty="0" smtClean="0"/>
+              <a:rPr lang="en-US" altLang="ko-KR" dirty="0"/>
               <a:t>11 Agents</a:t>
             </a:r>
           </a:p>
           <a:p>
             <a:pPr lvl="1"/>
             <a:r>
-              <a:rPr lang="en-US" altLang="ko-KR" dirty="0" smtClean="0"/>
+              <a:rPr lang="en-US" altLang="ko-KR" dirty="0"/>
               <a:t>Real Demand based training</a:t>
             </a:r>
             <a:br>
-              <a:rPr lang="en-US" altLang="ko-KR" dirty="0" smtClean="0"/>
+              <a:rPr lang="en-US" altLang="ko-KR" dirty="0"/>
             </a:br>
             <a:r>
-              <a:rPr lang="en-US" altLang="ko-KR" dirty="0" smtClean="0">
+              <a:rPr lang="en-US" altLang="ko-KR" dirty="0">
                 <a:sym typeface="Wingdings" panose="05000000000000000000" pitchFamily="2" charset="2"/>
               </a:rPr>
               <a:t> 0-3am, 2.0 scaled</a:t>
@@ -6396,11 +6396,11 @@
                     <a:p>
                       <a:pPr latinLnBrk="1"/>
                       <a:r>
-                        <a:rPr lang="en-US" altLang="ko-KR" sz="1600" dirty="0" err="1" smtClean="0"/>
+                        <a:rPr lang="en-US" altLang="ko-KR" sz="1600" dirty="0" err="1"/>
                         <a:t>Avg</a:t>
                       </a:r>
                       <a:r>
-                        <a:rPr lang="en-US" altLang="ko-KR" sz="1600" baseline="0" dirty="0" smtClean="0"/>
+                        <a:rPr lang="en-US" altLang="ko-KR" sz="1600" baseline="0" dirty="0"/>
                         <a:t> Value</a:t>
                       </a:r>
                       <a:endParaRPr lang="ko-KR" altLang="en-US" sz="1600" dirty="0"/>
@@ -6415,7 +6415,7 @@
                     <a:p>
                       <a:pPr latinLnBrk="1"/>
                       <a:r>
-                        <a:rPr lang="en-US" altLang="ko-KR" sz="1600" dirty="0" smtClean="0"/>
+                        <a:rPr lang="en-US" altLang="ko-KR" sz="1600" dirty="0"/>
                         <a:t>Simulation</a:t>
                       </a:r>
                       <a:endParaRPr lang="ko-KR" altLang="en-US" sz="1600" dirty="0"/>
@@ -6430,7 +6430,7 @@
                     <a:p>
                       <a:pPr latinLnBrk="1"/>
                       <a:r>
-                        <a:rPr lang="en-US" altLang="ko-KR" sz="1600" dirty="0" smtClean="0"/>
+                        <a:rPr lang="en-US" altLang="ko-KR" sz="1600" dirty="0"/>
                         <a:t>Decentralized</a:t>
                       </a:r>
                       <a:endParaRPr lang="ko-KR" altLang="en-US" sz="1600" dirty="0"/>
@@ -6452,14 +6452,14 @@
                     <a:p>
                       <a:pPr latinLnBrk="1"/>
                       <a:r>
-                        <a:rPr lang="en-US" altLang="ko-KR" sz="1200" dirty="0" smtClean="0"/>
+                        <a:rPr lang="en-US" altLang="ko-KR" sz="1200" dirty="0"/>
                         <a:t>Travel Time</a:t>
                       </a:r>
                     </a:p>
                     <a:p>
                       <a:pPr latinLnBrk="1"/>
                       <a:r>
-                        <a:rPr lang="en-US" altLang="ko-KR" sz="1200" dirty="0" smtClean="0"/>
+                        <a:rPr lang="en-US" altLang="ko-KR" sz="1200" dirty="0"/>
                         <a:t>(per edge)</a:t>
                       </a:r>
                       <a:endParaRPr lang="ko-KR" altLang="en-US" sz="1200" dirty="0"/>
@@ -6474,7 +6474,7 @@
                     <a:p>
                       <a:pPr latinLnBrk="1"/>
                       <a:r>
-                        <a:rPr lang="en-US" altLang="ko-KR" sz="1600" dirty="0" smtClean="0"/>
+                        <a:rPr lang="en-US" altLang="ko-KR" sz="1600" dirty="0"/>
                         <a:t>13.82s</a:t>
                       </a:r>
                       <a:endParaRPr lang="ko-KR" altLang="en-US" sz="1600" dirty="0"/>
@@ -6489,7 +6489,7 @@
                     <a:p>
                       <a:pPr latinLnBrk="1"/>
                       <a:r>
-                        <a:rPr lang="en-US" altLang="ko-KR" sz="1600" dirty="0" smtClean="0"/>
+                        <a:rPr lang="en-US" altLang="ko-KR" sz="1600" dirty="0"/>
                         <a:t>14.52</a:t>
                       </a:r>
                       <a:endParaRPr lang="ko-KR" altLang="en-US" sz="1600" dirty="0"/>
@@ -6511,7 +6511,7 @@
                     <a:p>
                       <a:pPr latinLnBrk="1"/>
                       <a:r>
-                        <a:rPr lang="en-US" altLang="ko-KR" sz="1200" dirty="0" smtClean="0"/>
+                        <a:rPr lang="en-US" altLang="ko-KR" sz="1200" dirty="0"/>
                         <a:t>Velocity</a:t>
                       </a:r>
                       <a:endParaRPr lang="ko-KR" altLang="en-US" sz="1200" dirty="0"/>
@@ -6526,7 +6526,7 @@
                     <a:p>
                       <a:pPr latinLnBrk="1"/>
                       <a:r>
-                        <a:rPr lang="en-US" altLang="ko-KR" sz="1600" dirty="0" smtClean="0"/>
+                        <a:rPr lang="en-US" altLang="ko-KR" sz="1600" dirty="0"/>
                         <a:t>5.93m/s</a:t>
                       </a:r>
                       <a:endParaRPr lang="ko-KR" altLang="en-US" sz="1600" dirty="0"/>
@@ -6541,7 +6541,7 @@
                     <a:p>
                       <a:pPr latinLnBrk="1"/>
                       <a:r>
-                        <a:rPr lang="en-US" altLang="ko-KR" sz="1600" dirty="0" smtClean="0"/>
+                        <a:rPr lang="en-US" altLang="ko-KR" sz="1600" dirty="0"/>
                         <a:t>5.769m/s</a:t>
                       </a:r>
                       <a:endParaRPr lang="ko-KR" altLang="en-US" sz="1600" dirty="0"/>
@@ -6563,18 +6563,18 @@
                     <a:p>
                       <a:pPr latinLnBrk="1"/>
                       <a:r>
-                        <a:rPr lang="en-US" altLang="ko-KR" sz="1200" dirty="0" smtClean="0"/>
+                        <a:rPr lang="en-US" altLang="ko-KR" sz="1200" dirty="0"/>
                         <a:t>Waiting Time</a:t>
                       </a:r>
                       <a:br>
-                        <a:rPr lang="en-US" altLang="ko-KR" sz="1200" dirty="0" smtClean="0"/>
+                        <a:rPr lang="en-US" altLang="ko-KR" sz="1200" dirty="0"/>
                       </a:br>
                       <a:r>
-                        <a:rPr lang="en-US" altLang="ko-KR" sz="1200" dirty="0" smtClean="0"/>
+                        <a:rPr lang="en-US" altLang="ko-KR" sz="1200" dirty="0"/>
                         <a:t>(whole</a:t>
                       </a:r>
                       <a:r>
-                        <a:rPr lang="en-US" altLang="ko-KR" sz="1200" baseline="0" dirty="0" smtClean="0"/>
+                        <a:rPr lang="en-US" altLang="ko-KR" sz="1200" baseline="0" dirty="0"/>
                         <a:t> trip)</a:t>
                       </a:r>
                       <a:endParaRPr lang="ko-KR" altLang="en-US" sz="1200" dirty="0"/>
@@ -6589,11 +6589,11 @@
                     <a:p>
                       <a:pPr latinLnBrk="1"/>
                       <a:r>
-                        <a:rPr lang="en-US" altLang="ko-KR" sz="1600" dirty="0" smtClean="0"/>
+                        <a:rPr lang="en-US" altLang="ko-KR" sz="1600" dirty="0"/>
                         <a:t>495.5s/</a:t>
                       </a:r>
                       <a:r>
-                        <a:rPr lang="en-US" altLang="ko-KR" sz="1600" dirty="0" err="1" smtClean="0"/>
+                        <a:rPr lang="en-US" altLang="ko-KR" sz="1600" dirty="0" err="1"/>
                         <a:t>veh</a:t>
                       </a:r>
                       <a:endParaRPr lang="ko-KR" altLang="en-US" sz="1600" dirty="0"/>
@@ -6608,11 +6608,11 @@
                     <a:p>
                       <a:pPr latinLnBrk="1"/>
                       <a:r>
-                        <a:rPr lang="en-US" altLang="ko-KR" sz="1600" dirty="0" smtClean="0"/>
+                        <a:rPr lang="en-US" altLang="ko-KR" sz="1600" dirty="0"/>
                         <a:t>534.1s/</a:t>
                       </a:r>
                       <a:r>
-                        <a:rPr lang="en-US" altLang="ko-KR" sz="1600" dirty="0" err="1" smtClean="0"/>
+                        <a:rPr lang="en-US" altLang="ko-KR" sz="1600" dirty="0" err="1"/>
                         <a:t>veh</a:t>
                       </a:r>
                       <a:endParaRPr lang="ko-KR" altLang="en-US" sz="1600" dirty="0"/>
@@ -6634,11 +6634,11 @@
                     <a:p>
                       <a:pPr latinLnBrk="1"/>
                       <a:r>
-                        <a:rPr lang="en-US" altLang="ko-KR" sz="1200" dirty="0" smtClean="0"/>
+                        <a:rPr lang="en-US" altLang="ko-KR" sz="1200" dirty="0"/>
                         <a:t>Arrived </a:t>
                       </a:r>
                       <a:r>
-                        <a:rPr lang="en-US" altLang="ko-KR" sz="1200" dirty="0" err="1" smtClean="0"/>
+                        <a:rPr lang="en-US" altLang="ko-KR" sz="1200" dirty="0" err="1"/>
                         <a:t>Num</a:t>
                       </a:r>
                       <a:endParaRPr lang="ko-KR" altLang="en-US" sz="1200" dirty="0"/>
@@ -6653,7 +6653,7 @@
                     <a:p>
                       <a:pPr latinLnBrk="1"/>
                       <a:r>
-                        <a:rPr lang="en-US" altLang="ko-KR" sz="1600" dirty="0" smtClean="0"/>
+                        <a:rPr lang="en-US" altLang="ko-KR" sz="1600" dirty="0"/>
                         <a:t>10951</a:t>
                       </a:r>
                       <a:endParaRPr lang="ko-KR" altLang="en-US" sz="1600" dirty="0"/>
@@ -6668,7 +6668,7 @@
                     <a:p>
                       <a:pPr latinLnBrk="1"/>
                       <a:r>
-                        <a:rPr lang="en-US" altLang="ko-KR" sz="1600" dirty="0" smtClean="0"/>
+                        <a:rPr lang="en-US" altLang="ko-KR" sz="1600" dirty="0"/>
                         <a:t>10863</a:t>
                       </a:r>
                       <a:endParaRPr lang="ko-KR" altLang="en-US" sz="1600" dirty="0"/>
@@ -6741,11 +6741,11 @@
                     <a:p>
                       <a:pPr latinLnBrk="1"/>
                       <a:r>
-                        <a:rPr lang="en-US" altLang="ko-KR" sz="1600" dirty="0" err="1" smtClean="0"/>
+                        <a:rPr lang="en-US" altLang="ko-KR" sz="1600" dirty="0" err="1"/>
                         <a:t>Avg</a:t>
                       </a:r>
                       <a:r>
-                        <a:rPr lang="en-US" altLang="ko-KR" sz="1600" baseline="0" dirty="0" smtClean="0"/>
+                        <a:rPr lang="en-US" altLang="ko-KR" sz="1600" baseline="0" dirty="0"/>
                         <a:t> Value</a:t>
                       </a:r>
                       <a:endParaRPr lang="ko-KR" altLang="en-US" sz="1600" dirty="0"/>
@@ -6760,7 +6760,7 @@
                     <a:p>
                       <a:pPr latinLnBrk="1"/>
                       <a:r>
-                        <a:rPr lang="en-US" altLang="ko-KR" sz="1600" dirty="0" smtClean="0"/>
+                        <a:rPr lang="en-US" altLang="ko-KR" sz="1600" dirty="0"/>
                         <a:t>Simulation</a:t>
                       </a:r>
                       <a:endParaRPr lang="ko-KR" altLang="en-US" sz="1600" dirty="0"/>
@@ -6775,7 +6775,7 @@
                     <a:p>
                       <a:pPr latinLnBrk="1"/>
                       <a:r>
-                        <a:rPr lang="en-US" altLang="ko-KR" sz="1600" dirty="0" smtClean="0"/>
+                        <a:rPr lang="en-US" altLang="ko-KR" sz="1600" dirty="0"/>
                         <a:t>Decentralized</a:t>
                       </a:r>
                       <a:endParaRPr lang="ko-KR" altLang="en-US" sz="1600" dirty="0"/>
@@ -6797,14 +6797,14 @@
                     <a:p>
                       <a:pPr latinLnBrk="1"/>
                       <a:r>
-                        <a:rPr lang="en-US" altLang="ko-KR" sz="1200" dirty="0" smtClean="0"/>
+                        <a:rPr lang="en-US" altLang="ko-KR" sz="1200" dirty="0"/>
                         <a:t>Travel Time</a:t>
                       </a:r>
                     </a:p>
                     <a:p>
                       <a:pPr latinLnBrk="1"/>
                       <a:r>
-                        <a:rPr lang="en-US" altLang="ko-KR" sz="1200" dirty="0" smtClean="0"/>
+                        <a:rPr lang="en-US" altLang="ko-KR" sz="1200" dirty="0"/>
                         <a:t>(per edge)</a:t>
                       </a:r>
                       <a:endParaRPr lang="ko-KR" altLang="en-US" sz="1200" dirty="0"/>
@@ -6819,7 +6819,7 @@
                     <a:p>
                       <a:pPr latinLnBrk="1"/>
                       <a:r>
-                        <a:rPr lang="en-US" altLang="ko-KR" sz="1600" dirty="0" smtClean="0"/>
+                        <a:rPr lang="en-US" altLang="ko-KR" sz="1600" dirty="0"/>
                         <a:t>25.5s</a:t>
                       </a:r>
                       <a:endParaRPr lang="ko-KR" altLang="en-US" sz="1600" dirty="0"/>
@@ -6852,7 +6852,7 @@
                     <a:p>
                       <a:pPr latinLnBrk="1"/>
                       <a:r>
-                        <a:rPr lang="en-US" altLang="ko-KR" sz="1200" dirty="0" smtClean="0"/>
+                        <a:rPr lang="en-US" altLang="ko-KR" sz="1200" dirty="0"/>
                         <a:t>Velocity</a:t>
                       </a:r>
                       <a:endParaRPr lang="ko-KR" altLang="en-US" sz="1200" dirty="0"/>
@@ -6867,7 +6867,7 @@
                     <a:p>
                       <a:pPr latinLnBrk="1"/>
                       <a:r>
-                        <a:rPr lang="en-US" altLang="ko-KR" sz="1600" dirty="0" smtClean="0"/>
+                        <a:rPr lang="en-US" altLang="ko-KR" sz="1600" dirty="0"/>
                         <a:t>2.13m/s</a:t>
                       </a:r>
                       <a:endParaRPr lang="ko-KR" altLang="en-US" sz="1600" dirty="0"/>
@@ -6900,18 +6900,18 @@
                     <a:p>
                       <a:pPr latinLnBrk="1"/>
                       <a:r>
-                        <a:rPr lang="en-US" altLang="ko-KR" sz="1200" dirty="0" smtClean="0"/>
+                        <a:rPr lang="en-US" altLang="ko-KR" sz="1200" dirty="0"/>
                         <a:t>Waiting Time</a:t>
                       </a:r>
                       <a:br>
-                        <a:rPr lang="en-US" altLang="ko-KR" sz="1200" dirty="0" smtClean="0"/>
+                        <a:rPr lang="en-US" altLang="ko-KR" sz="1200" dirty="0"/>
                       </a:br>
                       <a:r>
-                        <a:rPr lang="en-US" altLang="ko-KR" sz="1200" dirty="0" smtClean="0"/>
+                        <a:rPr lang="en-US" altLang="ko-KR" sz="1200" dirty="0"/>
                         <a:t>(whole</a:t>
                       </a:r>
                       <a:r>
-                        <a:rPr lang="en-US" altLang="ko-KR" sz="1200" baseline="0" dirty="0" smtClean="0"/>
+                        <a:rPr lang="en-US" altLang="ko-KR" sz="1200" baseline="0" dirty="0"/>
                         <a:t> trip)</a:t>
                       </a:r>
                       <a:endParaRPr lang="ko-KR" altLang="en-US" sz="1200" dirty="0"/>
@@ -6926,11 +6926,11 @@
                     <a:p>
                       <a:pPr latinLnBrk="1"/>
                       <a:r>
-                        <a:rPr lang="en-US" altLang="ko-KR" sz="1600" dirty="0" smtClean="0"/>
+                        <a:rPr lang="en-US" altLang="ko-KR" sz="1600" dirty="0"/>
                         <a:t>4205.5s/</a:t>
                       </a:r>
                       <a:r>
-                        <a:rPr lang="en-US" altLang="ko-KR" sz="1600" dirty="0" err="1" smtClean="0"/>
+                        <a:rPr lang="en-US" altLang="ko-KR" sz="1600" dirty="0" err="1"/>
                         <a:t>veh</a:t>
                       </a:r>
                       <a:endParaRPr lang="ko-KR" altLang="en-US" sz="1600" dirty="0"/>
@@ -7012,14 +7012,10 @@
             </a:r>
             <a:r>
               <a:rPr lang="en-US" altLang="ko-KR" dirty="0"/>
-              <a:t> Decentralized CNN/CNN-reduced Model with Practical </a:t>
-            </a:r>
-            <a:r>
-              <a:rPr lang="en-US" altLang="ko-KR" dirty="0" smtClean="0"/>
-              <a:t>Restraints</a:t>
+              <a:t> Decentralized CNN/CNN-reduced Model with Practical Restraints</a:t>
             </a:r>
             <a:br>
-              <a:rPr lang="en-US" altLang="ko-KR" dirty="0" smtClean="0"/>
+              <a:rPr lang="en-US" altLang="ko-KR" dirty="0"/>
             </a:br>
             <a:endParaRPr lang="en-US" altLang="ko-KR" dirty="0"/>
           </a:p>
@@ -7041,25 +7037,25 @@
           <a:lstStyle/>
           <a:p>
             <a:r>
-              <a:rPr lang="en-US" altLang="ko-KR" dirty="0" smtClean="0"/>
+              <a:rPr lang="en-US" altLang="ko-KR" dirty="0"/>
               <a:t> CNN based Decentralized Model</a:t>
             </a:r>
           </a:p>
           <a:p>
             <a:pPr lvl="1"/>
             <a:r>
-              <a:rPr lang="en-US" altLang="ko-KR" dirty="0" smtClean="0"/>
+              <a:rPr lang="en-US" altLang="ko-KR" dirty="0"/>
               <a:t>CNN: Convolution Neural Network</a:t>
             </a:r>
           </a:p>
           <a:p>
             <a:pPr lvl="2"/>
             <a:r>
-              <a:rPr lang="en-US" altLang="ko-KR" dirty="0" smtClean="0"/>
+              <a:rPr lang="en-US" altLang="ko-KR" dirty="0"/>
               <a:t>Feature extraction in selected region </a:t>
             </a:r>
             <a:r>
-              <a:rPr lang="en-US" altLang="ko-KR" dirty="0" smtClean="0">
+              <a:rPr lang="en-US" altLang="ko-KR" dirty="0">
                 <a:sym typeface="Wingdings" panose="05000000000000000000" pitchFamily="2" charset="2"/>
               </a:rPr>
               <a:t> Apply to intersection information</a:t>
@@ -7068,25 +7064,25 @@
           <a:p>
             <a:pPr lvl="2"/>
             <a:r>
-              <a:rPr lang="en-US" altLang="ko-KR" dirty="0" smtClean="0">
+              <a:rPr lang="en-US" altLang="ko-KR" dirty="0">
                 <a:sym typeface="Wingdings" panose="05000000000000000000" pitchFamily="2" charset="2"/>
               </a:rPr>
               <a:t>Advantage: less parameters than Fully Connected Network  </a:t>
             </a:r>
             <a:r>
-              <a:rPr lang="en-US" altLang="ko-KR" dirty="0" err="1" smtClean="0">
+              <a:rPr lang="en-US" altLang="ko-KR" dirty="0" err="1">
                 <a:sym typeface="Wingdings" panose="05000000000000000000" pitchFamily="2" charset="2"/>
               </a:rPr>
               <a:t>Lightweighting</a:t>
             </a:r>
-            <a:endParaRPr lang="en-US" altLang="ko-KR" dirty="0" smtClean="0">
+            <a:endParaRPr lang="en-US" altLang="ko-KR" dirty="0">
               <a:sym typeface="Wingdings" panose="05000000000000000000" pitchFamily="2" charset="2"/>
             </a:endParaRPr>
           </a:p>
           <a:p>
             <a:pPr lvl="1"/>
             <a:r>
-              <a:rPr lang="en-US" altLang="ko-KR" dirty="0" smtClean="0">
+              <a:rPr lang="en-US" altLang="ko-KR" dirty="0">
                 <a:sym typeface="Wingdings" panose="05000000000000000000" pitchFamily="2" charset="2"/>
               </a:rPr>
               <a:t>CNN based Model (Feature Extraction)</a:t>
@@ -7095,7 +7091,7 @@
           <a:p>
             <a:pPr lvl="2"/>
             <a:r>
-              <a:rPr lang="en-US" altLang="ko-KR" dirty="0" smtClean="0">
+              <a:rPr lang="en-US" altLang="ko-KR" dirty="0">
                 <a:sym typeface="Wingdings" panose="05000000000000000000" pitchFamily="2" charset="2"/>
               </a:rPr>
               <a:t>Current Channel: 8 (zero-padded demand of vehicles from inflow edge)</a:t>
@@ -7104,7 +7100,7 @@
           <a:p>
             <a:pPr lvl="2"/>
             <a:r>
-              <a:rPr lang="en-US" altLang="ko-KR" dirty="0" smtClean="0">
+              <a:rPr lang="en-US" altLang="ko-KR" dirty="0">
                 <a:sym typeface="Wingdings" panose="05000000000000000000" pitchFamily="2" charset="2"/>
               </a:rPr>
               <a:t>After CNN, the number of channel: 16</a:t>
@@ -7113,7 +7109,7 @@
           <a:p>
             <a:pPr lvl="2"/>
             <a:r>
-              <a:rPr lang="en-US" altLang="ko-KR" dirty="0" smtClean="0">
+              <a:rPr lang="en-US" altLang="ko-KR" dirty="0">
                 <a:sym typeface="Wingdings" panose="05000000000000000000" pitchFamily="2" charset="2"/>
               </a:rPr>
               <a:t>Learning Time: 8h 11m</a:t>
@@ -7122,7 +7118,7 @@
           <a:p>
             <a:pPr lvl="1"/>
             <a:r>
-              <a:rPr lang="en-US" altLang="ko-KR" dirty="0" smtClean="0">
+              <a:rPr lang="en-US" altLang="ko-KR" dirty="0">
                 <a:sym typeface="Wingdings" panose="05000000000000000000" pitchFamily="2" charset="2"/>
               </a:rPr>
               <a:t>CNN based Lightweight Model</a:t>
@@ -7131,7 +7127,7 @@
           <a:p>
             <a:pPr lvl="2"/>
             <a:r>
-              <a:rPr lang="en-US" altLang="ko-KR" dirty="0" smtClean="0">
+              <a:rPr lang="en-US" altLang="ko-KR" dirty="0">
                 <a:sym typeface="Wingdings" panose="05000000000000000000" pitchFamily="2" charset="2"/>
               </a:rPr>
               <a:t>By using Conv1d, dimensionality reduced to 1 channel with feature</a:t>
@@ -7140,18 +7136,12 @@
           <a:p>
             <a:pPr lvl="2"/>
             <a:r>
-              <a:rPr lang="en-US" altLang="ko-KR" dirty="0" smtClean="0">
+              <a:rPr lang="en-US" altLang="ko-KR" dirty="0">
                 <a:sym typeface="Wingdings" panose="05000000000000000000" pitchFamily="2" charset="2"/>
               </a:rPr>
-              <a:t>Learning Time: 6h </a:t>
-            </a:r>
-            <a:r>
-              <a:rPr lang="en-US" altLang="ko-KR" dirty="0" smtClean="0">
-                <a:sym typeface="Wingdings" panose="05000000000000000000" pitchFamily="2" charset="2"/>
-              </a:rPr>
-              <a:t>10m</a:t>
-            </a:r>
-            <a:endParaRPr lang="en-US" altLang="ko-KR" dirty="0" smtClean="0"/>
+              <a:t>Learning Time: 6h 10m</a:t>
+            </a:r>
+            <a:endParaRPr lang="en-US" altLang="ko-KR" dirty="0"/>
           </a:p>
           <a:p>
             <a:pPr lvl="2"/>
@@ -7212,22 +7202,10 @@
             </a:r>
             <a:r>
               <a:rPr lang="en-US" altLang="ko-KR" dirty="0"/>
-              <a:t> Decentralized </a:t>
-            </a:r>
-            <a:r>
-              <a:rPr lang="en-US" altLang="ko-KR" dirty="0" smtClean="0"/>
-              <a:t>CNN/CNN-reduced </a:t>
-            </a:r>
-            <a:r>
+              <a:t> Decentralized CNN/CNN-reduced Model with Practical Restraints</a:t>
+            </a:r>
+            <a:br>
               <a:rPr lang="en-US" altLang="ko-KR" dirty="0"/>
-              <a:t>Model with Practical </a:t>
-            </a:r>
-            <a:r>
-              <a:rPr lang="en-US" altLang="ko-KR" dirty="0" smtClean="0"/>
-              <a:t>Restraints</a:t>
-            </a:r>
-            <a:br>
-              <a:rPr lang="en-US" altLang="ko-KR" dirty="0" smtClean="0"/>
             </a:br>
             <a:endParaRPr lang="ko-KR" altLang="en-US" dirty="0"/>
           </a:p>
@@ -7249,7 +7227,7 @@
           <a:lstStyle/>
           <a:p>
             <a:r>
-              <a:rPr lang="en-US" altLang="ko-KR" dirty="0" smtClean="0"/>
+              <a:rPr lang="en-US" altLang="ko-KR" dirty="0"/>
               <a:t>CNN based model(Single Agent based Model)</a:t>
             </a:r>
             <a:endParaRPr lang="ko-KR" altLang="en-US" dirty="0"/>
@@ -12055,14 +12033,14 @@
           <a:lstStyle/>
           <a:p>
             <a:r>
-              <a:rPr lang="en-US" altLang="ko-KR" sz="1600" dirty="0" smtClean="0"/>
+              <a:rPr lang="en-US" altLang="ko-KR" sz="1600" dirty="0"/>
               <a:t>Vehicle Info</a:t>
             </a:r>
             <a:br>
-              <a:rPr lang="en-US" altLang="ko-KR" sz="1600" dirty="0" smtClean="0"/>
+              <a:rPr lang="en-US" altLang="ko-KR" sz="1600" dirty="0"/>
             </a:br>
             <a:r>
-              <a:rPr lang="en-US" altLang="ko-KR" sz="1600" dirty="0" smtClean="0"/>
+              <a:rPr lang="en-US" altLang="ko-KR" sz="1600" dirty="0"/>
               <a:t>from Traci</a:t>
             </a:r>
             <a:endParaRPr lang="ko-KR" altLang="en-US" sz="1600" dirty="0"/>
@@ -12162,14 +12140,14 @@
           <a:lstStyle/>
           <a:p>
             <a:r>
-              <a:rPr lang="en-US" altLang="ko-KR" sz="1400" dirty="0" smtClean="0"/>
+              <a:rPr lang="en-US" altLang="ko-KR" sz="1400" dirty="0"/>
               <a:t>Left Demand</a:t>
             </a:r>
             <a:br>
-              <a:rPr lang="en-US" altLang="ko-KR" sz="1400" dirty="0" smtClean="0"/>
+              <a:rPr lang="en-US" altLang="ko-KR" sz="1400" dirty="0"/>
             </a:br>
             <a:r>
-              <a:rPr lang="en-US" altLang="ko-KR" sz="1400" dirty="0" smtClean="0"/>
+              <a:rPr lang="en-US" altLang="ko-KR" sz="1400" dirty="0"/>
               <a:t>Straight Demand</a:t>
             </a:r>
             <a:endParaRPr lang="ko-KR" altLang="en-US" sz="1400" dirty="0"/>
@@ -12233,30 +12211,22 @@
           <a:p>
             <a:pPr algn="ctr"/>
             <a:r>
-              <a:rPr lang="en-US" altLang="ko-KR" sz="1600" dirty="0" smtClean="0">
+              <a:rPr lang="en-US" altLang="ko-KR" sz="1600" dirty="0">
                 <a:solidFill>
                   <a:srgbClr val="92D050"/>
                 </a:solidFill>
               </a:rPr>
-              <a:t>Inflow </a:t>
-            </a:r>
-            <a:r>
-              <a:rPr lang="en-US" altLang="ko-KR" sz="1600" dirty="0" smtClean="0">
-                <a:solidFill>
-                  <a:srgbClr val="92D050"/>
-                </a:solidFill>
-              </a:rPr>
-              <a:t>Demand</a:t>
+              <a:t>Inflow Demand</a:t>
             </a:r>
             <a:br>
-              <a:rPr lang="en-US" altLang="ko-KR" sz="1600" dirty="0" smtClean="0">
+              <a:rPr lang="en-US" altLang="ko-KR" sz="1600" dirty="0">
                 <a:solidFill>
                   <a:srgbClr val="92D050"/>
                 </a:solidFill>
               </a:rPr>
             </a:br>
             <a:r>
-              <a:rPr lang="en-US" altLang="ko-KR" sz="1200" dirty="0" smtClean="0">
+              <a:rPr lang="en-US" altLang="ko-KR" sz="1200" dirty="0">
                 <a:solidFill>
                   <a:srgbClr val="92D050"/>
                 </a:solidFill>
@@ -12891,14 +12861,14 @@
             <a:p>
               <a:pPr algn="ctr"/>
               <a:r>
-                <a:rPr lang="en-US" altLang="ko-KR" sz="1000" dirty="0" smtClean="0"/>
+                <a:rPr lang="en-US" altLang="ko-KR" sz="1000" dirty="0"/>
                 <a:t>Intersection </a:t>
               </a:r>
               <a:br>
-                <a:rPr lang="en-US" altLang="ko-KR" sz="1000" dirty="0" smtClean="0"/>
+                <a:rPr lang="en-US" altLang="ko-KR" sz="1000" dirty="0"/>
               </a:br>
               <a:r>
-                <a:rPr lang="en-US" altLang="ko-KR" sz="1000" dirty="0" smtClean="0"/>
+                <a:rPr lang="en-US" altLang="ko-KR" sz="1000" dirty="0"/>
                 <a:t>Traffic Demand</a:t>
               </a:r>
               <a:endParaRPr lang="ko-KR" altLang="en-US" sz="1000" dirty="0"/>
@@ -12930,7 +12900,7 @@
           <a:p>
             <a:pPr algn="ctr"/>
             <a:r>
-              <a:rPr lang="en-US" altLang="ko-KR" sz="1600" dirty="0" smtClean="0">
+              <a:rPr lang="en-US" altLang="ko-KR" sz="1600" dirty="0">
                 <a:solidFill>
                   <a:srgbClr val="92D050"/>
                 </a:solidFill>
@@ -12941,7 +12911,7 @@
           <a:p>
             <a:pPr algn="ctr"/>
             <a:r>
-              <a:rPr lang="en-US" altLang="ko-KR" sz="1600" dirty="0" smtClean="0">
+              <a:rPr lang="en-US" altLang="ko-KR" sz="1600" dirty="0">
                 <a:solidFill>
                   <a:srgbClr val="92D050"/>
                 </a:solidFill>
@@ -12980,7 +12950,7 @@
           <a:p>
             <a:pPr algn="ctr"/>
             <a:r>
-              <a:rPr lang="en-US" altLang="ko-KR" sz="1000" dirty="0" smtClean="0"/>
+              <a:rPr lang="en-US" altLang="ko-KR" sz="1000" dirty="0"/>
               <a:t>Super Q Network</a:t>
             </a:r>
             <a:endParaRPr lang="ko-KR" altLang="en-US" sz="1000" dirty="0"/>
@@ -13011,7 +12981,7 @@
           <a:p>
             <a:pPr algn="ctr"/>
             <a:r>
-              <a:rPr lang="en-US" altLang="ko-KR" sz="1000" dirty="0" smtClean="0"/>
+              <a:rPr lang="en-US" altLang="ko-KR" sz="1000" dirty="0"/>
               <a:t>Time Q Network</a:t>
             </a:r>
             <a:endParaRPr lang="ko-KR" altLang="en-US" sz="1000" dirty="0"/>
@@ -13043,11 +13013,7 @@
             <a:pPr algn="ctr"/>
             <a:r>
               <a:rPr lang="en-US" altLang="ko-KR" sz="1000" dirty="0"/>
-              <a:t>R</a:t>
-            </a:r>
-            <a:r>
-              <a:rPr lang="en-US" altLang="ko-KR" sz="1000" dirty="0" smtClean="0"/>
-              <a:t>ate Q Network</a:t>
+              <a:t>Rate Q Network</a:t>
             </a:r>
             <a:endParaRPr lang="ko-KR" altLang="en-US" sz="1000" dirty="0"/>
           </a:p>
@@ -13077,7 +13043,7 @@
           <a:p>
             <a:pPr algn="ctr"/>
             <a:r>
-              <a:rPr lang="en-US" altLang="ko-KR" sz="1400" dirty="0" smtClean="0">
+              <a:rPr lang="en-US" altLang="ko-KR" sz="1400" dirty="0">
                 <a:solidFill>
                   <a:srgbClr val="C00000"/>
                 </a:solidFill>
@@ -13085,7 +13051,7 @@
               <a:t>Neural Net (Shared </a:t>
             </a:r>
             <a:r>
-              <a:rPr lang="en-US" altLang="ko-KR" sz="1400" dirty="0" err="1" smtClean="0">
+              <a:rPr lang="en-US" altLang="ko-KR" sz="1400" dirty="0" err="1">
                 <a:solidFill>
                   <a:srgbClr val="C00000"/>
                 </a:solidFill>
@@ -13093,7 +13059,7 @@
               <a:t>Params</a:t>
             </a:r>
             <a:r>
-              <a:rPr lang="en-US" altLang="ko-KR" sz="1400" dirty="0" smtClean="0">
+              <a:rPr lang="en-US" altLang="ko-KR" sz="1400" dirty="0">
                 <a:solidFill>
                   <a:srgbClr val="C00000"/>
                 </a:solidFill>
@@ -13240,15 +13206,15 @@
           <a:p>
             <a:pPr algn="ctr"/>
             <a:r>
-              <a:rPr lang="en-US" altLang="ko-KR" sz="1000" dirty="0" err="1" smtClean="0"/>
+              <a:rPr lang="en-US" altLang="ko-KR" sz="1000" dirty="0" err="1"/>
               <a:t>argmaxQ</a:t>
             </a:r>
             <a:r>
-              <a:rPr lang="en-US" altLang="ko-KR" sz="1000" dirty="0" smtClean="0"/>
+              <a:rPr lang="en-US" altLang="ko-KR" sz="1000" dirty="0"/>
               <a:t> = </a:t>
             </a:r>
             <a:r>
-              <a:rPr lang="en-US" altLang="ko-KR" sz="1100" b="1" dirty="0" smtClean="0">
+              <a:rPr lang="en-US" altLang="ko-KR" sz="1100" b="1" dirty="0">
                 <a:solidFill>
                   <a:srgbClr val="00B050"/>
                 </a:solidFill>
@@ -13287,15 +13253,15 @@
           <a:p>
             <a:pPr algn="ctr"/>
             <a:r>
-              <a:rPr lang="en-US" altLang="ko-KR" sz="1000" dirty="0" err="1" smtClean="0"/>
+              <a:rPr lang="en-US" altLang="ko-KR" sz="1000" dirty="0" err="1"/>
               <a:t>argmaxQ</a:t>
             </a:r>
             <a:r>
-              <a:rPr lang="en-US" altLang="ko-KR" sz="1000" dirty="0" smtClean="0"/>
+              <a:rPr lang="en-US" altLang="ko-KR" sz="1000" dirty="0"/>
               <a:t> = </a:t>
             </a:r>
             <a:r>
-              <a:rPr lang="en-US" altLang="ko-KR" sz="1100" b="1" dirty="0" smtClean="0">
+              <a:rPr lang="en-US" altLang="ko-KR" sz="1100" b="1" dirty="0">
                 <a:solidFill>
                   <a:srgbClr val="00B050"/>
                 </a:solidFill>
@@ -13964,7 +13930,7 @@
           <a:lstStyle/>
           <a:p>
             <a:r>
-              <a:rPr lang="en-US" altLang="ko-KR" sz="1200" dirty="0" smtClean="0"/>
+              <a:rPr lang="en-US" altLang="ko-KR" sz="1200" dirty="0"/>
               <a:t>Conv1d</a:t>
             </a:r>
           </a:p>
@@ -13993,18 +13959,13 @@
           <a:lstStyle/>
           <a:p>
             <a:r>
-              <a:rPr lang="en-US" altLang="ko-KR" sz="1200" dirty="0" smtClean="0"/>
-              <a:t>8 Activation </a:t>
-            </a:r>
-            <a:r>
-              <a:rPr lang="en-US" altLang="ko-KR" sz="1200" dirty="0" smtClean="0"/>
-              <a:t>Maps/</a:t>
-            </a:r>
-            <a:endParaRPr lang="en-US" altLang="ko-KR" sz="1200" dirty="0" smtClean="0"/>
-          </a:p>
-          <a:p>
-            <a:r>
-              <a:rPr lang="en-US" altLang="ko-KR" sz="1200" dirty="0" smtClean="0"/>
+              <a:rPr lang="en-US" altLang="ko-KR" sz="1200" dirty="0"/>
+              <a:t>8 Activation Maps/</a:t>
+            </a:r>
+          </a:p>
+          <a:p>
+            <a:r>
+              <a:rPr lang="en-US" altLang="ko-KR" sz="1200" dirty="0"/>
               <a:t>1 Activation Map</a:t>
             </a:r>
             <a:endParaRPr lang="ko-KR" altLang="en-US" sz="1200" dirty="0"/>
@@ -14099,7 +14060,7 @@
           <a:p>
             <a:pPr algn="ctr"/>
             <a:r>
-              <a:rPr lang="en-US" altLang="ko-KR" sz="1400" dirty="0" smtClean="0">
+              <a:rPr lang="en-US" altLang="ko-KR" sz="1400" dirty="0">
                 <a:solidFill>
                   <a:schemeClr val="tx1"/>
                 </a:solidFill>
@@ -14114,6 +14075,94 @@
           </a:p>
         </p:txBody>
       </p:sp>
+      <p:cxnSp>
+        <p:nvCxnSpPr>
+          <p:cNvPr id="170" name="직선 화살표 연결선 169">
+            <a:extLst>
+              <a:ext uri="{FF2B5EF4-FFF2-40B4-BE49-F238E27FC236}">
+                <a16:creationId xmlns:a16="http://schemas.microsoft.com/office/drawing/2014/main" id="{A5C2C1BB-9B66-495A-9CC9-7F747BD1BFE6}"/>
+              </a:ext>
+            </a:extLst>
+          </p:cNvPr>
+          <p:cNvCxnSpPr>
+            <a:cxnSpLocks/>
+          </p:cNvCxnSpPr>
+          <p:nvPr/>
+        </p:nvCxnSpPr>
+        <p:spPr>
+          <a:xfrm>
+            <a:off x="1820192" y="3606125"/>
+            <a:ext cx="423218" cy="623448"/>
+          </a:xfrm>
+          <a:prstGeom prst="straightConnector1">
+            <a:avLst/>
+          </a:prstGeom>
+          <a:ln w="28575">
+            <a:solidFill>
+              <a:schemeClr val="tx1"/>
+            </a:solidFill>
+            <a:tailEnd type="triangle"/>
+          </a:ln>
+        </p:spPr>
+        <p:style>
+          <a:lnRef idx="1">
+            <a:schemeClr val="dk1"/>
+          </a:lnRef>
+          <a:fillRef idx="0">
+            <a:schemeClr val="dk1"/>
+          </a:fillRef>
+          <a:effectRef idx="0">
+            <a:schemeClr val="dk1"/>
+          </a:effectRef>
+          <a:fontRef idx="minor">
+            <a:schemeClr val="tx1"/>
+          </a:fontRef>
+        </p:style>
+      </p:cxnSp>
+      <p:cxnSp>
+        <p:nvCxnSpPr>
+          <p:cNvPr id="171" name="직선 화살표 연결선 170">
+            <a:extLst>
+              <a:ext uri="{FF2B5EF4-FFF2-40B4-BE49-F238E27FC236}">
+                <a16:creationId xmlns:a16="http://schemas.microsoft.com/office/drawing/2014/main" id="{29CFC6F0-9A03-47A5-B508-C2132B7FA70D}"/>
+              </a:ext>
+            </a:extLst>
+          </p:cNvPr>
+          <p:cNvCxnSpPr>
+            <a:cxnSpLocks/>
+          </p:cNvCxnSpPr>
+          <p:nvPr/>
+        </p:nvCxnSpPr>
+        <p:spPr>
+          <a:xfrm flipV="1">
+            <a:off x="1821888" y="5131796"/>
+            <a:ext cx="350423" cy="229360"/>
+          </a:xfrm>
+          <a:prstGeom prst="straightConnector1">
+            <a:avLst/>
+          </a:prstGeom>
+          <a:ln w="28575">
+            <a:solidFill>
+              <a:schemeClr val="tx1"/>
+            </a:solidFill>
+            <a:tailEnd type="triangle"/>
+          </a:ln>
+        </p:spPr>
+        <p:style>
+          <a:lnRef idx="1">
+            <a:schemeClr val="dk1"/>
+          </a:lnRef>
+          <a:fillRef idx="0">
+            <a:schemeClr val="dk1"/>
+          </a:fillRef>
+          <a:effectRef idx="0">
+            <a:schemeClr val="dk1"/>
+          </a:effectRef>
+          <a:fontRef idx="minor">
+            <a:schemeClr val="tx1"/>
+          </a:fontRef>
+        </p:style>
+      </p:cxnSp>
     </p:spTree>
     <p:extLst>
       <p:ext uri="{BB962C8B-B14F-4D97-AF65-F5344CB8AC3E}">
@@ -14197,22 +14246,18 @@
           <a:lstStyle/>
           <a:p>
             <a:r>
-              <a:rPr lang="en-US" altLang="ko-KR" dirty="0" smtClean="0"/>
-              <a:t>CNN </a:t>
-            </a:r>
-            <a:r>
-              <a:rPr lang="en-US" altLang="ko-KR" dirty="0" smtClean="0"/>
-              <a:t>Model</a:t>
+              <a:rPr lang="en-US" altLang="ko-KR" dirty="0"/>
+              <a:t>CNN Model</a:t>
             </a:r>
           </a:p>
           <a:p>
             <a:pPr lvl="1"/>
             <a:r>
-              <a:rPr lang="en-US" altLang="ko-KR" sz="1400" dirty="0" smtClean="0"/>
+              <a:rPr lang="en-US" altLang="ko-KR" sz="1400" dirty="0"/>
               <a:t>8 feature </a:t>
             </a:r>
             <a:r>
-              <a:rPr lang="en-US" altLang="ko-KR" sz="1400" dirty="0" smtClean="0">
+              <a:rPr lang="en-US" altLang="ko-KR" sz="1400" dirty="0">
                 <a:sym typeface="Wingdings" panose="05000000000000000000" pitchFamily="2" charset="2"/>
               </a:rPr>
               <a:t> Checking demand change</a:t>
@@ -14495,22 +14540,18 @@
           </a:lstStyle>
           <a:p>
             <a:r>
-              <a:rPr lang="en-US" altLang="ko-KR" dirty="0" smtClean="0"/>
-              <a:t>CNN-reduced </a:t>
-            </a:r>
-            <a:r>
-              <a:rPr lang="en-US" altLang="ko-KR" dirty="0" smtClean="0"/>
-              <a:t>Model</a:t>
+              <a:rPr lang="en-US" altLang="ko-KR" dirty="0"/>
+              <a:t>CNN-reduced Model</a:t>
             </a:r>
           </a:p>
           <a:p>
             <a:pPr lvl="1"/>
             <a:r>
-              <a:rPr lang="en-US" altLang="ko-KR" sz="1400" dirty="0" smtClean="0"/>
+              <a:rPr lang="en-US" altLang="ko-KR" sz="1400" dirty="0"/>
               <a:t>1 feature </a:t>
             </a:r>
             <a:r>
-              <a:rPr lang="en-US" altLang="ko-KR" sz="1400" dirty="0" smtClean="0">
+              <a:rPr lang="en-US" altLang="ko-KR" sz="1400" dirty="0">
                 <a:sym typeface="Wingdings" panose="05000000000000000000" pitchFamily="2" charset="2"/>
               </a:rPr>
               <a:t> Current traffic info</a:t>
@@ -14605,11 +14646,11 @@
                     <a:p>
                       <a:pPr latinLnBrk="1"/>
                       <a:r>
-                        <a:rPr lang="en-US" altLang="ko-KR" sz="1300" dirty="0" err="1" smtClean="0"/>
+                        <a:rPr lang="en-US" altLang="ko-KR" sz="1300" dirty="0" err="1"/>
                         <a:t>Avg</a:t>
                       </a:r>
                       <a:r>
-                        <a:rPr lang="en-US" altLang="ko-KR" sz="1300" baseline="0" dirty="0" smtClean="0"/>
+                        <a:rPr lang="en-US" altLang="ko-KR" sz="1300" baseline="0" dirty="0"/>
                         <a:t> Value</a:t>
                       </a:r>
                       <a:endParaRPr lang="ko-KR" altLang="en-US" sz="1300" dirty="0"/>
@@ -14624,7 +14665,7 @@
                     <a:p>
                       <a:pPr latinLnBrk="1"/>
                       <a:r>
-                        <a:rPr lang="en-US" altLang="ko-KR" sz="1300" dirty="0" smtClean="0"/>
+                        <a:rPr lang="en-US" altLang="ko-KR" sz="1300" dirty="0"/>
                         <a:t>Simulation</a:t>
                       </a:r>
                       <a:endParaRPr lang="ko-KR" altLang="en-US" sz="1300" dirty="0"/>
@@ -14639,7 +14680,7 @@
                     <a:p>
                       <a:pPr latinLnBrk="1"/>
                       <a:r>
-                        <a:rPr lang="en-US" altLang="ko-KR" sz="1300" dirty="0" smtClean="0"/>
+                        <a:rPr lang="en-US" altLang="ko-KR" sz="1300" dirty="0"/>
                         <a:t>Decentralized-CNN</a:t>
                       </a:r>
                       <a:endParaRPr lang="ko-KR" altLang="en-US" sz="1300" dirty="0"/>
@@ -14654,7 +14695,7 @@
                     <a:p>
                       <a:pPr latinLnBrk="1"/>
                       <a:r>
-                        <a:rPr lang="en-US" altLang="ko-KR" sz="1300" dirty="0" smtClean="0"/>
+                        <a:rPr lang="en-US" altLang="ko-KR" sz="1300" dirty="0"/>
                         <a:t>Decentralized-CNN-reduced</a:t>
                       </a:r>
                       <a:endParaRPr lang="ko-KR" altLang="en-US" sz="1300" dirty="0"/>
@@ -14676,14 +14717,14 @@
                     <a:p>
                       <a:pPr latinLnBrk="1"/>
                       <a:r>
-                        <a:rPr lang="en-US" altLang="ko-KR" sz="1300" dirty="0" smtClean="0"/>
+                        <a:rPr lang="en-US" altLang="ko-KR" sz="1300" dirty="0"/>
                         <a:t>Travel Time</a:t>
                       </a:r>
                     </a:p>
                     <a:p>
                       <a:pPr latinLnBrk="1"/>
                       <a:r>
-                        <a:rPr lang="en-US" altLang="ko-KR" sz="1300" dirty="0" smtClean="0"/>
+                        <a:rPr lang="en-US" altLang="ko-KR" sz="1300" dirty="0"/>
                         <a:t>(per edge)</a:t>
                       </a:r>
                       <a:endParaRPr lang="ko-KR" altLang="en-US" sz="1300" dirty="0"/>
@@ -14698,7 +14739,7 @@
                     <a:p>
                       <a:pPr latinLnBrk="1"/>
                       <a:r>
-                        <a:rPr lang="en-US" altLang="ko-KR" sz="1300" dirty="0" smtClean="0"/>
+                        <a:rPr lang="en-US" altLang="ko-KR" sz="1300" dirty="0"/>
                         <a:t>13.82s</a:t>
                       </a:r>
                       <a:endParaRPr lang="ko-KR" altLang="en-US" sz="1300" dirty="0"/>
@@ -14713,7 +14754,7 @@
                     <a:p>
                       <a:pPr latinLnBrk="1"/>
                       <a:r>
-                        <a:rPr lang="en-US" altLang="ko-KR" sz="1300" dirty="0" smtClean="0"/>
+                        <a:rPr lang="en-US" altLang="ko-KR" sz="1300" dirty="0"/>
                         <a:t>14.5s</a:t>
                       </a:r>
                       <a:endParaRPr lang="ko-KR" altLang="en-US" sz="1300" dirty="0"/>
@@ -14728,7 +14769,7 @@
                     <a:p>
                       <a:pPr latinLnBrk="1"/>
                       <a:r>
-                        <a:rPr lang="en-US" altLang="ko-KR" sz="1300" dirty="0" smtClean="0"/>
+                        <a:rPr lang="en-US" altLang="ko-KR" sz="1300" dirty="0"/>
                         <a:t>14.4s</a:t>
                       </a:r>
                       <a:endParaRPr lang="ko-KR" altLang="en-US" sz="1300" dirty="0"/>
@@ -14750,7 +14791,7 @@
                     <a:p>
                       <a:pPr latinLnBrk="1"/>
                       <a:r>
-                        <a:rPr lang="en-US" altLang="ko-KR" sz="1300" dirty="0" smtClean="0"/>
+                        <a:rPr lang="en-US" altLang="ko-KR" sz="1300" dirty="0"/>
                         <a:t>Velocity</a:t>
                       </a:r>
                       <a:endParaRPr lang="ko-KR" altLang="en-US" sz="1300" dirty="0"/>
@@ -14765,7 +14806,7 @@
                     <a:p>
                       <a:pPr latinLnBrk="1"/>
                       <a:r>
-                        <a:rPr lang="en-US" altLang="ko-KR" sz="1300" dirty="0" smtClean="0"/>
+                        <a:rPr lang="en-US" altLang="ko-KR" sz="1300" dirty="0"/>
                         <a:t>5.93m/s</a:t>
                       </a:r>
                       <a:endParaRPr lang="ko-KR" altLang="en-US" sz="1300" dirty="0"/>
@@ -14780,7 +14821,7 @@
                     <a:p>
                       <a:pPr latinLnBrk="1"/>
                       <a:r>
-                        <a:rPr lang="en-US" altLang="ko-KR" sz="1300" dirty="0" smtClean="0"/>
+                        <a:rPr lang="en-US" altLang="ko-KR" sz="1300" dirty="0"/>
                         <a:t>5.79m/s</a:t>
                       </a:r>
                       <a:endParaRPr lang="ko-KR" altLang="en-US" sz="1300" dirty="0"/>
@@ -14795,7 +14836,7 @@
                     <a:p>
                       <a:pPr latinLnBrk="1"/>
                       <a:r>
-                        <a:rPr lang="en-US" altLang="ko-KR" sz="1300" dirty="0" smtClean="0"/>
+                        <a:rPr lang="en-US" altLang="ko-KR" sz="1300" dirty="0"/>
                         <a:t>5.80m/s</a:t>
                       </a:r>
                       <a:endParaRPr lang="ko-KR" altLang="en-US" sz="1300" dirty="0"/>
@@ -14817,18 +14858,18 @@
                     <a:p>
                       <a:pPr latinLnBrk="1"/>
                       <a:r>
-                        <a:rPr lang="en-US" altLang="ko-KR" sz="1300" dirty="0" smtClean="0"/>
+                        <a:rPr lang="en-US" altLang="ko-KR" sz="1300" dirty="0"/>
                         <a:t>Waiting Time</a:t>
                       </a:r>
                       <a:br>
-                        <a:rPr lang="en-US" altLang="ko-KR" sz="1300" dirty="0" smtClean="0"/>
+                        <a:rPr lang="en-US" altLang="ko-KR" sz="1300" dirty="0"/>
                       </a:br>
                       <a:r>
-                        <a:rPr lang="en-US" altLang="ko-KR" sz="1300" dirty="0" smtClean="0"/>
+                        <a:rPr lang="en-US" altLang="ko-KR" sz="1300" dirty="0"/>
                         <a:t>(whole</a:t>
                       </a:r>
                       <a:r>
-                        <a:rPr lang="en-US" altLang="ko-KR" sz="1300" baseline="0" dirty="0" smtClean="0"/>
+                        <a:rPr lang="en-US" altLang="ko-KR" sz="1300" baseline="0" dirty="0"/>
                         <a:t> trip)</a:t>
                       </a:r>
                       <a:endParaRPr lang="ko-KR" altLang="en-US" sz="1300" dirty="0"/>
@@ -14843,11 +14884,11 @@
                     <a:p>
                       <a:pPr latinLnBrk="1"/>
                       <a:r>
-                        <a:rPr lang="en-US" altLang="ko-KR" sz="1300" dirty="0" smtClean="0"/>
+                        <a:rPr lang="en-US" altLang="ko-KR" sz="1300" dirty="0"/>
                         <a:t>495.5s/</a:t>
                       </a:r>
                       <a:r>
-                        <a:rPr lang="en-US" altLang="ko-KR" sz="1300" dirty="0" err="1" smtClean="0"/>
+                        <a:rPr lang="en-US" altLang="ko-KR" sz="1300" dirty="0" err="1"/>
                         <a:t>veh</a:t>
                       </a:r>
                       <a:endParaRPr lang="ko-KR" altLang="en-US" sz="1300" dirty="0"/>
@@ -14862,11 +14903,11 @@
                     <a:p>
                       <a:pPr latinLnBrk="1"/>
                       <a:r>
-                        <a:rPr lang="en-US" altLang="ko-KR" sz="1300" dirty="0" smtClean="0"/>
+                        <a:rPr lang="en-US" altLang="ko-KR" sz="1300" dirty="0"/>
                         <a:t>534s/</a:t>
                       </a:r>
                       <a:r>
-                        <a:rPr lang="en-US" altLang="ko-KR" sz="1300" dirty="0" err="1" smtClean="0"/>
+                        <a:rPr lang="en-US" altLang="ko-KR" sz="1300" dirty="0" err="1"/>
                         <a:t>veh</a:t>
                       </a:r>
                       <a:endParaRPr lang="ko-KR" altLang="en-US" sz="1300" dirty="0"/>
@@ -14881,11 +14922,11 @@
                     <a:p>
                       <a:pPr latinLnBrk="1"/>
                       <a:r>
-                        <a:rPr lang="en-US" altLang="ko-KR" sz="1300" dirty="0" smtClean="0"/>
+                        <a:rPr lang="en-US" altLang="ko-KR" sz="1300" dirty="0"/>
                         <a:t>530s/</a:t>
                       </a:r>
                       <a:r>
-                        <a:rPr lang="en-US" altLang="ko-KR" sz="1300" dirty="0" err="1" smtClean="0"/>
+                        <a:rPr lang="en-US" altLang="ko-KR" sz="1300" dirty="0" err="1"/>
                         <a:t>veh</a:t>
                       </a:r>
                       <a:endParaRPr lang="ko-KR" altLang="en-US" sz="1300" dirty="0"/>
@@ -14907,11 +14948,11 @@
                     <a:p>
                       <a:pPr latinLnBrk="1"/>
                       <a:r>
-                        <a:rPr lang="en-US" altLang="ko-KR" sz="1300" dirty="0" smtClean="0"/>
+                        <a:rPr lang="en-US" altLang="ko-KR" sz="1300" dirty="0"/>
                         <a:t>Arrived </a:t>
                       </a:r>
                       <a:r>
-                        <a:rPr lang="en-US" altLang="ko-KR" sz="1300" dirty="0" err="1" smtClean="0"/>
+                        <a:rPr lang="en-US" altLang="ko-KR" sz="1300" dirty="0" err="1"/>
                         <a:t>Num</a:t>
                       </a:r>
                       <a:endParaRPr lang="ko-KR" altLang="en-US" sz="1300" dirty="0"/>
@@ -14926,7 +14967,7 @@
                     <a:p>
                       <a:pPr latinLnBrk="1"/>
                       <a:r>
-                        <a:rPr lang="en-US" altLang="ko-KR" sz="1300" dirty="0" smtClean="0"/>
+                        <a:rPr lang="en-US" altLang="ko-KR" sz="1300" dirty="0"/>
                         <a:t>10951</a:t>
                       </a:r>
                       <a:endParaRPr lang="ko-KR" altLang="en-US" sz="1300" dirty="0"/>
@@ -14941,7 +14982,7 @@
                     <a:p>
                       <a:pPr latinLnBrk="1"/>
                       <a:r>
-                        <a:rPr lang="en-US" altLang="ko-KR" sz="1300" dirty="0" smtClean="0"/>
+                        <a:rPr lang="en-US" altLang="ko-KR" sz="1300" dirty="0"/>
                         <a:t>11022</a:t>
                       </a:r>
                       <a:endParaRPr lang="ko-KR" altLang="en-US" sz="1300" dirty="0"/>
@@ -14956,7 +14997,7 @@
                     <a:p>
                       <a:pPr latinLnBrk="1"/>
                       <a:r>
-                        <a:rPr lang="en-US" altLang="ko-KR" sz="1300" dirty="0" smtClean="0"/>
+                        <a:rPr lang="en-US" altLang="ko-KR" sz="1300" dirty="0"/>
                         <a:t>11024</a:t>
                       </a:r>
                       <a:endParaRPr lang="ko-KR" altLang="en-US" sz="1300" dirty="0"/>
@@ -15023,21 +15064,17 @@
           <a:p>
             <a:r>
               <a:rPr lang="en-US" altLang="ko-KR" dirty="0"/>
-              <a:t>Continuous Action Model with Practical </a:t>
-            </a:r>
-            <a:r>
-              <a:rPr lang="en-US" altLang="ko-KR" dirty="0" smtClean="0"/>
-              <a:t>Restraints</a:t>
+              <a:t>Continuous Action Model with Practical Restraints</a:t>
             </a:r>
             <a:br>
-              <a:rPr lang="en-US" altLang="ko-KR" dirty="0" smtClean="0"/>
+              <a:rPr lang="en-US" altLang="ko-KR" dirty="0"/>
             </a:br>
             <a:endParaRPr lang="en-US" altLang="ko-KR" dirty="0"/>
           </a:p>
         </p:txBody>
       </p:sp>
-      <mc:AlternateContent xmlns:mc="http://schemas.openxmlformats.org/markup-compatibility/2006">
-        <mc:Choice xmlns:a14="http://schemas.microsoft.com/office/drawing/2010/main" Requires="a14">
+      <mc:AlternateContent xmlns:mc="http://schemas.openxmlformats.org/markup-compatibility/2006" xmlns:a14="http://schemas.microsoft.com/office/drawing/2010/main">
+        <mc:Choice Requires="a14">
           <p:sp>
             <p:nvSpPr>
               <p:cNvPr id="3" name="내용 개체 틀 2"/>
@@ -15054,18 +15091,18 @@
               <a:lstStyle/>
               <a:p>
                 <a:r>
-                  <a:rPr lang="en-US" altLang="ko-KR" dirty="0" smtClean="0"/>
+                  <a:rPr lang="en-US" altLang="ko-KR" dirty="0"/>
                   <a:t> DDPG based Model</a:t>
                 </a:r>
               </a:p>
               <a:p>
                 <a:pPr lvl="1"/>
                 <a:r>
-                  <a:rPr lang="en-US" altLang="ko-KR" dirty="0" smtClean="0"/>
+                  <a:rPr lang="en-US" altLang="ko-KR" dirty="0"/>
                   <a:t>Current action space: Time, Rate </a:t>
                 </a:r>
                 <a:r>
-                  <a:rPr lang="en-US" altLang="ko-KR" dirty="0" smtClean="0">
+                  <a:rPr lang="en-US" altLang="ko-KR" dirty="0">
                     <a:sym typeface="Wingdings" panose="05000000000000000000" pitchFamily="2" charset="2"/>
                   </a:rPr>
                   <a:t> Phase length (for each phase)</a:t>
@@ -15074,7 +15111,7 @@
               <a:p>
                 <a:pPr lvl="1"/>
                 <a:r>
-                  <a:rPr lang="en-US" altLang="ko-KR" dirty="0" smtClean="0">
+                  <a:rPr lang="en-US" altLang="ko-KR" dirty="0">
                     <a:sym typeface="Wingdings" panose="05000000000000000000" pitchFamily="2" charset="2"/>
                   </a:rPr>
                   <a:t>Splitting rest of time (Total TL period – sum of min durations for each phase)</a:t>
@@ -15083,19 +15120,19 @@
               <a:p>
                 <a:pPr lvl="1"/>
                 <a:r>
-                  <a:rPr lang="en-US" altLang="ko-KR" dirty="0" smtClean="0">
+                  <a:rPr lang="en-US" altLang="ko-KR" dirty="0">
                     <a:sym typeface="Wingdings" panose="05000000000000000000" pitchFamily="2" charset="2"/>
                   </a:rPr>
                   <a:t>Phase distribution by the results of </a:t>
                 </a:r>
                 <a:r>
-                  <a:rPr lang="en-US" altLang="ko-KR" dirty="0" err="1" smtClean="0">
+                  <a:rPr lang="en-US" altLang="ko-KR" dirty="0" err="1">
                     <a:sym typeface="Wingdings" panose="05000000000000000000" pitchFamily="2" charset="2"/>
                   </a:rPr>
                   <a:t>softmax</a:t>
                 </a:r>
                 <a:r>
-                  <a:rPr lang="en-US" altLang="ko-KR" dirty="0" smtClean="0">
+                  <a:rPr lang="en-US" altLang="ko-KR" dirty="0">
                     <a:sym typeface="Wingdings" panose="05000000000000000000" pitchFamily="2" charset="2"/>
                   </a:rPr>
                   <a:t>(</a:t>
@@ -15133,31 +15170,28 @@
                   </m:oMath>
                 </a14:m>
                 <a:r>
-                  <a:rPr lang="en-US" altLang="ko-KR" dirty="0" smtClean="0">
+                  <a:rPr lang="en-US" altLang="ko-KR" dirty="0">
                     <a:sym typeface="Wingdings" panose="05000000000000000000" pitchFamily="2" charset="2"/>
                   </a:rPr>
                   <a:t>)</a:t>
                 </a:r>
-                <a:endParaRPr lang="en-US" altLang="ko-KR" dirty="0">
-                  <a:sym typeface="Wingdings" panose="05000000000000000000" pitchFamily="2" charset="2"/>
-                </a:endParaRPr>
               </a:p>
               <a:p>
                 <a:pPr lvl="2"/>
                 <a:r>
-                  <a:rPr lang="en-US" altLang="ko-KR" dirty="0" smtClean="0">
+                  <a:rPr lang="en-US" altLang="ko-KR" dirty="0">
                     <a:sym typeface="Wingdings" panose="05000000000000000000" pitchFamily="2" charset="2"/>
                   </a:rPr>
                   <a:t>Sum of results by </a:t>
                 </a:r>
                 <a:r>
-                  <a:rPr lang="en-US" altLang="ko-KR" dirty="0" err="1" smtClean="0">
+                  <a:rPr lang="en-US" altLang="ko-KR" dirty="0" err="1">
                     <a:sym typeface="Wingdings" panose="05000000000000000000" pitchFamily="2" charset="2"/>
                   </a:rPr>
                   <a:t>softmax</a:t>
                 </a:r>
                 <a:r>
-                  <a:rPr lang="en-US" altLang="ko-KR" dirty="0" smtClean="0">
+                  <a:rPr lang="en-US" altLang="ko-KR" dirty="0">
                     <a:sym typeface="Wingdings" panose="05000000000000000000" pitchFamily="2" charset="2"/>
                   </a:rPr>
                   <a:t> function =1  Easy to distribute length of phase</a:t>
@@ -15169,7 +15203,7 @@
             </p:txBody>
           </p:sp>
         </mc:Choice>
-        <mc:Fallback>
+        <mc:Fallback xmlns="">
           <p:sp>
             <p:nvSpPr>
               <p:cNvPr id="3" name="내용 개체 틀 2"/>
@@ -15387,7 +15421,7 @@
           <a:p>
             <a:pPr algn="ctr"/>
             <a:r>
-              <a:rPr lang="en-US" altLang="ko-KR" sz="1400" dirty="0" smtClean="0"/>
+              <a:rPr lang="en-US" altLang="ko-KR" sz="1400" dirty="0"/>
               <a:t>Min Duration</a:t>
             </a:r>
             <a:endParaRPr lang="ko-KR" altLang="en-US" sz="1400" dirty="0"/>
@@ -15578,7 +15612,7 @@
           <a:p>
             <a:pPr algn="ctr"/>
             <a:r>
-              <a:rPr lang="en-US" altLang="ko-KR" sz="1400" dirty="0" smtClean="0"/>
+              <a:rPr lang="en-US" altLang="ko-KR" sz="1400" dirty="0"/>
               <a:t>Action</a:t>
             </a:r>
             <a:endParaRPr lang="ko-KR" altLang="en-US" sz="1400" dirty="0"/>
@@ -15648,7 +15682,7 @@
           <a:p>
             <a:pPr algn="ctr"/>
             <a:r>
-              <a:rPr lang="en-US" altLang="ko-KR" sz="1400" dirty="0" smtClean="0">
+              <a:rPr lang="en-US" altLang="ko-KR" sz="1400" dirty="0">
                 <a:solidFill>
                   <a:srgbClr val="7030A0"/>
                 </a:solidFill>
@@ -15866,7 +15900,7 @@
           <a:p>
             <a:pPr algn="ctr"/>
             <a:r>
-              <a:rPr lang="en-US" altLang="ko-KR" dirty="0" smtClean="0">
+              <a:rPr lang="en-US" altLang="ko-KR" dirty="0">
                 <a:solidFill>
                   <a:srgbClr val="0070C0"/>
                 </a:solidFill>
@@ -15992,7 +16026,7 @@
           <a:p>
             <a:pPr algn="ctr"/>
             <a:r>
-              <a:rPr lang="en-US" altLang="ko-KR" dirty="0" smtClean="0">
+              <a:rPr lang="en-US" altLang="ko-KR" dirty="0">
                 <a:solidFill>
                   <a:srgbClr val="92D050"/>
                 </a:solidFill>
@@ -16043,8 +16077,8 @@
           </a:fontRef>
         </p:style>
       </p:cxnSp>
-      <mc:AlternateContent xmlns:mc="http://schemas.openxmlformats.org/markup-compatibility/2006">
-        <mc:Choice xmlns:a14="http://schemas.microsoft.com/office/drawing/2010/main" Requires="a14">
+      <mc:AlternateContent xmlns:mc="http://schemas.openxmlformats.org/markup-compatibility/2006" xmlns:a14="http://schemas.microsoft.com/office/drawing/2010/main">
+        <mc:Choice Requires="a14">
           <p:sp>
             <p:nvSpPr>
               <p:cNvPr id="28" name="직사각형 27"/>
@@ -16119,7 +16153,7 @@
             </p:txBody>
           </p:sp>
         </mc:Choice>
-        <mc:Fallback>
+        <mc:Fallback xmlns="">
           <p:sp>
             <p:nvSpPr>
               <p:cNvPr id="28" name="직사각형 27"/>
@@ -16194,7 +16228,7 @@
           <a:p>
             <a:pPr algn="ctr"/>
             <a:r>
-              <a:rPr lang="en-US" altLang="ko-KR" dirty="0" smtClean="0">
+              <a:rPr lang="en-US" altLang="ko-KR" dirty="0">
                 <a:solidFill>
                   <a:schemeClr val="tx1"/>
                 </a:solidFill>
@@ -16309,7 +16343,7 @@
           <a:lstStyle/>
           <a:p>
             <a:r>
-              <a:rPr lang="en-US" altLang="ko-KR" sz="1200" dirty="0" smtClean="0"/>
+              <a:rPr lang="en-US" altLang="ko-KR" sz="1200" dirty="0"/>
               <a:t>State</a:t>
             </a:r>
             <a:endParaRPr lang="ko-KR" altLang="en-US" sz="1200" dirty="0"/>
@@ -16375,7 +16409,7 @@
           <a:lstStyle/>
           <a:p>
             <a:r>
-              <a:rPr lang="en-US" altLang="ko-KR" sz="1600" dirty="0" smtClean="0">
+              <a:rPr lang="en-US" altLang="ko-KR" sz="1600" dirty="0">
                 <a:solidFill>
                   <a:srgbClr val="92D050"/>
                 </a:solidFill>
@@ -16383,7 +16417,7 @@
               <a:t>Update,      </a:t>
             </a:r>
             <a:r>
-              <a:rPr lang="en-US" altLang="ko-KR" sz="1600" dirty="0" smtClean="0">
+              <a:rPr lang="en-US" altLang="ko-KR" sz="1600" dirty="0">
                 <a:solidFill>
                   <a:srgbClr val="0070C0"/>
                 </a:solidFill>
@@ -16495,7 +16529,7 @@
           <a:p>
             <a:pPr algn="ctr"/>
             <a:r>
-              <a:rPr lang="en-US" altLang="ko-KR" sz="1400" dirty="0" smtClean="0">
+              <a:rPr lang="en-US" altLang="ko-KR" sz="1400" dirty="0">
                 <a:solidFill>
                   <a:srgbClr val="C00000"/>
                 </a:solidFill>
@@ -16675,7 +16709,7 @@
           <a:p>
             <a:pPr algn="ctr"/>
             <a:r>
-              <a:rPr lang="en-US" altLang="ko-KR" dirty="0" smtClean="0">
+              <a:rPr lang="en-US" altLang="ko-KR" dirty="0">
                 <a:solidFill>
                   <a:srgbClr val="0070C0"/>
                 </a:solidFill>
@@ -16839,7 +16873,7 @@
           <a:p>
             <a:pPr algn="ctr"/>
             <a:r>
-              <a:rPr lang="en-US" altLang="ko-KR" dirty="0" smtClean="0">
+              <a:rPr lang="en-US" altLang="ko-KR" dirty="0">
                 <a:solidFill>
                   <a:srgbClr val="92D050"/>
                 </a:solidFill>
@@ -16949,7 +16983,7 @@
           <a:p>
             <a:pPr algn="ctr"/>
             <a:r>
-              <a:rPr lang="en-US" altLang="ko-KR" sz="1100" dirty="0" smtClean="0"/>
+              <a:rPr lang="en-US" altLang="ko-KR" sz="1100" dirty="0"/>
               <a:t>Soft Update</a:t>
             </a:r>
             <a:endParaRPr lang="ko-KR" altLang="en-US" sz="1100" dirty="0"/>
@@ -17041,7 +17075,7 @@
           <a:p>
             <a:pPr algn="ctr"/>
             <a:r>
-              <a:rPr lang="en-US" altLang="ko-KR" sz="3600" dirty="0" smtClean="0"/>
+              <a:rPr lang="en-US" altLang="ko-KR" sz="3600" dirty="0"/>
               <a:t>Thank you</a:t>
             </a:r>
             <a:endParaRPr lang="ko-KR" altLang="en-US" sz="3600" dirty="0"/>
@@ -17189,20 +17223,16 @@
           <a:p>
             <a:pPr lvl="1"/>
             <a:r>
-              <a:rPr lang="en-US" altLang="ko-KR" dirty="0" smtClean="0"/>
+              <a:rPr lang="en-US" altLang="ko-KR" dirty="0"/>
               <a:t>3x3Grid/</a:t>
             </a:r>
             <a:r>
-              <a:rPr lang="en-US" altLang="ko-KR" dirty="0" err="1" smtClean="0"/>
+              <a:rPr lang="en-US" altLang="ko-KR" dirty="0" err="1"/>
               <a:t>Dunsan</a:t>
             </a:r>
             <a:r>
-              <a:rPr lang="en-US" altLang="ko-KR" dirty="0" smtClean="0"/>
-              <a:t> </a:t>
-            </a:r>
-            <a:r>
               <a:rPr lang="en-US" altLang="ko-KR" dirty="0"/>
-              <a:t>Decentralized</a:t>
+              <a:t> Decentralized</a:t>
             </a:r>
             <a:r>
               <a:rPr lang="ko-KR" altLang="en-US" dirty="0"/>
@@ -17237,15 +17267,7 @@
             </a:r>
             <a:r>
               <a:rPr lang="en-US" altLang="ko-KR" dirty="0"/>
-              <a:t> </a:t>
-            </a:r>
-            <a:r>
-              <a:rPr lang="en-US" altLang="ko-KR" dirty="0" smtClean="0"/>
-              <a:t>Decentralized CNN/CNN-reduced </a:t>
-            </a:r>
-            <a:r>
-              <a:rPr lang="en-US" altLang="ko-KR" dirty="0"/>
-              <a:t>Model with Practical Restraints</a:t>
+              <a:t> Decentralized CNN/CNN-reduced Model with Practical Restraints</a:t>
             </a:r>
           </a:p>
           <a:p>
@@ -17270,19 +17292,7 @@
             <a:pPr lvl="1"/>
             <a:r>
               <a:rPr lang="en-US" altLang="ko-KR" dirty="0"/>
-              <a:t>Continuous Action Model with </a:t>
-            </a:r>
-            <a:r>
-              <a:rPr lang="en-US" altLang="ko-KR" dirty="0" smtClean="0"/>
-              <a:t>Practical </a:t>
-            </a:r>
-            <a:r>
-              <a:rPr lang="en-US" altLang="ko-KR" dirty="0"/>
-              <a:t>R</a:t>
-            </a:r>
-            <a:r>
-              <a:rPr lang="en-US" altLang="ko-KR" dirty="0" smtClean="0"/>
-              <a:t>estraints</a:t>
+              <a:t>Continuous Action Model with Practical Restraints</a:t>
             </a:r>
             <a:endParaRPr lang="ko-KR" altLang="en-US" dirty="0"/>
           </a:p>
@@ -18305,21 +18315,8 @@
             <a:pPr lvl="1"/>
             <a:r>
               <a:rPr lang="en-US" altLang="ko-KR" dirty="0"/>
-              <a:t>Update </a:t>
-            </a:r>
-            <a:r>
-              <a:rPr lang="en-US" altLang="ko-KR" dirty="0" smtClean="0"/>
-              <a:t>phase demand(# of vehicles inflow) </a:t>
-            </a:r>
-            <a:r>
-              <a:rPr lang="en-US" altLang="ko-KR" dirty="0"/>
-              <a:t>from end of </a:t>
-            </a:r>
-            <a:r>
-              <a:rPr lang="en-US" altLang="ko-KR" dirty="0" smtClean="0"/>
-              <a:t>phase period</a:t>
-            </a:r>
-            <a:endParaRPr lang="en-US" altLang="ko-KR" dirty="0"/>
+              <a:t>Update phase demand(# of vehicles inflow) from end of phase period</a:t>
+            </a:r>
           </a:p>
           <a:p>
             <a:pPr lvl="1"/>
@@ -18458,13 +18455,8 @@
                 <a:pPr lvl="1"/>
                 <a:r>
                   <a:rPr lang="en-US" altLang="ko-KR" dirty="0"/>
-                  <a:t>Common phase-based ratio discrete </a:t>
+                  <a:t>Common phase-based ratio discrete distribution</a:t>
                 </a:r>
-                <a:r>
-                  <a:rPr lang="en-US" altLang="ko-KR" dirty="0" smtClean="0"/>
-                  <a:t>distribution</a:t>
-                </a:r>
-                <a:endParaRPr lang="en-US" altLang="ko-KR" dirty="0"/>
               </a:p>
               <a:p>
                 <a:pPr lvl="1"/>
@@ -18701,23 +18693,7 @@
                 <a:pPr lvl="1"/>
                 <a:r>
                   <a:rPr lang="en-US" altLang="ko-KR" dirty="0"/>
-                  <a:t>Rate action space: </a:t>
-                </a:r>
-                <a:r>
-                  <a:rPr lang="en-US" altLang="ko-KR" dirty="0" smtClean="0"/>
-                  <a:t>17, </a:t>
-                </a:r>
-                <a:r>
-                  <a:rPr lang="en-US" altLang="ko-KR" dirty="0"/>
-                  <a:t>distributing time </a:t>
-                </a:r>
-                <a:r>
-                  <a:rPr lang="en-US" altLang="ko-KR" dirty="0" smtClean="0"/>
-                  <a:t>to each phase </a:t>
-                </a:r>
-                <a:r>
-                  <a:rPr lang="en-US" altLang="ko-KR" dirty="0"/>
-                  <a:t>ex) [0,1,0,-1],[0,0,0,0],[1,1,-1,-1]</a:t>
+                  <a:t>Rate action space: 17, distributing time to each phase ex) [0,1,0,-1],[0,0,0,0],[1,1,-1,-1]</a:t>
                 </a:r>
               </a:p>
               <a:p>
@@ -18760,13 +18736,8 @@
                 <a:pPr lvl="1"/>
                 <a:r>
                   <a:rPr lang="en-US" altLang="ko-KR" dirty="0"/>
-                  <a:t>Update end of </a:t>
+                  <a:t>Update end of each phase</a:t>
                 </a:r>
-                <a:r>
-                  <a:rPr lang="en-US" altLang="ko-KR" dirty="0" smtClean="0"/>
-                  <a:t>each phase</a:t>
-                </a:r>
-                <a:endParaRPr lang="en-US" altLang="ko-KR" dirty="0"/>
               </a:p>
             </p:txBody>
           </p:sp>
@@ -18913,7 +18884,7 @@
           <a:lstStyle/>
           <a:p>
             <a:r>
-              <a:rPr lang="en-US" altLang="ko-KR" dirty="0" smtClean="0"/>
+              <a:rPr lang="en-US" altLang="ko-KR" dirty="0"/>
               <a:t>RL Modeling</a:t>
             </a:r>
             <a:endParaRPr lang="ko-KR" altLang="en-US" dirty="0"/>
@@ -18956,7 +18927,7 @@
           <a:p>
             <a:pPr algn="ctr"/>
             <a:r>
-              <a:rPr lang="en-US" altLang="ko-KR" dirty="0" smtClean="0">
+              <a:rPr lang="en-US" altLang="ko-KR" dirty="0">
                 <a:solidFill>
                   <a:schemeClr val="tx1"/>
                 </a:solidFill>
@@ -19016,7 +18987,7 @@
           <a:p>
             <a:pPr algn="ctr"/>
             <a:r>
-              <a:rPr lang="en-US" altLang="ko-KR" dirty="0" smtClean="0">
+              <a:rPr lang="en-US" altLang="ko-KR" dirty="0">
                 <a:solidFill>
                   <a:schemeClr val="tx1"/>
                 </a:solidFill>
@@ -19103,7 +19074,7 @@
           <a:p>
             <a:pPr algn="ctr"/>
             <a:r>
-              <a:rPr lang="en-US" altLang="ko-KR" sz="1600" dirty="0" smtClean="0">
+              <a:rPr lang="en-US" altLang="ko-KR" sz="1600" dirty="0">
                 <a:solidFill>
                   <a:schemeClr val="tx1"/>
                 </a:solidFill>
@@ -19111,14 +19082,14 @@
               <a:t>Neural Net</a:t>
             </a:r>
             <a:br>
-              <a:rPr lang="en-US" altLang="ko-KR" sz="1600" dirty="0" smtClean="0">
+              <a:rPr lang="en-US" altLang="ko-KR" sz="1600" dirty="0">
                 <a:solidFill>
                   <a:schemeClr val="tx1"/>
                 </a:solidFill>
               </a:rPr>
             </a:br>
             <a:r>
-              <a:rPr lang="en-US" altLang="ko-KR" sz="1600" dirty="0" smtClean="0">
+              <a:rPr lang="en-US" altLang="ko-KR" sz="1600" dirty="0">
                 <a:solidFill>
                   <a:schemeClr val="tx1"/>
                 </a:solidFill>
@@ -19126,7 +19097,7 @@
               <a:t>(shared </a:t>
             </a:r>
             <a:r>
-              <a:rPr lang="en-US" altLang="ko-KR" sz="1600" dirty="0" err="1" smtClean="0">
+              <a:rPr lang="en-US" altLang="ko-KR" sz="1600" dirty="0" err="1">
                 <a:solidFill>
                   <a:schemeClr val="tx1"/>
                 </a:solidFill>
@@ -19134,7 +19105,7 @@
               <a:t>params</a:t>
             </a:r>
             <a:r>
-              <a:rPr lang="en-US" altLang="ko-KR" sz="1600" dirty="0" smtClean="0">
+              <a:rPr lang="en-US" altLang="ko-KR" sz="1600" dirty="0">
                 <a:solidFill>
                   <a:schemeClr val="tx1"/>
                 </a:solidFill>
@@ -19319,7 +19290,7 @@
             <a:p>
               <a:pPr algn="ctr"/>
               <a:r>
-                <a:rPr lang="en-US" altLang="ko-KR" dirty="0" smtClean="0">
+                <a:rPr lang="en-US" altLang="ko-KR" dirty="0">
                   <a:solidFill>
                     <a:schemeClr val="tx1"/>
                   </a:solidFill>
@@ -19379,7 +19350,7 @@
             <a:p>
               <a:pPr algn="ctr"/>
               <a:r>
-                <a:rPr lang="en-US" altLang="ko-KR" dirty="0" smtClean="0">
+                <a:rPr lang="en-US" altLang="ko-KR" dirty="0">
                   <a:solidFill>
                     <a:schemeClr val="tx1"/>
                   </a:solidFill>
@@ -19439,7 +19410,7 @@
             <a:p>
               <a:pPr algn="ctr"/>
               <a:r>
-                <a:rPr lang="en-US" altLang="ko-KR" dirty="0" smtClean="0">
+                <a:rPr lang="en-US" altLang="ko-KR" dirty="0">
                   <a:solidFill>
                     <a:schemeClr val="tx1"/>
                   </a:solidFill>
@@ -19499,7 +19470,7 @@
             <a:p>
               <a:pPr algn="ctr"/>
               <a:r>
-                <a:rPr lang="en-US" altLang="ko-KR" dirty="0" smtClean="0">
+                <a:rPr lang="en-US" altLang="ko-KR" dirty="0">
                   <a:solidFill>
                     <a:schemeClr val="tx1"/>
                   </a:solidFill>
@@ -19578,7 +19549,7 @@
               <a:lstStyle/>
               <a:p>
                 <a:r>
-                  <a:rPr lang="en-US" altLang="ko-KR" b="0" dirty="0" smtClean="0"/>
+                  <a:rPr lang="en-US" altLang="ko-KR" b="0" dirty="0"/>
                   <a:t>Action: </a:t>
                 </a:r>
                 <a14:m>
@@ -19698,7 +19669,7 @@
           <a:p>
             <a:pPr algn="ctr"/>
             <a:r>
-              <a:rPr lang="en-US" altLang="ko-KR" dirty="0" smtClean="0">
+              <a:rPr lang="en-US" altLang="ko-KR" dirty="0">
                 <a:solidFill>
                   <a:schemeClr val="tx1"/>
                 </a:solidFill>
@@ -19772,7 +19743,7 @@
           <a:lstStyle/>
           <a:p>
             <a:r>
-              <a:rPr lang="en-US" altLang="ko-KR" sz="1600" dirty="0" err="1" smtClean="0"/>
+              <a:rPr lang="en-US" altLang="ko-KR" sz="1600" dirty="0" err="1"/>
               <a:t>TL_Period</a:t>
             </a:r>
             <a:endParaRPr lang="ko-KR" altLang="en-US" sz="1600" dirty="0"/>
@@ -19878,7 +19849,7 @@
               <a:lstStyle/>
               <a:p>
                 <a:r>
-                  <a:rPr lang="en-US" altLang="ko-KR" sz="1600" dirty="0" smtClean="0"/>
+                  <a:rPr lang="en-US" altLang="ko-KR" sz="1600" dirty="0"/>
                   <a:t>Reward: </a:t>
                 </a:r>
                 <a14:m>
@@ -19987,11 +19958,11 @@
               <a:lstStyle/>
               <a:p>
                 <a:r>
-                  <a:rPr lang="en-US" altLang="ko-KR" dirty="0" smtClean="0"/>
+                  <a:rPr lang="en-US" altLang="ko-KR" dirty="0"/>
                   <a:t>State</a:t>
                 </a:r>
                 <a:r>
-                  <a:rPr lang="en-US" altLang="ko-KR" b="0" dirty="0" smtClean="0"/>
+                  <a:rPr lang="en-US" altLang="ko-KR" b="0" dirty="0"/>
                   <a:t>:</a:t>
                 </a:r>
                 <a14:m>
@@ -20222,11 +20193,11 @@
               <a:t> </a:t>
             </a:r>
             <a:r>
-              <a:rPr lang="en-US" altLang="ko-KR" dirty="0" smtClean="0"/>
+              <a:rPr lang="en-US" altLang="ko-KR" dirty="0"/>
               <a:t>Restraints</a:t>
             </a:r>
             <a:br>
-              <a:rPr lang="en-US" altLang="ko-KR" dirty="0" smtClean="0"/>
+              <a:rPr lang="en-US" altLang="ko-KR" dirty="0"/>
             </a:br>
             <a:endParaRPr lang="ko-KR" altLang="en-US" dirty="0"/>
           </a:p>
@@ -20248,7 +20219,7 @@
           <a:lstStyle/>
           <a:p>
             <a:r>
-              <a:rPr lang="en-US" altLang="ko-KR" dirty="0" smtClean="0"/>
+              <a:rPr lang="en-US" altLang="ko-KR" dirty="0"/>
               <a:t>DNN Modeling</a:t>
             </a:r>
             <a:endParaRPr lang="ko-KR" altLang="en-US" dirty="0"/>
@@ -25588,14 +25559,14 @@
           <a:lstStyle/>
           <a:p>
             <a:r>
-              <a:rPr lang="en-US" altLang="ko-KR" sz="1600" dirty="0" smtClean="0"/>
+              <a:rPr lang="en-US" altLang="ko-KR" sz="1600" dirty="0"/>
               <a:t>Vehicle Info</a:t>
             </a:r>
             <a:br>
-              <a:rPr lang="en-US" altLang="ko-KR" sz="1600" dirty="0" smtClean="0"/>
+              <a:rPr lang="en-US" altLang="ko-KR" sz="1600" dirty="0"/>
             </a:br>
             <a:r>
-              <a:rPr lang="en-US" altLang="ko-KR" sz="1600" dirty="0" smtClean="0"/>
+              <a:rPr lang="en-US" altLang="ko-KR" sz="1600" dirty="0"/>
               <a:t>from Traci</a:t>
             </a:r>
             <a:endParaRPr lang="ko-KR" altLang="en-US" sz="1600" dirty="0"/>
@@ -25695,14 +25666,14 @@
           <a:lstStyle/>
           <a:p>
             <a:r>
-              <a:rPr lang="en-US" altLang="ko-KR" sz="1600" dirty="0" smtClean="0"/>
+              <a:rPr lang="en-US" altLang="ko-KR" sz="1600" dirty="0"/>
               <a:t>Left</a:t>
             </a:r>
             <a:br>
-              <a:rPr lang="en-US" altLang="ko-KR" sz="1600" dirty="0" smtClean="0"/>
+              <a:rPr lang="en-US" altLang="ko-KR" sz="1600" dirty="0"/>
             </a:br>
             <a:r>
-              <a:rPr lang="en-US" altLang="ko-KR" sz="1600" dirty="0" smtClean="0"/>
+              <a:rPr lang="en-US" altLang="ko-KR" sz="1600" dirty="0"/>
               <a:t>Straight</a:t>
             </a:r>
             <a:endParaRPr lang="ko-KR" altLang="en-US" sz="1600" dirty="0"/>
@@ -25766,7 +25737,7 @@
           <a:p>
             <a:pPr algn="ctr"/>
             <a:r>
-              <a:rPr lang="en-US" altLang="ko-KR" sz="1600" dirty="0" smtClean="0">
+              <a:rPr lang="en-US" altLang="ko-KR" sz="1600" dirty="0">
                 <a:solidFill>
                   <a:srgbClr val="92D050"/>
                 </a:solidFill>
@@ -25838,14 +25809,14 @@
           <a:p>
             <a:pPr algn="ctr"/>
             <a:r>
-              <a:rPr lang="en-US" altLang="ko-KR" sz="1000" dirty="0" smtClean="0"/>
+              <a:rPr lang="en-US" altLang="ko-KR" sz="1000" dirty="0"/>
               <a:t>Intersection </a:t>
             </a:r>
             <a:br>
-              <a:rPr lang="en-US" altLang="ko-KR" sz="1000" dirty="0" smtClean="0"/>
+              <a:rPr lang="en-US" altLang="ko-KR" sz="1000" dirty="0"/>
             </a:br>
             <a:r>
-              <a:rPr lang="en-US" altLang="ko-KR" sz="1000" dirty="0" smtClean="0"/>
+              <a:rPr lang="en-US" altLang="ko-KR" sz="1000" dirty="0"/>
               <a:t>Traffic Demand</a:t>
             </a:r>
             <a:endParaRPr lang="ko-KR" altLang="en-US" sz="1000" dirty="0"/>
@@ -25876,7 +25847,7 @@
           <a:p>
             <a:pPr algn="ctr"/>
             <a:r>
-              <a:rPr lang="en-US" altLang="ko-KR" sz="1600" dirty="0" smtClean="0">
+              <a:rPr lang="en-US" altLang="ko-KR" sz="1600" dirty="0">
                 <a:solidFill>
                   <a:srgbClr val="92D050"/>
                 </a:solidFill>
@@ -25887,7 +25858,7 @@
           <a:p>
             <a:pPr algn="ctr"/>
             <a:r>
-              <a:rPr lang="en-US" altLang="ko-KR" sz="1600" dirty="0" smtClean="0">
+              <a:rPr lang="en-US" altLang="ko-KR" sz="1600" dirty="0">
                 <a:solidFill>
                   <a:srgbClr val="92D050"/>
                 </a:solidFill>
@@ -25926,7 +25897,7 @@
           <a:p>
             <a:pPr algn="ctr"/>
             <a:r>
-              <a:rPr lang="en-US" altLang="ko-KR" sz="1000" dirty="0" smtClean="0"/>
+              <a:rPr lang="en-US" altLang="ko-KR" sz="1000" dirty="0"/>
               <a:t>Super Q Network</a:t>
             </a:r>
             <a:endParaRPr lang="ko-KR" altLang="en-US" sz="1000" dirty="0"/>
@@ -25957,7 +25928,7 @@
           <a:p>
             <a:pPr algn="ctr"/>
             <a:r>
-              <a:rPr lang="en-US" altLang="ko-KR" sz="1000" dirty="0" smtClean="0"/>
+              <a:rPr lang="en-US" altLang="ko-KR" sz="1000" dirty="0"/>
               <a:t>Time Q Network</a:t>
             </a:r>
             <a:endParaRPr lang="ko-KR" altLang="en-US" sz="1000" dirty="0"/>
@@ -25989,11 +25960,7 @@
             <a:pPr algn="ctr"/>
             <a:r>
               <a:rPr lang="en-US" altLang="ko-KR" sz="1000" dirty="0"/>
-              <a:t>R</a:t>
-            </a:r>
-            <a:r>
-              <a:rPr lang="en-US" altLang="ko-KR" sz="1000" dirty="0" smtClean="0"/>
-              <a:t>ate Q Network</a:t>
+              <a:t>Rate Q Network</a:t>
             </a:r>
             <a:endParaRPr lang="ko-KR" altLang="en-US" sz="1000" dirty="0"/>
           </a:p>
@@ -26023,7 +25990,7 @@
           <a:p>
             <a:pPr algn="ctr"/>
             <a:r>
-              <a:rPr lang="en-US" altLang="ko-KR" sz="1400" dirty="0" smtClean="0">
+              <a:rPr lang="en-US" altLang="ko-KR" sz="1400" dirty="0">
                 <a:solidFill>
                   <a:srgbClr val="C00000"/>
                 </a:solidFill>
@@ -26031,7 +25998,7 @@
               <a:t>Neural Net (Shared </a:t>
             </a:r>
             <a:r>
-              <a:rPr lang="en-US" altLang="ko-KR" sz="1400" dirty="0" err="1" smtClean="0">
+              <a:rPr lang="en-US" altLang="ko-KR" sz="1400" dirty="0" err="1">
                 <a:solidFill>
                   <a:srgbClr val="C00000"/>
                 </a:solidFill>
@@ -26039,7 +26006,7 @@
               <a:t>Params</a:t>
             </a:r>
             <a:r>
-              <a:rPr lang="en-US" altLang="ko-KR" sz="1400" dirty="0" smtClean="0">
+              <a:rPr lang="en-US" altLang="ko-KR" sz="1400" dirty="0">
                 <a:solidFill>
                   <a:srgbClr val="C00000"/>
                 </a:solidFill>
@@ -26186,15 +26153,15 @@
           <a:p>
             <a:pPr algn="ctr"/>
             <a:r>
-              <a:rPr lang="en-US" altLang="ko-KR" sz="1000" dirty="0" err="1" smtClean="0"/>
+              <a:rPr lang="en-US" altLang="ko-KR" sz="1000" dirty="0" err="1"/>
               <a:t>argmaxQ</a:t>
             </a:r>
             <a:r>
-              <a:rPr lang="en-US" altLang="ko-KR" sz="1000" dirty="0" smtClean="0"/>
+              <a:rPr lang="en-US" altLang="ko-KR" sz="1000" dirty="0"/>
               <a:t> = </a:t>
             </a:r>
             <a:r>
-              <a:rPr lang="en-US" altLang="ko-KR" sz="1100" b="1" dirty="0" smtClean="0">
+              <a:rPr lang="en-US" altLang="ko-KR" sz="1100" b="1" dirty="0">
                 <a:solidFill>
                   <a:srgbClr val="00B050"/>
                 </a:solidFill>
@@ -26233,15 +26200,15 @@
           <a:p>
             <a:pPr algn="ctr"/>
             <a:r>
-              <a:rPr lang="en-US" altLang="ko-KR" sz="1000" dirty="0" err="1" smtClean="0"/>
+              <a:rPr lang="en-US" altLang="ko-KR" sz="1000" dirty="0" err="1"/>
               <a:t>argmaxQ</a:t>
             </a:r>
             <a:r>
-              <a:rPr lang="en-US" altLang="ko-KR" sz="1000" dirty="0" smtClean="0"/>
+              <a:rPr lang="en-US" altLang="ko-KR" sz="1000" dirty="0"/>
               <a:t> = </a:t>
             </a:r>
             <a:r>
-              <a:rPr lang="en-US" altLang="ko-KR" sz="1100" b="1" dirty="0" smtClean="0">
+              <a:rPr lang="en-US" altLang="ko-KR" sz="1100" b="1" dirty="0">
                 <a:solidFill>
                   <a:srgbClr val="00B050"/>
                 </a:solidFill>
@@ -26265,14 +26232,14 @@
           <p:nvPr>
             <p:extLst>
               <p:ext uri="{D42A27DB-BD31-4B8C-83A1-F6EECF244321}">
-                <p14:modId xmlns:p14="http://schemas.microsoft.com/office/powerpoint/2010/main" val="2153856663"/>
+                <p14:modId xmlns:p14="http://schemas.microsoft.com/office/powerpoint/2010/main" val="996429084"/>
               </p:ext>
             </p:extLst>
           </p:nvPr>
         </p:nvGraphicFramePr>
         <p:xfrm>
           <a:off x="7445644" y="1506808"/>
-          <a:ext cx="1771973" cy="1384035"/>
+          <a:ext cx="2033916" cy="1384035"/>
         </p:xfrm>
         <a:graphic>
           <a:graphicData uri="http://schemas.openxmlformats.org/drawingml/2006/table">
@@ -26288,7 +26255,7 @@
                     </a:ext>
                   </a:extLst>
                 </a:gridCol>
-                <a:gridCol w="968644">
+                <a:gridCol w="1230587">
                   <a:extLst>
                     <a:ext uri="{9D8B030D-6E8A-4147-A177-3AD203B41FA5}">
                       <a16:colId xmlns:a16="http://schemas.microsoft.com/office/drawing/2014/main" val="1315594421"/>
@@ -26304,11 +26271,11 @@
                     <a:p>
                       <a:pPr latinLnBrk="1"/>
                       <a:r>
-                        <a:rPr lang="en-US" altLang="ko-KR" sz="1000" dirty="0" smtClean="0"/>
+                        <a:rPr lang="en-US" altLang="ko-KR" sz="1000" dirty="0"/>
                         <a:t>#</a:t>
                       </a:r>
                       <a:r>
-                        <a:rPr lang="en-US" altLang="ko-KR" sz="1000" baseline="0" dirty="0" smtClean="0"/>
+                        <a:rPr lang="en-US" altLang="ko-KR" sz="1000" baseline="0" dirty="0"/>
                         <a:t> of phase</a:t>
                       </a:r>
                       <a:endParaRPr lang="ko-KR" altLang="en-US" sz="1000" dirty="0"/>
@@ -26323,11 +26290,11 @@
                     <a:p>
                       <a:pPr latinLnBrk="1"/>
                       <a:r>
-                        <a:rPr lang="en-US" altLang="ko-KR" sz="1000" dirty="0" smtClean="0"/>
+                        <a:rPr lang="en-US" altLang="ko-KR" sz="1000" dirty="0"/>
                         <a:t>Action</a:t>
                       </a:r>
                       <a:r>
-                        <a:rPr lang="en-US" altLang="ko-KR" sz="1000" baseline="0" dirty="0" smtClean="0"/>
+                        <a:rPr lang="en-US" altLang="ko-KR" sz="1000" baseline="0" dirty="0"/>
                         <a:t> space</a:t>
                       </a:r>
                       <a:endParaRPr lang="ko-KR" altLang="en-US" sz="1000" dirty="0"/>
@@ -26349,7 +26316,7 @@
                     <a:p>
                       <a:pPr latinLnBrk="1"/>
                       <a:r>
-                        <a:rPr lang="en-US" altLang="ko-KR" sz="1100" dirty="0" smtClean="0"/>
+                        <a:rPr lang="en-US" altLang="ko-KR" sz="1100" dirty="0"/>
                         <a:t>2</a:t>
                       </a:r>
                       <a:endParaRPr lang="ko-KR" altLang="en-US" sz="1100" dirty="0"/>
@@ -26364,7 +26331,7 @@
                     <a:p>
                       <a:pPr latinLnBrk="1"/>
                       <a:r>
-                        <a:rPr lang="en-US" altLang="ko-KR" sz="1100" dirty="0" smtClean="0"/>
+                        <a:rPr lang="en-US" altLang="ko-KR" sz="1100" dirty="0"/>
                         <a:t>2</a:t>
                       </a:r>
                       <a:endParaRPr lang="ko-KR" altLang="en-US" sz="1100" dirty="0"/>
@@ -26386,7 +26353,7 @@
                     <a:p>
                       <a:pPr latinLnBrk="1"/>
                       <a:r>
-                        <a:rPr lang="en-US" altLang="ko-KR" sz="1100" dirty="0" smtClean="0"/>
+                        <a:rPr lang="en-US" altLang="ko-KR" sz="1100" dirty="0"/>
                         <a:t>3</a:t>
                       </a:r>
                       <a:endParaRPr lang="ko-KR" altLang="en-US" sz="1100" dirty="0"/>
@@ -26401,7 +26368,7 @@
                     <a:p>
                       <a:pPr latinLnBrk="1"/>
                       <a:r>
-                        <a:rPr lang="en-US" altLang="ko-KR" sz="1100" dirty="0" smtClean="0"/>
+                        <a:rPr lang="en-US" altLang="ko-KR" sz="1100" dirty="0"/>
                         <a:t>7</a:t>
                       </a:r>
                       <a:endParaRPr lang="ko-KR" altLang="en-US" sz="1100" dirty="0"/>
@@ -26423,7 +26390,7 @@
                     <a:p>
                       <a:pPr latinLnBrk="1"/>
                       <a:r>
-                        <a:rPr lang="en-US" altLang="ko-KR" sz="1100" dirty="0" smtClean="0"/>
+                        <a:rPr lang="en-US" altLang="ko-KR" sz="1100" dirty="0"/>
                         <a:t>4</a:t>
                       </a:r>
                       <a:endParaRPr lang="ko-KR" altLang="en-US" sz="1100" dirty="0"/>
@@ -26438,8 +26405,8 @@
                     <a:p>
                       <a:pPr latinLnBrk="1"/>
                       <a:r>
-                        <a:rPr lang="en-US" altLang="ko-KR" sz="1100" dirty="0" smtClean="0"/>
-                        <a:t>(4C2)*2+4+1</a:t>
+                        <a:rPr lang="en-US" altLang="ko-KR" sz="1100" dirty="0"/>
+                        <a:t>(4C2)*3+1</a:t>
                       </a:r>
                       <a:endParaRPr lang="ko-KR" altLang="en-US" sz="1100" dirty="0"/>
                     </a:p>
@@ -26460,7 +26427,7 @@
                     <a:p>
                       <a:pPr latinLnBrk="1"/>
                       <a:r>
-                        <a:rPr lang="en-US" altLang="ko-KR" sz="1100" dirty="0" smtClean="0"/>
+                        <a:rPr lang="en-US" altLang="ko-KR" sz="1100" dirty="0"/>
                         <a:t>5</a:t>
                       </a:r>
                       <a:endParaRPr lang="ko-KR" altLang="en-US" sz="1100" dirty="0"/>
@@ -26475,7 +26442,7 @@
                     <a:p>
                       <a:pPr latinLnBrk="1"/>
                       <a:r>
-                        <a:rPr lang="en-US" altLang="ko-KR" sz="1100" dirty="0" smtClean="0"/>
+                        <a:rPr lang="en-US" altLang="ko-KR" sz="1100" dirty="0"/>
                         <a:t>5C2+5C4+1</a:t>
                       </a:r>
                       <a:endParaRPr lang="ko-KR" altLang="en-US" sz="1100" dirty="0"/>
@@ -26493,6 +26460,94 @@
           </a:graphicData>
         </a:graphic>
       </p:graphicFrame>
+      <p:cxnSp>
+        <p:nvCxnSpPr>
+          <p:cNvPr id="155" name="직선 화살표 연결선 154">
+            <a:extLst>
+              <a:ext uri="{FF2B5EF4-FFF2-40B4-BE49-F238E27FC236}">
+                <a16:creationId xmlns:a16="http://schemas.microsoft.com/office/drawing/2014/main" id="{457D6ADF-DFA0-4CB1-A872-F4C0AB81795A}"/>
+              </a:ext>
+            </a:extLst>
+          </p:cNvPr>
+          <p:cNvCxnSpPr>
+            <a:cxnSpLocks/>
+          </p:cNvCxnSpPr>
+          <p:nvPr/>
+        </p:nvCxnSpPr>
+        <p:spPr>
+          <a:xfrm flipV="1">
+            <a:off x="1821888" y="5131796"/>
+            <a:ext cx="350423" cy="229360"/>
+          </a:xfrm>
+          <a:prstGeom prst="straightConnector1">
+            <a:avLst/>
+          </a:prstGeom>
+          <a:ln w="28575">
+            <a:solidFill>
+              <a:schemeClr val="tx1"/>
+            </a:solidFill>
+            <a:tailEnd type="triangle"/>
+          </a:ln>
+        </p:spPr>
+        <p:style>
+          <a:lnRef idx="1">
+            <a:schemeClr val="dk1"/>
+          </a:lnRef>
+          <a:fillRef idx="0">
+            <a:schemeClr val="dk1"/>
+          </a:fillRef>
+          <a:effectRef idx="0">
+            <a:schemeClr val="dk1"/>
+          </a:effectRef>
+          <a:fontRef idx="minor">
+            <a:schemeClr val="tx1"/>
+          </a:fontRef>
+        </p:style>
+      </p:cxnSp>
+      <p:cxnSp>
+        <p:nvCxnSpPr>
+          <p:cNvPr id="156" name="직선 화살표 연결선 155">
+            <a:extLst>
+              <a:ext uri="{FF2B5EF4-FFF2-40B4-BE49-F238E27FC236}">
+                <a16:creationId xmlns:a16="http://schemas.microsoft.com/office/drawing/2014/main" id="{20512A2F-F5E0-40F7-8A0E-2068ACBB060C}"/>
+              </a:ext>
+            </a:extLst>
+          </p:cNvPr>
+          <p:cNvCxnSpPr>
+            <a:cxnSpLocks/>
+          </p:cNvCxnSpPr>
+          <p:nvPr/>
+        </p:nvCxnSpPr>
+        <p:spPr>
+          <a:xfrm>
+            <a:off x="1913312" y="3694533"/>
+            <a:ext cx="502823" cy="390487"/>
+          </a:xfrm>
+          <a:prstGeom prst="straightConnector1">
+            <a:avLst/>
+          </a:prstGeom>
+          <a:ln w="28575">
+            <a:solidFill>
+              <a:schemeClr val="tx1"/>
+            </a:solidFill>
+            <a:tailEnd type="triangle"/>
+          </a:ln>
+        </p:spPr>
+        <p:style>
+          <a:lnRef idx="1">
+            <a:schemeClr val="dk1"/>
+          </a:lnRef>
+          <a:fillRef idx="0">
+            <a:schemeClr val="dk1"/>
+          </a:fillRef>
+          <a:effectRef idx="0">
+            <a:schemeClr val="dk1"/>
+          </a:effectRef>
+          <a:fontRef idx="minor">
+            <a:schemeClr val="tx1"/>
+          </a:fontRef>
+        </p:style>
+      </p:cxnSp>
     </p:spTree>
     <p:extLst>
       <p:ext uri="{BB962C8B-B14F-4D97-AF65-F5344CB8AC3E}">

</xml_diff>

<commit_message>
change the scale and pptx
</commit_message>
<xml_diff>
--- a/Traffic Optimization Final Speech.pptx
+++ b/Traffic Optimization Final Speech.pptx
@@ -4,6 +4,9 @@
   <p:sldMasterIdLst>
     <p:sldMasterId id="2147483648" r:id="rId1"/>
   </p:sldMasterIdLst>
+  <p:notesMasterIdLst>
+    <p:notesMasterId r:id="rId18"/>
+  </p:notesMasterIdLst>
   <p:sldIdLst>
     <p:sldId id="256" r:id="rId2"/>
     <p:sldId id="257" r:id="rId3"/>
@@ -18,8 +21,9 @@
     <p:sldId id="265" r:id="rId12"/>
     <p:sldId id="269" r:id="rId13"/>
     <p:sldId id="268" r:id="rId14"/>
-    <p:sldId id="270" r:id="rId15"/>
-    <p:sldId id="271" r:id="rId16"/>
+    <p:sldId id="272" r:id="rId15"/>
+    <p:sldId id="270" r:id="rId16"/>
+    <p:sldId id="271" r:id="rId17"/>
   </p:sldIdLst>
   <p:sldSz cx="12192000" cy="6858000"/>
   <p:notesSz cx="6858000" cy="9144000"/>
@@ -124,6 +128,450 @@
     </p:ext>
   </p:extLst>
 </p:presentation>
+</file>
+
+<file path=ppt/notesMasters/notesMaster1.xml><?xml version="1.0" encoding="utf-8"?>
+<p:notesMaster xmlns:a="http://schemas.openxmlformats.org/drawingml/2006/main" xmlns:r="http://schemas.openxmlformats.org/officeDocument/2006/relationships" xmlns:p="http://schemas.openxmlformats.org/presentationml/2006/main">
+  <p:cSld>
+    <p:bg>
+      <p:bgRef idx="1001">
+        <a:schemeClr val="bg1"/>
+      </p:bgRef>
+    </p:bg>
+    <p:spTree>
+      <p:nvGrpSpPr>
+        <p:cNvPr id="1" name=""/>
+        <p:cNvGrpSpPr/>
+        <p:nvPr/>
+      </p:nvGrpSpPr>
+      <p:grpSpPr>
+        <a:xfrm>
+          <a:off x="0" y="0"/>
+          <a:ext cx="0" cy="0"/>
+          <a:chOff x="0" y="0"/>
+          <a:chExt cx="0" cy="0"/>
+        </a:xfrm>
+      </p:grpSpPr>
+      <p:sp>
+        <p:nvSpPr>
+          <p:cNvPr id="2" name="머리글 개체 틀 1"/>
+          <p:cNvSpPr>
+            <a:spLocks noGrp="1"/>
+          </p:cNvSpPr>
+          <p:nvPr>
+            <p:ph type="hdr" sz="quarter"/>
+          </p:nvPr>
+        </p:nvSpPr>
+        <p:spPr>
+          <a:xfrm>
+            <a:off x="0" y="0"/>
+            <a:ext cx="2971800" cy="458788"/>
+          </a:xfrm>
+          <a:prstGeom prst="rect">
+            <a:avLst/>
+          </a:prstGeom>
+        </p:spPr>
+        <p:txBody>
+          <a:bodyPr vert="horz" lIns="91440" tIns="45720" rIns="91440" bIns="45720" rtlCol="0"/>
+          <a:lstStyle>
+            <a:lvl1pPr algn="l">
+              <a:defRPr sz="1200"/>
+            </a:lvl1pPr>
+          </a:lstStyle>
+          <a:p>
+            <a:endParaRPr lang="ko-KR" altLang="en-US"/>
+          </a:p>
+        </p:txBody>
+      </p:sp>
+      <p:sp>
+        <p:nvSpPr>
+          <p:cNvPr id="3" name="날짜 개체 틀 2"/>
+          <p:cNvSpPr>
+            <a:spLocks noGrp="1"/>
+          </p:cNvSpPr>
+          <p:nvPr>
+            <p:ph type="dt" idx="1"/>
+          </p:nvPr>
+        </p:nvSpPr>
+        <p:spPr>
+          <a:xfrm>
+            <a:off x="3884613" y="0"/>
+            <a:ext cx="2971800" cy="458788"/>
+          </a:xfrm>
+          <a:prstGeom prst="rect">
+            <a:avLst/>
+          </a:prstGeom>
+        </p:spPr>
+        <p:txBody>
+          <a:bodyPr vert="horz" lIns="91440" tIns="45720" rIns="91440" bIns="45720" rtlCol="0"/>
+          <a:lstStyle>
+            <a:lvl1pPr algn="r">
+              <a:defRPr sz="1200"/>
+            </a:lvl1pPr>
+          </a:lstStyle>
+          <a:p>
+            <a:fld id="{8A198AF7-132F-4CC2-872B-A0970208147D}" type="datetimeFigureOut">
+              <a:rPr lang="ko-KR" altLang="en-US" smtClean="0"/>
+              <a:t>2021-02-23</a:t>
+            </a:fld>
+            <a:endParaRPr lang="ko-KR" altLang="en-US"/>
+          </a:p>
+        </p:txBody>
+      </p:sp>
+      <p:sp>
+        <p:nvSpPr>
+          <p:cNvPr id="4" name="슬라이드 이미지 개체 틀 3"/>
+          <p:cNvSpPr>
+            <a:spLocks noGrp="1" noRot="1" noChangeAspect="1"/>
+          </p:cNvSpPr>
+          <p:nvPr>
+            <p:ph type="sldImg" idx="2"/>
+          </p:nvPr>
+        </p:nvSpPr>
+        <p:spPr>
+          <a:xfrm>
+            <a:off x="685800" y="1143000"/>
+            <a:ext cx="5486400" cy="3086100"/>
+          </a:xfrm>
+          <a:prstGeom prst="rect">
+            <a:avLst/>
+          </a:prstGeom>
+          <a:noFill/>
+          <a:ln w="12700">
+            <a:solidFill>
+              <a:prstClr val="black"/>
+            </a:solidFill>
+          </a:ln>
+        </p:spPr>
+        <p:txBody>
+          <a:bodyPr vert="horz" lIns="91440" tIns="45720" rIns="91440" bIns="45720" rtlCol="0" anchor="ctr"/>
+          <a:lstStyle/>
+          <a:p>
+            <a:endParaRPr lang="ko-KR" altLang="en-US"/>
+          </a:p>
+        </p:txBody>
+      </p:sp>
+      <p:sp>
+        <p:nvSpPr>
+          <p:cNvPr id="5" name="슬라이드 노트 개체 틀 4"/>
+          <p:cNvSpPr>
+            <a:spLocks noGrp="1"/>
+          </p:cNvSpPr>
+          <p:nvPr>
+            <p:ph type="body" sz="quarter" idx="3"/>
+          </p:nvPr>
+        </p:nvSpPr>
+        <p:spPr>
+          <a:xfrm>
+            <a:off x="685800" y="4400550"/>
+            <a:ext cx="5486400" cy="3600450"/>
+          </a:xfrm>
+          <a:prstGeom prst="rect">
+            <a:avLst/>
+          </a:prstGeom>
+        </p:spPr>
+        <p:txBody>
+          <a:bodyPr vert="horz" lIns="91440" tIns="45720" rIns="91440" bIns="45720" rtlCol="0"/>
+          <a:lstStyle/>
+          <a:p>
+            <a:pPr lvl="0"/>
+            <a:r>
+              <a:rPr lang="ko-KR" altLang="en-US"/>
+              <a:t>마스터 텍스트 스타일을 편집하려면 클릭</a:t>
+            </a:r>
+          </a:p>
+          <a:p>
+            <a:pPr lvl="1"/>
+            <a:r>
+              <a:rPr lang="ko-KR" altLang="en-US"/>
+              <a:t>두 번째 수준</a:t>
+            </a:r>
+          </a:p>
+          <a:p>
+            <a:pPr lvl="2"/>
+            <a:r>
+              <a:rPr lang="ko-KR" altLang="en-US"/>
+              <a:t>세 번째 수준</a:t>
+            </a:r>
+          </a:p>
+          <a:p>
+            <a:pPr lvl="3"/>
+            <a:r>
+              <a:rPr lang="ko-KR" altLang="en-US"/>
+              <a:t>네 번째 수준</a:t>
+            </a:r>
+          </a:p>
+          <a:p>
+            <a:pPr lvl="4"/>
+            <a:r>
+              <a:rPr lang="ko-KR" altLang="en-US"/>
+              <a:t>다섯 번째 수준</a:t>
+            </a:r>
+          </a:p>
+        </p:txBody>
+      </p:sp>
+      <p:sp>
+        <p:nvSpPr>
+          <p:cNvPr id="6" name="바닥글 개체 틀 5"/>
+          <p:cNvSpPr>
+            <a:spLocks noGrp="1"/>
+          </p:cNvSpPr>
+          <p:nvPr>
+            <p:ph type="ftr" sz="quarter" idx="4"/>
+          </p:nvPr>
+        </p:nvSpPr>
+        <p:spPr>
+          <a:xfrm>
+            <a:off x="0" y="8685213"/>
+            <a:ext cx="2971800" cy="458787"/>
+          </a:xfrm>
+          <a:prstGeom prst="rect">
+            <a:avLst/>
+          </a:prstGeom>
+        </p:spPr>
+        <p:txBody>
+          <a:bodyPr vert="horz" lIns="91440" tIns="45720" rIns="91440" bIns="45720" rtlCol="0" anchor="b"/>
+          <a:lstStyle>
+            <a:lvl1pPr algn="l">
+              <a:defRPr sz="1200"/>
+            </a:lvl1pPr>
+          </a:lstStyle>
+          <a:p>
+            <a:endParaRPr lang="ko-KR" altLang="en-US"/>
+          </a:p>
+        </p:txBody>
+      </p:sp>
+      <p:sp>
+        <p:nvSpPr>
+          <p:cNvPr id="7" name="슬라이드 번호 개체 틀 6"/>
+          <p:cNvSpPr>
+            <a:spLocks noGrp="1"/>
+          </p:cNvSpPr>
+          <p:nvPr>
+            <p:ph type="sldNum" sz="quarter" idx="5"/>
+          </p:nvPr>
+        </p:nvSpPr>
+        <p:spPr>
+          <a:xfrm>
+            <a:off x="3884613" y="8685213"/>
+            <a:ext cx="2971800" cy="458787"/>
+          </a:xfrm>
+          <a:prstGeom prst="rect">
+            <a:avLst/>
+          </a:prstGeom>
+        </p:spPr>
+        <p:txBody>
+          <a:bodyPr vert="horz" lIns="91440" tIns="45720" rIns="91440" bIns="45720" rtlCol="0" anchor="b"/>
+          <a:lstStyle>
+            <a:lvl1pPr algn="r">
+              <a:defRPr sz="1200"/>
+            </a:lvl1pPr>
+          </a:lstStyle>
+          <a:p>
+            <a:fld id="{5563B5AA-8C0E-4827-B201-D29427D2AA41}" type="slidenum">
+              <a:rPr lang="ko-KR" altLang="en-US" smtClean="0"/>
+              <a:t>‹#›</a:t>
+            </a:fld>
+            <a:endParaRPr lang="ko-KR" altLang="en-US"/>
+          </a:p>
+        </p:txBody>
+      </p:sp>
+    </p:spTree>
+    <p:extLst>
+      <p:ext uri="{BB962C8B-B14F-4D97-AF65-F5344CB8AC3E}">
+        <p14:creationId xmlns:p14="http://schemas.microsoft.com/office/powerpoint/2010/main" val="2059719469"/>
+      </p:ext>
+    </p:extLst>
+  </p:cSld>
+  <p:clrMap bg1="lt1" tx1="dk1" bg2="lt2" tx2="dk2" accent1="accent1" accent2="accent2" accent3="accent3" accent4="accent4" accent5="accent5" accent6="accent6" hlink="hlink" folHlink="folHlink"/>
+  <p:notesStyle>
+    <a:lvl1pPr marL="0" algn="l" defTabSz="914400" rtl="0" eaLnBrk="1" latinLnBrk="1" hangingPunct="1">
+      <a:defRPr sz="1200" kern="1200">
+        <a:solidFill>
+          <a:schemeClr val="tx1"/>
+        </a:solidFill>
+        <a:latin typeface="+mn-lt"/>
+        <a:ea typeface="+mn-ea"/>
+        <a:cs typeface="+mn-cs"/>
+      </a:defRPr>
+    </a:lvl1pPr>
+    <a:lvl2pPr marL="457200" algn="l" defTabSz="914400" rtl="0" eaLnBrk="1" latinLnBrk="1" hangingPunct="1">
+      <a:defRPr sz="1200" kern="1200">
+        <a:solidFill>
+          <a:schemeClr val="tx1"/>
+        </a:solidFill>
+        <a:latin typeface="+mn-lt"/>
+        <a:ea typeface="+mn-ea"/>
+        <a:cs typeface="+mn-cs"/>
+      </a:defRPr>
+    </a:lvl2pPr>
+    <a:lvl3pPr marL="914400" algn="l" defTabSz="914400" rtl="0" eaLnBrk="1" latinLnBrk="1" hangingPunct="1">
+      <a:defRPr sz="1200" kern="1200">
+        <a:solidFill>
+          <a:schemeClr val="tx1"/>
+        </a:solidFill>
+        <a:latin typeface="+mn-lt"/>
+        <a:ea typeface="+mn-ea"/>
+        <a:cs typeface="+mn-cs"/>
+      </a:defRPr>
+    </a:lvl3pPr>
+    <a:lvl4pPr marL="1371600" algn="l" defTabSz="914400" rtl="0" eaLnBrk="1" latinLnBrk="1" hangingPunct="1">
+      <a:defRPr sz="1200" kern="1200">
+        <a:solidFill>
+          <a:schemeClr val="tx1"/>
+        </a:solidFill>
+        <a:latin typeface="+mn-lt"/>
+        <a:ea typeface="+mn-ea"/>
+        <a:cs typeface="+mn-cs"/>
+      </a:defRPr>
+    </a:lvl4pPr>
+    <a:lvl5pPr marL="1828800" algn="l" defTabSz="914400" rtl="0" eaLnBrk="1" latinLnBrk="1" hangingPunct="1">
+      <a:defRPr sz="1200" kern="1200">
+        <a:solidFill>
+          <a:schemeClr val="tx1"/>
+        </a:solidFill>
+        <a:latin typeface="+mn-lt"/>
+        <a:ea typeface="+mn-ea"/>
+        <a:cs typeface="+mn-cs"/>
+      </a:defRPr>
+    </a:lvl5pPr>
+    <a:lvl6pPr marL="2286000" algn="l" defTabSz="914400" rtl="0" eaLnBrk="1" latinLnBrk="1" hangingPunct="1">
+      <a:defRPr sz="1200" kern="1200">
+        <a:solidFill>
+          <a:schemeClr val="tx1"/>
+        </a:solidFill>
+        <a:latin typeface="+mn-lt"/>
+        <a:ea typeface="+mn-ea"/>
+        <a:cs typeface="+mn-cs"/>
+      </a:defRPr>
+    </a:lvl6pPr>
+    <a:lvl7pPr marL="2743200" algn="l" defTabSz="914400" rtl="0" eaLnBrk="1" latinLnBrk="1" hangingPunct="1">
+      <a:defRPr sz="1200" kern="1200">
+        <a:solidFill>
+          <a:schemeClr val="tx1"/>
+        </a:solidFill>
+        <a:latin typeface="+mn-lt"/>
+        <a:ea typeface="+mn-ea"/>
+        <a:cs typeface="+mn-cs"/>
+      </a:defRPr>
+    </a:lvl7pPr>
+    <a:lvl8pPr marL="3200400" algn="l" defTabSz="914400" rtl="0" eaLnBrk="1" latinLnBrk="1" hangingPunct="1">
+      <a:defRPr sz="1200" kern="1200">
+        <a:solidFill>
+          <a:schemeClr val="tx1"/>
+        </a:solidFill>
+        <a:latin typeface="+mn-lt"/>
+        <a:ea typeface="+mn-ea"/>
+        <a:cs typeface="+mn-cs"/>
+      </a:defRPr>
+    </a:lvl8pPr>
+    <a:lvl9pPr marL="3657600" algn="l" defTabSz="914400" rtl="0" eaLnBrk="1" latinLnBrk="1" hangingPunct="1">
+      <a:defRPr sz="1200" kern="1200">
+        <a:solidFill>
+          <a:schemeClr val="tx1"/>
+        </a:solidFill>
+        <a:latin typeface="+mn-lt"/>
+        <a:ea typeface="+mn-ea"/>
+        <a:cs typeface="+mn-cs"/>
+      </a:defRPr>
+    </a:lvl9pPr>
+  </p:notesStyle>
+</p:notesMaster>
+</file>
+
+<file path=ppt/notesSlides/notesSlide1.xml><?xml version="1.0" encoding="utf-8"?>
+<p:notes xmlns:a="http://schemas.openxmlformats.org/drawingml/2006/main" xmlns:r="http://schemas.openxmlformats.org/officeDocument/2006/relationships" xmlns:p="http://schemas.openxmlformats.org/presentationml/2006/main">
+  <p:cSld>
+    <p:spTree>
+      <p:nvGrpSpPr>
+        <p:cNvPr id="1" name=""/>
+        <p:cNvGrpSpPr/>
+        <p:nvPr/>
+      </p:nvGrpSpPr>
+      <p:grpSpPr>
+        <a:xfrm>
+          <a:off x="0" y="0"/>
+          <a:ext cx="0" cy="0"/>
+          <a:chOff x="0" y="0"/>
+          <a:chExt cx="0" cy="0"/>
+        </a:xfrm>
+      </p:grpSpPr>
+      <p:sp>
+        <p:nvSpPr>
+          <p:cNvPr id="2" name="슬라이드 이미지 개체 틀 1"/>
+          <p:cNvSpPr>
+            <a:spLocks noGrp="1" noRot="1" noChangeAspect="1"/>
+          </p:cNvSpPr>
+          <p:nvPr>
+            <p:ph type="sldImg"/>
+          </p:nvPr>
+        </p:nvSpPr>
+        <p:spPr/>
+      </p:sp>
+      <p:sp>
+        <p:nvSpPr>
+          <p:cNvPr id="3" name="슬라이드 노트 개체 틀 2"/>
+          <p:cNvSpPr>
+            <a:spLocks noGrp="1"/>
+          </p:cNvSpPr>
+          <p:nvPr>
+            <p:ph type="body" idx="1"/>
+          </p:nvPr>
+        </p:nvSpPr>
+        <p:spPr/>
+        <p:txBody>
+          <a:bodyPr/>
+          <a:lstStyle/>
+          <a:p>
+            <a:r>
+              <a:rPr lang="ko-KR" altLang="en-US" dirty="0"/>
+              <a:t>어떤 기준으로 평균속도와 </a:t>
+            </a:r>
+            <a:r>
+              <a:rPr lang="en-US" altLang="ko-KR" dirty="0"/>
+              <a:t>Travel time</a:t>
+            </a:r>
+            <a:r>
+              <a:rPr lang="ko-KR" altLang="en-US" dirty="0"/>
+              <a:t>을 결정하게 되었는지 작성해주어야 함</a:t>
+            </a:r>
+          </a:p>
+        </p:txBody>
+      </p:sp>
+      <p:sp>
+        <p:nvSpPr>
+          <p:cNvPr id="4" name="슬라이드 번호 개체 틀 3"/>
+          <p:cNvSpPr>
+            <a:spLocks noGrp="1"/>
+          </p:cNvSpPr>
+          <p:nvPr>
+            <p:ph type="sldNum" sz="quarter" idx="5"/>
+          </p:nvPr>
+        </p:nvSpPr>
+        <p:spPr/>
+        <p:txBody>
+          <a:bodyPr/>
+          <a:lstStyle/>
+          <a:p>
+            <a:fld id="{5563B5AA-8C0E-4827-B201-D29427D2AA41}" type="slidenum">
+              <a:rPr lang="ko-KR" altLang="en-US" smtClean="0"/>
+              <a:t>13</a:t>
+            </a:fld>
+            <a:endParaRPr lang="ko-KR" altLang="en-US"/>
+          </a:p>
+        </p:txBody>
+      </p:sp>
+    </p:spTree>
+    <p:extLst>
+      <p:ext uri="{BB962C8B-B14F-4D97-AF65-F5344CB8AC3E}">
+        <p14:creationId xmlns:p14="http://schemas.microsoft.com/office/powerpoint/2010/main" val="590092961"/>
+      </p:ext>
+    </p:extLst>
+  </p:cSld>
+  <p:clrMapOvr>
+    <a:masterClrMapping/>
+  </p:clrMapOvr>
+</p:notes>
 </file>
 
 <file path=ppt/slideLayouts/slideLayout1.xml><?xml version="1.0" encoding="utf-8"?>
@@ -849,7 +1297,7 @@
             <a:fld id="{B61BEF0D-F0BB-DE4B-95CE-6DB70DBA9567}" type="datetimeFigureOut">
               <a:rPr lang="en-US" dirty="0"/>
               <a:pPr/>
-              <a:t>2/22/2021</a:t>
+              <a:t>2/23/2021</a:t>
             </a:fld>
             <a:endParaRPr lang="en-US" dirty="0"/>
           </a:p>
@@ -1097,7 +1545,7 @@
             <a:fld id="{B61BEF0D-F0BB-DE4B-95CE-6DB70DBA9567}" type="datetimeFigureOut">
               <a:rPr lang="en-US" dirty="0"/>
               <a:pPr/>
-              <a:t>2/22/2021</a:t>
+              <a:t>2/23/2021</a:t>
             </a:fld>
             <a:endParaRPr lang="en-US" dirty="0"/>
           </a:p>
@@ -1408,7 +1856,7 @@
             <a:fld id="{B61BEF0D-F0BB-DE4B-95CE-6DB70DBA9567}" type="datetimeFigureOut">
               <a:rPr lang="en-US" dirty="0"/>
               <a:pPr/>
-              <a:t>2/22/2021</a:t>
+              <a:t>2/23/2021</a:t>
             </a:fld>
             <a:endParaRPr lang="en-US" dirty="0"/>
           </a:p>
@@ -1746,7 +2194,7 @@
             <a:fld id="{B61BEF0D-F0BB-DE4B-95CE-6DB70DBA9567}" type="datetimeFigureOut">
               <a:rPr lang="en-US" dirty="0"/>
               <a:pPr/>
-              <a:t>2/22/2021</a:t>
+              <a:t>2/23/2021</a:t>
             </a:fld>
             <a:endParaRPr lang="en-US" dirty="0"/>
           </a:p>
@@ -2057,7 +2505,7 @@
             <a:fld id="{B61BEF0D-F0BB-DE4B-95CE-6DB70DBA9567}" type="datetimeFigureOut">
               <a:rPr lang="en-US" dirty="0"/>
               <a:pPr/>
-              <a:t>2/22/2021</a:t>
+              <a:t>2/23/2021</a:t>
             </a:fld>
             <a:endParaRPr lang="en-US" dirty="0"/>
           </a:p>
@@ -2447,7 +2895,7 @@
             <a:fld id="{B61BEF0D-F0BB-DE4B-95CE-6DB70DBA9567}" type="datetimeFigureOut">
               <a:rPr lang="en-US" dirty="0"/>
               <a:pPr/>
-              <a:t>2/22/2021</a:t>
+              <a:t>2/23/2021</a:t>
             </a:fld>
             <a:endParaRPr lang="en-US" dirty="0"/>
           </a:p>
@@ -2613,7 +3061,7 @@
           <a:p>
             <a:fld id="{55C6B4A9-1611-4792-9094-5F34BCA07E0B}" type="datetimeFigureOut">
               <a:rPr lang="en-US" dirty="0"/>
-              <a:t>2/22/2021</a:t>
+              <a:t>2/23/2021</a:t>
             </a:fld>
             <a:endParaRPr lang="en-US" dirty="0"/>
           </a:p>
@@ -2789,7 +3237,7 @@
             <a:fld id="{B61BEF0D-F0BB-DE4B-95CE-6DB70DBA9567}" type="datetimeFigureOut">
               <a:rPr lang="en-US" dirty="0"/>
               <a:pPr/>
-              <a:t>2/22/2021</a:t>
+              <a:t>2/23/2021</a:t>
             </a:fld>
             <a:endParaRPr lang="en-US" dirty="0"/>
           </a:p>
@@ -2999,7 +3447,7 @@
             <a:fld id="{B61BEF0D-F0BB-DE4B-95CE-6DB70DBA9567}" type="datetimeFigureOut">
               <a:rPr lang="en-US" dirty="0"/>
               <a:pPr/>
-              <a:t>2/22/2021</a:t>
+              <a:t>2/23/2021</a:t>
             </a:fld>
             <a:endParaRPr lang="en-US" dirty="0"/>
           </a:p>
@@ -3243,7 +3691,7 @@
             <a:fld id="{B61BEF0D-F0BB-DE4B-95CE-6DB70DBA9567}" type="datetimeFigureOut">
               <a:rPr lang="en-US" dirty="0"/>
               <a:pPr/>
-              <a:t>2/22/2021</a:t>
+              <a:t>2/23/2021</a:t>
             </a:fld>
             <a:endParaRPr lang="en-US" dirty="0"/>
           </a:p>
@@ -3471,7 +3919,7 @@
           <a:p>
             <a:fld id="{EB712588-04B1-427B-82EE-E8DB90309F08}" type="datetimeFigureOut">
               <a:rPr lang="en-US" dirty="0"/>
-              <a:t>2/22/2021</a:t>
+              <a:t>2/23/2021</a:t>
             </a:fld>
             <a:endParaRPr lang="en-US" dirty="0"/>
           </a:p>
@@ -3841,7 +4289,7 @@
             <a:fld id="{B61BEF0D-F0BB-DE4B-95CE-6DB70DBA9567}" type="datetimeFigureOut">
               <a:rPr lang="en-US" dirty="0"/>
               <a:pPr/>
-              <a:t>2/22/2021</a:t>
+              <a:t>2/23/2021</a:t>
             </a:fld>
             <a:endParaRPr lang="en-US" dirty="0"/>
           </a:p>
@@ -3961,7 +4409,7 @@
             <a:fld id="{B61BEF0D-F0BB-DE4B-95CE-6DB70DBA9567}" type="datetimeFigureOut">
               <a:rPr lang="en-US" dirty="0"/>
               <a:pPr/>
-              <a:t>2/22/2021</a:t>
+              <a:t>2/23/2021</a:t>
             </a:fld>
             <a:endParaRPr lang="en-US" dirty="0"/>
           </a:p>
@@ -4053,7 +4501,7 @@
             <a:fld id="{B61BEF0D-F0BB-DE4B-95CE-6DB70DBA9567}" type="datetimeFigureOut">
               <a:rPr lang="en-US" dirty="0"/>
               <a:pPr/>
-              <a:t>2/22/2021</a:t>
+              <a:t>2/23/2021</a:t>
             </a:fld>
             <a:endParaRPr lang="en-US" dirty="0"/>
           </a:p>
@@ -4304,7 +4752,7 @@
           <a:p>
             <a:fld id="{42A54C80-263E-416B-A8E0-580EDEADCBDC}" type="datetimeFigureOut">
               <a:rPr lang="en-US" dirty="0"/>
-              <a:t>2/22/2021</a:t>
+              <a:t>2/23/2021</a:t>
             </a:fld>
             <a:endParaRPr lang="en-US" dirty="0"/>
           </a:p>
@@ -4563,7 +5011,7 @@
             <a:fld id="{B61BEF0D-F0BB-DE4B-95CE-6DB70DBA9567}" type="datetimeFigureOut">
               <a:rPr lang="en-US" dirty="0"/>
               <a:pPr/>
-              <a:t>2/22/2021</a:t>
+              <a:t>2/23/2021</a:t>
             </a:fld>
             <a:endParaRPr lang="en-US" dirty="0"/>
           </a:p>
@@ -5303,7 +5751,7 @@
             <a:fld id="{B61BEF0D-F0BB-DE4B-95CE-6DB70DBA9567}" type="datetimeFigureOut">
               <a:rPr lang="en-US" dirty="0"/>
               <a:pPr/>
-              <a:t>2/22/2021</a:t>
+              <a:t>2/23/2021</a:t>
             </a:fld>
             <a:endParaRPr lang="en-US" dirty="0"/>
           </a:p>
@@ -14275,7 +14723,7 @@
           <p:nvPr/>
         </p:nvPicPr>
         <p:blipFill>
-          <a:blip r:embed="rId2"/>
+          <a:blip r:embed="rId3"/>
           <a:stretch>
             <a:fillRect/>
           </a:stretch>
@@ -14569,7 +15017,7 @@
           <p:nvPr/>
         </p:nvPicPr>
         <p:blipFill>
-          <a:blip r:embed="rId3"/>
+          <a:blip r:embed="rId4"/>
           <a:stretch>
             <a:fillRect/>
           </a:stretch>
@@ -15047,6 +15495,94 @@
       </p:grpSpPr>
       <p:sp>
         <p:nvSpPr>
+          <p:cNvPr id="2" name="제목 1">
+            <a:extLst>
+              <a:ext uri="{FF2B5EF4-FFF2-40B4-BE49-F238E27FC236}">
+                <a16:creationId xmlns:a16="http://schemas.microsoft.com/office/drawing/2014/main" id="{ABA5FE2B-EED1-4FB5-B2AD-2D4278B1CF53}"/>
+              </a:ext>
+            </a:extLst>
+          </p:cNvPr>
+          <p:cNvSpPr>
+            <a:spLocks noGrp="1"/>
+          </p:cNvSpPr>
+          <p:nvPr>
+            <p:ph type="title"/>
+          </p:nvPr>
+        </p:nvSpPr>
+        <p:spPr/>
+        <p:txBody>
+          <a:bodyPr/>
+          <a:lstStyle/>
+          <a:p>
+            <a:endParaRPr lang="ko-KR" altLang="en-US"/>
+          </a:p>
+        </p:txBody>
+      </p:sp>
+      <p:sp>
+        <p:nvSpPr>
+          <p:cNvPr id="3" name="내용 개체 틀 2">
+            <a:extLst>
+              <a:ext uri="{FF2B5EF4-FFF2-40B4-BE49-F238E27FC236}">
+                <a16:creationId xmlns:a16="http://schemas.microsoft.com/office/drawing/2014/main" id="{BBD80C5B-DA85-4796-BFB7-B5080A1D3058}"/>
+              </a:ext>
+            </a:extLst>
+          </p:cNvPr>
+          <p:cNvSpPr>
+            <a:spLocks noGrp="1"/>
+          </p:cNvSpPr>
+          <p:nvPr>
+            <p:ph idx="1"/>
+          </p:nvPr>
+        </p:nvSpPr>
+        <p:spPr/>
+        <p:txBody>
+          <a:bodyPr/>
+          <a:lstStyle/>
+          <a:p>
+            <a:r>
+              <a:rPr lang="ko-KR" altLang="en-US" dirty="0"/>
+              <a:t>안되는 이유</a:t>
+            </a:r>
+            <a:r>
+              <a:rPr lang="en-US" altLang="ko-KR" dirty="0"/>
+              <a:t>?</a:t>
+            </a:r>
+            <a:endParaRPr lang="ko-KR" altLang="en-US" dirty="0"/>
+          </a:p>
+        </p:txBody>
+      </p:sp>
+    </p:spTree>
+    <p:extLst>
+      <p:ext uri="{BB962C8B-B14F-4D97-AF65-F5344CB8AC3E}">
+        <p14:creationId xmlns:p14="http://schemas.microsoft.com/office/powerpoint/2010/main" val="2350156334"/>
+      </p:ext>
+    </p:extLst>
+  </p:cSld>
+  <p:clrMapOvr>
+    <a:masterClrMapping/>
+  </p:clrMapOvr>
+</p:sld>
+</file>
+
+<file path=ppt/slides/slide15.xml><?xml version="1.0" encoding="utf-8"?>
+<p:sld xmlns:a="http://schemas.openxmlformats.org/drawingml/2006/main" xmlns:r="http://schemas.openxmlformats.org/officeDocument/2006/relationships" xmlns:p="http://schemas.openxmlformats.org/presentationml/2006/main">
+  <p:cSld>
+    <p:spTree>
+      <p:nvGrpSpPr>
+        <p:cNvPr id="1" name=""/>
+        <p:cNvGrpSpPr/>
+        <p:nvPr/>
+      </p:nvGrpSpPr>
+      <p:grpSpPr>
+        <a:xfrm>
+          <a:off x="0" y="0"/>
+          <a:ext cx="0" cy="0"/>
+          <a:chOff x="0" y="0"/>
+          <a:chExt cx="0" cy="0"/>
+        </a:xfrm>
+      </p:grpSpPr>
+      <p:sp>
+        <p:nvSpPr>
           <p:cNvPr id="2" name="제목 1"/>
           <p:cNvSpPr>
             <a:spLocks noGrp="1"/>
@@ -15666,7 +16202,7 @@
         </p:nvSpPr>
         <p:spPr>
           <a:xfrm>
-            <a:off x="5907957" y="4122286"/>
+            <a:off x="6455291" y="4111623"/>
             <a:ext cx="3003623" cy="307777"/>
           </a:xfrm>
           <a:prstGeom prst="rect">
@@ -17039,7 +17575,7 @@
 </p:sld>
 </file>
 
-<file path=ppt/slides/slide15.xml><?xml version="1.0" encoding="utf-8"?>
+<file path=ppt/slides/slide16.xml><?xml version="1.0" encoding="utf-8"?>
 <p:sld xmlns:a="http://schemas.openxmlformats.org/drawingml/2006/main" xmlns:r="http://schemas.openxmlformats.org/officeDocument/2006/relationships" xmlns:p="http://schemas.openxmlformats.org/presentationml/2006/main">
   <p:cSld>
     <p:spTree>
@@ -26232,14 +26768,14 @@
           <p:nvPr>
             <p:extLst>
               <p:ext uri="{D42A27DB-BD31-4B8C-83A1-F6EECF244321}">
-                <p14:modId xmlns:p14="http://schemas.microsoft.com/office/powerpoint/2010/main" val="996429084"/>
+                <p14:modId xmlns:p14="http://schemas.microsoft.com/office/powerpoint/2010/main" val="535392088"/>
               </p:ext>
             </p:extLst>
           </p:nvPr>
         </p:nvGraphicFramePr>
         <p:xfrm>
-          <a:off x="7445644" y="1506808"/>
-          <a:ext cx="2033916" cy="1384035"/>
+          <a:off x="7445643" y="1506808"/>
+          <a:ext cx="2459541" cy="1384035"/>
         </p:xfrm>
         <a:graphic>
           <a:graphicData uri="http://schemas.openxmlformats.org/drawingml/2006/table">
@@ -26248,14 +26784,14 @@
                 <a:tableStyleId>{5C22544A-7EE6-4342-B048-85BDC9FD1C3A}</a:tableStyleId>
               </a:tblPr>
               <a:tblGrid>
-                <a:gridCol w="803329">
+                <a:gridCol w="800735">
                   <a:extLst>
                     <a:ext uri="{9D8B030D-6E8A-4147-A177-3AD203B41FA5}">
                       <a16:colId xmlns:a16="http://schemas.microsoft.com/office/drawing/2014/main" val="3299112100"/>
                     </a:ext>
                   </a:extLst>
                 </a:gridCol>
-                <a:gridCol w="1230587">
+                <a:gridCol w="1658806">
                   <a:extLst>
                     <a:ext uri="{9D8B030D-6E8A-4147-A177-3AD203B41FA5}">
                       <a16:colId xmlns:a16="http://schemas.microsoft.com/office/drawing/2014/main" val="1315594421"/>
@@ -26369,7 +26905,7 @@
                       <a:pPr latinLnBrk="1"/>
                       <a:r>
                         <a:rPr lang="en-US" altLang="ko-KR" sz="1100" dirty="0"/>
-                        <a:t>7</a:t>
+                        <a:t>3C2*2+1</a:t>
                       </a:r>
                       <a:endParaRPr lang="ko-KR" altLang="en-US" sz="1100" dirty="0"/>
                     </a:p>
@@ -26443,7 +26979,7 @@
                       <a:pPr latinLnBrk="1"/>
                       <a:r>
                         <a:rPr lang="en-US" altLang="ko-KR" sz="1100" dirty="0"/>
-                        <a:t>5C2+5C4+1</a:t>
+                        <a:t>(5C2)*2+(5C4)*(4C2)+1</a:t>
                       </a:r>
                       <a:endParaRPr lang="ko-KR" altLang="en-US" sz="1100" dirty="0"/>
                     </a:p>
@@ -26816,4 +27352,299 @@
     </a:ext>
   </a:extLst>
 </a:theme>
+</file>
+
+<file path=ppt/theme/theme2.xml><?xml version="1.0" encoding="utf-8"?>
+<a:theme xmlns:a="http://schemas.openxmlformats.org/drawingml/2006/main" name="Office 테마">
+  <a:themeElements>
+    <a:clrScheme name="Office">
+      <a:dk1>
+        <a:sysClr val="windowText" lastClr="000000"/>
+      </a:dk1>
+      <a:lt1>
+        <a:sysClr val="window" lastClr="FFFFFF"/>
+      </a:lt1>
+      <a:dk2>
+        <a:srgbClr val="44546A"/>
+      </a:dk2>
+      <a:lt2>
+        <a:srgbClr val="E7E6E6"/>
+      </a:lt2>
+      <a:accent1>
+        <a:srgbClr val="4472C4"/>
+      </a:accent1>
+      <a:accent2>
+        <a:srgbClr val="ED7D31"/>
+      </a:accent2>
+      <a:accent3>
+        <a:srgbClr val="A5A5A5"/>
+      </a:accent3>
+      <a:accent4>
+        <a:srgbClr val="FFC000"/>
+      </a:accent4>
+      <a:accent5>
+        <a:srgbClr val="5B9BD5"/>
+      </a:accent5>
+      <a:accent6>
+        <a:srgbClr val="70AD47"/>
+      </a:accent6>
+      <a:hlink>
+        <a:srgbClr val="0563C1"/>
+      </a:hlink>
+      <a:folHlink>
+        <a:srgbClr val="954F72"/>
+      </a:folHlink>
+    </a:clrScheme>
+    <a:fontScheme name="Office">
+      <a:majorFont>
+        <a:latin typeface="맑은 고딕" panose="020F0302020204030204"/>
+        <a:ea typeface=""/>
+        <a:cs typeface=""/>
+        <a:font script="Jpan" typeface="游ゴシック Light"/>
+        <a:font script="Hang" typeface="맑은 고딕"/>
+        <a:font script="Hans" typeface="等线 Light"/>
+        <a:font script="Hant" typeface="新細明體"/>
+        <a:font script="Arab" typeface="Times New Roman"/>
+        <a:font script="Hebr" typeface="Times New Roman"/>
+        <a:font script="Thai" typeface="Angsana New"/>
+        <a:font script="Ethi" typeface="Nyala"/>
+        <a:font script="Beng" typeface="Vrinda"/>
+        <a:font script="Gujr" typeface="Shruti"/>
+        <a:font script="Khmr" typeface="MoolBoran"/>
+        <a:font script="Knda" typeface="Tunga"/>
+        <a:font script="Guru" typeface="Raavi"/>
+        <a:font script="Cans" typeface="Euphemia"/>
+        <a:font script="Cher" typeface="Plantagenet Cherokee"/>
+        <a:font script="Yiii" typeface="Microsoft Yi Baiti"/>
+        <a:font script="Tibt" typeface="Microsoft Himalaya"/>
+        <a:font script="Thaa" typeface="MV Boli"/>
+        <a:font script="Deva" typeface="Mangal"/>
+        <a:font script="Telu" typeface="Gautami"/>
+        <a:font script="Taml" typeface="Latha"/>
+        <a:font script="Syrc" typeface="Estrangelo Edessa"/>
+        <a:font script="Orya" typeface="Kalinga"/>
+        <a:font script="Mlym" typeface="Kartika"/>
+        <a:font script="Laoo" typeface="DokChampa"/>
+        <a:font script="Sinh" typeface="Iskoola Pota"/>
+        <a:font script="Mong" typeface="Mongolian Baiti"/>
+        <a:font script="Viet" typeface="Times New Roman"/>
+        <a:font script="Uigh" typeface="Microsoft Uighur"/>
+        <a:font script="Geor" typeface="Sylfaen"/>
+        <a:font script="Armn" typeface="Arial"/>
+        <a:font script="Bugi" typeface="Leelawadee UI"/>
+        <a:font script="Bopo" typeface="Microsoft JhengHei"/>
+        <a:font script="Java" typeface="Javanese Text"/>
+        <a:font script="Lisu" typeface="Segoe UI"/>
+        <a:font script="Mymr" typeface="Myanmar Text"/>
+        <a:font script="Nkoo" typeface="Ebrima"/>
+        <a:font script="Olck" typeface="Nirmala UI"/>
+        <a:font script="Osma" typeface="Ebrima"/>
+        <a:font script="Phag" typeface="Phagspa"/>
+        <a:font script="Syrn" typeface="Estrangelo Edessa"/>
+        <a:font script="Syrj" typeface="Estrangelo Edessa"/>
+        <a:font script="Syre" typeface="Estrangelo Edessa"/>
+        <a:font script="Sora" typeface="Nirmala UI"/>
+        <a:font script="Tale" typeface="Microsoft Tai Le"/>
+        <a:font script="Talu" typeface="Microsoft New Tai Lue"/>
+        <a:font script="Tfng" typeface="Ebrima"/>
+      </a:majorFont>
+      <a:minorFont>
+        <a:latin typeface="맑은 고딕" panose="020F0502020204030204"/>
+        <a:ea typeface=""/>
+        <a:cs typeface=""/>
+        <a:font script="Jpan" typeface="游ゴシック"/>
+        <a:font script="Hang" typeface="맑은 고딕"/>
+        <a:font script="Hans" typeface="等线"/>
+        <a:font script="Hant" typeface="新細明體"/>
+        <a:font script="Arab" typeface="Arial"/>
+        <a:font script="Hebr" typeface="Arial"/>
+        <a:font script="Thai" typeface="Cordia New"/>
+        <a:font script="Ethi" typeface="Nyala"/>
+        <a:font script="Beng" typeface="Vrinda"/>
+        <a:font script="Gujr" typeface="Shruti"/>
+        <a:font script="Khmr" typeface="DaunPenh"/>
+        <a:font script="Knda" typeface="Tunga"/>
+        <a:font script="Guru" typeface="Raavi"/>
+        <a:font script="Cans" typeface="Euphemia"/>
+        <a:font script="Cher" typeface="Plantagenet Cherokee"/>
+        <a:font script="Yiii" typeface="Microsoft Yi Baiti"/>
+        <a:font script="Tibt" typeface="Microsoft Himalaya"/>
+        <a:font script="Thaa" typeface="MV Boli"/>
+        <a:font script="Deva" typeface="Mangal"/>
+        <a:font script="Telu" typeface="Gautami"/>
+        <a:font script="Taml" typeface="Latha"/>
+        <a:font script="Syrc" typeface="Estrangelo Edessa"/>
+        <a:font script="Orya" typeface="Kalinga"/>
+        <a:font script="Mlym" typeface="Kartika"/>
+        <a:font script="Laoo" typeface="DokChampa"/>
+        <a:font script="Sinh" typeface="Iskoola Pota"/>
+        <a:font script="Mong" typeface="Mongolian Baiti"/>
+        <a:font script="Viet" typeface="Arial"/>
+        <a:font script="Uigh" typeface="Microsoft Uighur"/>
+        <a:font script="Geor" typeface="Sylfaen"/>
+        <a:font script="Armn" typeface="Arial"/>
+        <a:font script="Bugi" typeface="Leelawadee UI"/>
+        <a:font script="Bopo" typeface="Microsoft JhengHei"/>
+        <a:font script="Java" typeface="Javanese Text"/>
+        <a:font script="Lisu" typeface="Segoe UI"/>
+        <a:font script="Mymr" typeface="Myanmar Text"/>
+        <a:font script="Nkoo" typeface="Ebrima"/>
+        <a:font script="Olck" typeface="Nirmala UI"/>
+        <a:font script="Osma" typeface="Ebrima"/>
+        <a:font script="Phag" typeface="Phagspa"/>
+        <a:font script="Syrn" typeface="Estrangelo Edessa"/>
+        <a:font script="Syrj" typeface="Estrangelo Edessa"/>
+        <a:font script="Syre" typeface="Estrangelo Edessa"/>
+        <a:font script="Sora" typeface="Nirmala UI"/>
+        <a:font script="Tale" typeface="Microsoft Tai Le"/>
+        <a:font script="Talu" typeface="Microsoft New Tai Lue"/>
+        <a:font script="Tfng" typeface="Ebrima"/>
+      </a:minorFont>
+    </a:fontScheme>
+    <a:fmtScheme name="Office">
+      <a:fillStyleLst>
+        <a:solidFill>
+          <a:schemeClr val="phClr"/>
+        </a:solidFill>
+        <a:gradFill rotWithShape="1">
+          <a:gsLst>
+            <a:gs pos="0">
+              <a:schemeClr val="phClr">
+                <a:lumMod val="110000"/>
+                <a:satMod val="105000"/>
+                <a:tint val="67000"/>
+              </a:schemeClr>
+            </a:gs>
+            <a:gs pos="50000">
+              <a:schemeClr val="phClr">
+                <a:lumMod val="105000"/>
+                <a:satMod val="103000"/>
+                <a:tint val="73000"/>
+              </a:schemeClr>
+            </a:gs>
+            <a:gs pos="100000">
+              <a:schemeClr val="phClr">
+                <a:lumMod val="105000"/>
+                <a:satMod val="109000"/>
+                <a:tint val="81000"/>
+              </a:schemeClr>
+            </a:gs>
+          </a:gsLst>
+          <a:lin ang="5400000" scaled="0"/>
+        </a:gradFill>
+        <a:gradFill rotWithShape="1">
+          <a:gsLst>
+            <a:gs pos="0">
+              <a:schemeClr val="phClr">
+                <a:satMod val="103000"/>
+                <a:lumMod val="102000"/>
+                <a:tint val="94000"/>
+              </a:schemeClr>
+            </a:gs>
+            <a:gs pos="50000">
+              <a:schemeClr val="phClr">
+                <a:satMod val="110000"/>
+                <a:lumMod val="100000"/>
+                <a:shade val="100000"/>
+              </a:schemeClr>
+            </a:gs>
+            <a:gs pos="100000">
+              <a:schemeClr val="phClr">
+                <a:lumMod val="99000"/>
+                <a:satMod val="120000"/>
+                <a:shade val="78000"/>
+              </a:schemeClr>
+            </a:gs>
+          </a:gsLst>
+          <a:lin ang="5400000" scaled="0"/>
+        </a:gradFill>
+      </a:fillStyleLst>
+      <a:lnStyleLst>
+        <a:ln w="6350" cap="flat" cmpd="sng" algn="ctr">
+          <a:solidFill>
+            <a:schemeClr val="phClr"/>
+          </a:solidFill>
+          <a:prstDash val="solid"/>
+          <a:miter lim="800000"/>
+        </a:ln>
+        <a:ln w="12700" cap="flat" cmpd="sng" algn="ctr">
+          <a:solidFill>
+            <a:schemeClr val="phClr"/>
+          </a:solidFill>
+          <a:prstDash val="solid"/>
+          <a:miter lim="800000"/>
+        </a:ln>
+        <a:ln w="19050" cap="flat" cmpd="sng" algn="ctr">
+          <a:solidFill>
+            <a:schemeClr val="phClr"/>
+          </a:solidFill>
+          <a:prstDash val="solid"/>
+          <a:miter lim="800000"/>
+        </a:ln>
+      </a:lnStyleLst>
+      <a:effectStyleLst>
+        <a:effectStyle>
+          <a:effectLst/>
+        </a:effectStyle>
+        <a:effectStyle>
+          <a:effectLst/>
+        </a:effectStyle>
+        <a:effectStyle>
+          <a:effectLst>
+            <a:outerShdw blurRad="57150" dist="19050" dir="5400000" algn="ctr" rotWithShape="0">
+              <a:srgbClr val="000000">
+                <a:alpha val="63000"/>
+              </a:srgbClr>
+            </a:outerShdw>
+          </a:effectLst>
+        </a:effectStyle>
+      </a:effectStyleLst>
+      <a:bgFillStyleLst>
+        <a:solidFill>
+          <a:schemeClr val="phClr"/>
+        </a:solidFill>
+        <a:solidFill>
+          <a:schemeClr val="phClr">
+            <a:tint val="95000"/>
+            <a:satMod val="170000"/>
+          </a:schemeClr>
+        </a:solidFill>
+        <a:gradFill rotWithShape="1">
+          <a:gsLst>
+            <a:gs pos="0">
+              <a:schemeClr val="phClr">
+                <a:tint val="93000"/>
+                <a:satMod val="150000"/>
+                <a:shade val="98000"/>
+                <a:lumMod val="102000"/>
+              </a:schemeClr>
+            </a:gs>
+            <a:gs pos="50000">
+              <a:schemeClr val="phClr">
+                <a:tint val="98000"/>
+                <a:satMod val="130000"/>
+                <a:shade val="90000"/>
+                <a:lumMod val="103000"/>
+              </a:schemeClr>
+            </a:gs>
+            <a:gs pos="100000">
+              <a:schemeClr val="phClr">
+                <a:shade val="63000"/>
+                <a:satMod val="120000"/>
+              </a:schemeClr>
+            </a:gs>
+          </a:gsLst>
+          <a:lin ang="5400000" scaled="0"/>
+        </a:gradFill>
+      </a:bgFillStyleLst>
+    </a:fmtScheme>
+  </a:themeElements>
+  <a:objectDefaults/>
+  <a:extraClrSchemeLst/>
+  <a:extLst>
+    <a:ext uri="{05A4C25C-085E-4340-85A3-A5531E510DB2}">
+      <thm15:themeFamily xmlns:thm15="http://schemas.microsoft.com/office/thememl/2012/main" name="Office Theme" id="{62F939B6-93AF-4DB8-9C6B-D6C7DFDC589F}" vid="{4A3C46E8-61CC-4603-A589-7422A47A8E4A}"/>
+    </a:ext>
+  </a:extLst>
+</a:theme>
 </file>
</xml_diff>

<commit_message>
change the value of it
</commit_message>
<xml_diff>
--- a/Traffic Optimization Final Speech.pptx
+++ b/Traffic Optimization Final Speech.pptx
@@ -18,9 +18,12 @@
     <p:sldId id="265" r:id="rId12"/>
     <p:sldId id="269" r:id="rId13"/>
     <p:sldId id="268" r:id="rId14"/>
-    <p:sldId id="272" r:id="rId15"/>
-    <p:sldId id="270" r:id="rId16"/>
-    <p:sldId id="271" r:id="rId17"/>
+    <p:sldId id="273" r:id="rId15"/>
+    <p:sldId id="274" r:id="rId16"/>
+    <p:sldId id="272" r:id="rId17"/>
+    <p:sldId id="275" r:id="rId18"/>
+    <p:sldId id="270" r:id="rId19"/>
+    <p:sldId id="271" r:id="rId20"/>
   </p:sldIdLst>
   <p:sldSz cx="12192000" cy="6858000"/>
   <p:notesSz cx="6858000" cy="9144000"/>
@@ -850,7 +853,7 @@
             <a:fld id="{B61BEF0D-F0BB-DE4B-95CE-6DB70DBA9567}" type="datetimeFigureOut">
               <a:rPr lang="en-US" dirty="0"/>
               <a:pPr/>
-              <a:t>2/24/2021</a:t>
+              <a:t>2/25/2021</a:t>
             </a:fld>
             <a:endParaRPr lang="en-US" dirty="0"/>
           </a:p>
@@ -1098,7 +1101,7 @@
             <a:fld id="{B61BEF0D-F0BB-DE4B-95CE-6DB70DBA9567}" type="datetimeFigureOut">
               <a:rPr lang="en-US" dirty="0"/>
               <a:pPr/>
-              <a:t>2/24/2021</a:t>
+              <a:t>2/25/2021</a:t>
             </a:fld>
             <a:endParaRPr lang="en-US" dirty="0"/>
           </a:p>
@@ -1409,7 +1412,7 @@
             <a:fld id="{B61BEF0D-F0BB-DE4B-95CE-6DB70DBA9567}" type="datetimeFigureOut">
               <a:rPr lang="en-US" dirty="0"/>
               <a:pPr/>
-              <a:t>2/24/2021</a:t>
+              <a:t>2/25/2021</a:t>
             </a:fld>
             <a:endParaRPr lang="en-US" dirty="0"/>
           </a:p>
@@ -1747,7 +1750,7 @@
             <a:fld id="{B61BEF0D-F0BB-DE4B-95CE-6DB70DBA9567}" type="datetimeFigureOut">
               <a:rPr lang="en-US" dirty="0"/>
               <a:pPr/>
-              <a:t>2/24/2021</a:t>
+              <a:t>2/25/2021</a:t>
             </a:fld>
             <a:endParaRPr lang="en-US" dirty="0"/>
           </a:p>
@@ -2058,7 +2061,7 @@
             <a:fld id="{B61BEF0D-F0BB-DE4B-95CE-6DB70DBA9567}" type="datetimeFigureOut">
               <a:rPr lang="en-US" dirty="0"/>
               <a:pPr/>
-              <a:t>2/24/2021</a:t>
+              <a:t>2/25/2021</a:t>
             </a:fld>
             <a:endParaRPr lang="en-US" dirty="0"/>
           </a:p>
@@ -2448,7 +2451,7 @@
             <a:fld id="{B61BEF0D-F0BB-DE4B-95CE-6DB70DBA9567}" type="datetimeFigureOut">
               <a:rPr lang="en-US" dirty="0"/>
               <a:pPr/>
-              <a:t>2/24/2021</a:t>
+              <a:t>2/25/2021</a:t>
             </a:fld>
             <a:endParaRPr lang="en-US" dirty="0"/>
           </a:p>
@@ -2614,7 +2617,7 @@
           <a:p>
             <a:fld id="{55C6B4A9-1611-4792-9094-5F34BCA07E0B}" type="datetimeFigureOut">
               <a:rPr lang="en-US" dirty="0"/>
-              <a:t>2/24/2021</a:t>
+              <a:t>2/25/2021</a:t>
             </a:fld>
             <a:endParaRPr lang="en-US" dirty="0"/>
           </a:p>
@@ -2790,7 +2793,7 @@
             <a:fld id="{B61BEF0D-F0BB-DE4B-95CE-6DB70DBA9567}" type="datetimeFigureOut">
               <a:rPr lang="en-US" dirty="0"/>
               <a:pPr/>
-              <a:t>2/24/2021</a:t>
+              <a:t>2/25/2021</a:t>
             </a:fld>
             <a:endParaRPr lang="en-US" dirty="0"/>
           </a:p>
@@ -3000,7 +3003,7 @@
             <a:fld id="{B61BEF0D-F0BB-DE4B-95CE-6DB70DBA9567}" type="datetimeFigureOut">
               <a:rPr lang="en-US" dirty="0"/>
               <a:pPr/>
-              <a:t>2/24/2021</a:t>
+              <a:t>2/25/2021</a:t>
             </a:fld>
             <a:endParaRPr lang="en-US" dirty="0"/>
           </a:p>
@@ -3244,7 +3247,7 @@
             <a:fld id="{B61BEF0D-F0BB-DE4B-95CE-6DB70DBA9567}" type="datetimeFigureOut">
               <a:rPr lang="en-US" dirty="0"/>
               <a:pPr/>
-              <a:t>2/24/2021</a:t>
+              <a:t>2/25/2021</a:t>
             </a:fld>
             <a:endParaRPr lang="en-US" dirty="0"/>
           </a:p>
@@ -3472,7 +3475,7 @@
           <a:p>
             <a:fld id="{EB712588-04B1-427B-82EE-E8DB90309F08}" type="datetimeFigureOut">
               <a:rPr lang="en-US" dirty="0"/>
-              <a:t>2/24/2021</a:t>
+              <a:t>2/25/2021</a:t>
             </a:fld>
             <a:endParaRPr lang="en-US" dirty="0"/>
           </a:p>
@@ -3842,7 +3845,7 @@
             <a:fld id="{B61BEF0D-F0BB-DE4B-95CE-6DB70DBA9567}" type="datetimeFigureOut">
               <a:rPr lang="en-US" dirty="0"/>
               <a:pPr/>
-              <a:t>2/24/2021</a:t>
+              <a:t>2/25/2021</a:t>
             </a:fld>
             <a:endParaRPr lang="en-US" dirty="0"/>
           </a:p>
@@ -3962,7 +3965,7 @@
             <a:fld id="{B61BEF0D-F0BB-DE4B-95CE-6DB70DBA9567}" type="datetimeFigureOut">
               <a:rPr lang="en-US" dirty="0"/>
               <a:pPr/>
-              <a:t>2/24/2021</a:t>
+              <a:t>2/25/2021</a:t>
             </a:fld>
             <a:endParaRPr lang="en-US" dirty="0"/>
           </a:p>
@@ -4054,7 +4057,7 @@
             <a:fld id="{B61BEF0D-F0BB-DE4B-95CE-6DB70DBA9567}" type="datetimeFigureOut">
               <a:rPr lang="en-US" dirty="0"/>
               <a:pPr/>
-              <a:t>2/24/2021</a:t>
+              <a:t>2/25/2021</a:t>
             </a:fld>
             <a:endParaRPr lang="en-US" dirty="0"/>
           </a:p>
@@ -4305,7 +4308,7 @@
           <a:p>
             <a:fld id="{42A54C80-263E-416B-A8E0-580EDEADCBDC}" type="datetimeFigureOut">
               <a:rPr lang="en-US" dirty="0"/>
-              <a:t>2/24/2021</a:t>
+              <a:t>2/25/2021</a:t>
             </a:fld>
             <a:endParaRPr lang="en-US" dirty="0"/>
           </a:p>
@@ -4564,7 +4567,7 @@
             <a:fld id="{B61BEF0D-F0BB-DE4B-95CE-6DB70DBA9567}" type="datetimeFigureOut">
               <a:rPr lang="en-US" dirty="0"/>
               <a:pPr/>
-              <a:t>2/24/2021</a:t>
+              <a:t>2/25/2021</a:t>
             </a:fld>
             <a:endParaRPr lang="en-US" dirty="0"/>
           </a:p>
@@ -5304,7 +5307,7 @@
             <a:fld id="{B61BEF0D-F0BB-DE4B-95CE-6DB70DBA9567}" type="datetimeFigureOut">
               <a:rPr lang="en-US" dirty="0"/>
               <a:pPr/>
-              <a:t>2/24/2021</a:t>
+              <a:t>2/25/2021</a:t>
             </a:fld>
             <a:endParaRPr lang="en-US" dirty="0"/>
           </a:p>
@@ -5963,7 +5966,7 @@
             </a:r>
             <a:r>
               <a:rPr lang="en-US" altLang="ko-KR" dirty="0"/>
-              <a:t>Restraints</a:t>
+              <a:t>Constraints</a:t>
             </a:r>
             <a:br>
               <a:rPr lang="en-US" altLang="ko-KR" dirty="0"/>
@@ -6696,7 +6699,7 @@
           <p:nvPr>
             <p:extLst>
               <p:ext uri="{D42A27DB-BD31-4B8C-83A1-F6EECF244321}">
-                <p14:modId xmlns:p14="http://schemas.microsoft.com/office/powerpoint/2010/main" val="707739802"/>
+                <p14:modId xmlns:p14="http://schemas.microsoft.com/office/powerpoint/2010/main" val="331965673"/>
               </p:ext>
             </p:extLst>
           </p:nvPr>
@@ -6821,7 +6824,7 @@
                       <a:pPr latinLnBrk="1"/>
                       <a:r>
                         <a:rPr lang="en-US" altLang="ko-KR" sz="1600" dirty="0"/>
-                        <a:t>25.5s</a:t>
+                        <a:t>61.0s</a:t>
                       </a:r>
                       <a:endParaRPr lang="ko-KR" altLang="en-US" sz="1600" dirty="0"/>
                     </a:p>
@@ -6869,7 +6872,7 @@
                       <a:pPr latinLnBrk="1"/>
                       <a:r>
                         <a:rPr lang="en-US" altLang="ko-KR" sz="1600" dirty="0"/>
-                        <a:t>2.13m/s</a:t>
+                        <a:t>3.43m/s</a:t>
                       </a:r>
                       <a:endParaRPr lang="ko-KR" altLang="en-US" sz="1600" dirty="0"/>
                     </a:p>
@@ -6928,7 +6931,7 @@
                       <a:pPr latinLnBrk="1"/>
                       <a:r>
                         <a:rPr lang="en-US" altLang="ko-KR" sz="1600" dirty="0"/>
-                        <a:t>4205.5s/</a:t>
+                        <a:t>40.2s/</a:t>
                       </a:r>
                       <a:r>
                         <a:rPr lang="en-US" altLang="ko-KR" sz="1600" dirty="0" err="1"/>
@@ -7013,7 +7016,7 @@
             </a:r>
             <a:r>
               <a:rPr lang="en-US" altLang="ko-KR" dirty="0"/>
-              <a:t> Decentralized CNN/CNN-reduced Model with Practical Restraints</a:t>
+              <a:t> Decentralized CNN/CNN-reduced Model with Practical Constraints</a:t>
             </a:r>
             <a:br>
               <a:rPr lang="en-US" altLang="ko-KR" dirty="0"/>
@@ -7203,7 +7206,7 @@
             </a:r>
             <a:r>
               <a:rPr lang="en-US" altLang="ko-KR" dirty="0"/>
-              <a:t> Decentralized CNN/CNN-reduced Model with Practical Restraints</a:t>
+              <a:t> Decentralized CNN/CNN-reduced Model with Practical Constraints</a:t>
             </a:r>
             <a:br>
               <a:rPr lang="en-US" altLang="ko-KR" dirty="0"/>
@@ -14076,6 +14079,121 @@
           </a:p>
         </p:txBody>
       </p:sp>
+      <p:sp>
+        <p:nvSpPr>
+          <p:cNvPr id="170" name="아래쪽 화살표 167">
+            <a:extLst>
+              <a:ext uri="{FF2B5EF4-FFF2-40B4-BE49-F238E27FC236}">
+                <a16:creationId xmlns:a16="http://schemas.microsoft.com/office/drawing/2014/main" id="{2901AB21-45F3-4CDB-BC46-EE24E9E73733}"/>
+              </a:ext>
+            </a:extLst>
+          </p:cNvPr>
+          <p:cNvSpPr/>
+          <p:nvPr/>
+        </p:nvSpPr>
+        <p:spPr>
+          <a:xfrm rot="19258669">
+            <a:off x="6149756" y="5124146"/>
+            <a:ext cx="873664" cy="1091320"/>
+          </a:xfrm>
+          <a:prstGeom prst="downArrow">
+            <a:avLst>
+              <a:gd name="adj1" fmla="val 23446"/>
+              <a:gd name="adj2" fmla="val 50000"/>
+            </a:avLst>
+          </a:prstGeom>
+        </p:spPr>
+        <p:style>
+          <a:lnRef idx="2">
+            <a:schemeClr val="accent4">
+              <a:shade val="50000"/>
+            </a:schemeClr>
+          </a:lnRef>
+          <a:fillRef idx="1">
+            <a:schemeClr val="accent4"/>
+          </a:fillRef>
+          <a:effectRef idx="0">
+            <a:schemeClr val="accent4"/>
+          </a:effectRef>
+          <a:fontRef idx="minor">
+            <a:schemeClr val="lt1"/>
+          </a:fontRef>
+        </p:style>
+        <p:txBody>
+          <a:bodyPr rtlCol="0" anchor="ctr"/>
+          <a:lstStyle/>
+          <a:p>
+            <a:pPr algn="ctr"/>
+            <a:endParaRPr lang="ko-KR" altLang="en-US"/>
+          </a:p>
+        </p:txBody>
+      </p:sp>
+      <p:sp>
+        <p:nvSpPr>
+          <p:cNvPr id="171" name="직사각형 170">
+            <a:extLst>
+              <a:ext uri="{FF2B5EF4-FFF2-40B4-BE49-F238E27FC236}">
+                <a16:creationId xmlns:a16="http://schemas.microsoft.com/office/drawing/2014/main" id="{D5467282-5837-4F4C-B1F3-009CF48047B9}"/>
+              </a:ext>
+            </a:extLst>
+          </p:cNvPr>
+          <p:cNvSpPr/>
+          <p:nvPr/>
+        </p:nvSpPr>
+        <p:spPr>
+          <a:xfrm>
+            <a:off x="6354454" y="6166508"/>
+            <a:ext cx="1428427" cy="432658"/>
+          </a:xfrm>
+          <a:prstGeom prst="rect">
+            <a:avLst/>
+          </a:prstGeom>
+          <a:solidFill>
+            <a:schemeClr val="bg1"/>
+          </a:solidFill>
+          <a:ln>
+            <a:solidFill>
+              <a:schemeClr val="tx1"/>
+            </a:solidFill>
+          </a:ln>
+        </p:spPr>
+        <p:style>
+          <a:lnRef idx="2">
+            <a:schemeClr val="accent1">
+              <a:shade val="50000"/>
+            </a:schemeClr>
+          </a:lnRef>
+          <a:fillRef idx="1">
+            <a:schemeClr val="accent1"/>
+          </a:fillRef>
+          <a:effectRef idx="0">
+            <a:schemeClr val="accent1"/>
+          </a:effectRef>
+          <a:fontRef idx="minor">
+            <a:schemeClr val="lt1"/>
+          </a:fontRef>
+        </p:style>
+        <p:txBody>
+          <a:bodyPr rtlCol="0" anchor="ctr"/>
+          <a:lstStyle/>
+          <a:p>
+            <a:pPr algn="ctr"/>
+            <a:r>
+              <a:rPr lang="en-US" altLang="ko-KR" sz="1400" dirty="0">
+                <a:solidFill>
+                  <a:schemeClr val="tx1"/>
+                </a:solidFill>
+              </a:rPr>
+              <a:t>Other Agents</a:t>
+            </a:r>
+            <a:endParaRPr lang="ko-KR" altLang="en-US" sz="1400" dirty="0">
+              <a:solidFill>
+                <a:schemeClr val="tx1"/>
+              </a:solidFill>
+            </a:endParaRPr>
+          </a:p>
+        </p:txBody>
+      </p:sp>
     </p:spTree>
     <p:extLst>
       <p:ext uri="{BB962C8B-B14F-4D97-AF65-F5344CB8AC3E}">
@@ -14129,7 +14247,7 @@
             </a:r>
             <a:r>
               <a:rPr lang="en-US" altLang="ko-KR" dirty="0"/>
-              <a:t> Decentralized CNN/CNN-reduced Model with Practical Restraints</a:t>
+              <a:t> Decentralized CNN/CNN-reduced Model with Practical Constraints</a:t>
             </a:r>
             <a:br>
               <a:rPr lang="en-US" altLang="ko-KR" dirty="0"/>
@@ -14160,7 +14278,7 @@
           <a:p>
             <a:r>
               <a:rPr lang="en-US" altLang="ko-KR" dirty="0"/>
-              <a:t>CNN Model</a:t>
+              <a:t>CNN Model(0to3am)</a:t>
             </a:r>
           </a:p>
           <a:p>
@@ -14454,7 +14572,7 @@
           <a:p>
             <a:r>
               <a:rPr lang="en-US" altLang="ko-KR" dirty="0"/>
-              <a:t>CNN-reduced Model</a:t>
+              <a:t>CNN-reduced Model(0to3am)</a:t>
             </a:r>
           </a:p>
           <a:p>
@@ -14473,30 +14591,6 @@
           </a:p>
         </p:txBody>
       </p:sp>
-      <p:pic>
-        <p:nvPicPr>
-          <p:cNvPr id="327" name="그림 326"/>
-          <p:cNvPicPr>
-            <a:picLocks noChangeAspect="1"/>
-          </p:cNvPicPr>
-          <p:nvPr/>
-        </p:nvPicPr>
-        <p:blipFill>
-          <a:blip r:embed="rId3"/>
-          <a:stretch>
-            <a:fillRect/>
-          </a:stretch>
-        </p:blipFill>
-        <p:spPr>
-          <a:xfrm>
-            <a:off x="4986580" y="4958486"/>
-            <a:ext cx="4156726" cy="1510060"/>
-          </a:xfrm>
-          <a:prstGeom prst="rect">
-            <a:avLst/>
-          </a:prstGeom>
-        </p:spPr>
-      </p:pic>
       <p:graphicFrame>
         <p:nvGraphicFramePr>
           <p:cNvPr id="328" name="표 327"/>
@@ -14506,7 +14600,7 @@
           <p:nvPr>
             <p:extLst>
               <p:ext uri="{D42A27DB-BD31-4B8C-83A1-F6EECF244321}">
-                <p14:modId xmlns:p14="http://schemas.microsoft.com/office/powerpoint/2010/main" val="290612101"/>
+                <p14:modId xmlns:p14="http://schemas.microsoft.com/office/powerpoint/2010/main" val="2750528957"/>
               </p:ext>
             </p:extLst>
           </p:nvPr>
@@ -14522,28 +14616,28 @@
                 <a:tableStyleId>{5C22544A-7EE6-4342-B048-85BDC9FD1C3A}</a:tableStyleId>
               </a:tblPr>
               <a:tblGrid>
-                <a:gridCol w="1611452">
+                <a:gridCol w="2120648">
                   <a:extLst>
                     <a:ext uri="{9D8B030D-6E8A-4147-A177-3AD203B41FA5}">
                       <a16:colId xmlns:a16="http://schemas.microsoft.com/office/drawing/2014/main" val="3455510951"/>
                     </a:ext>
                   </a:extLst>
                 </a:gridCol>
-                <a:gridCol w="1319695">
+                <a:gridCol w="1249959">
                   <a:extLst>
                     <a:ext uri="{9D8B030D-6E8A-4147-A177-3AD203B41FA5}">
                       <a16:colId xmlns:a16="http://schemas.microsoft.com/office/drawing/2014/main" val="718858861"/>
                     </a:ext>
                   </a:extLst>
                 </a:gridCol>
-                <a:gridCol w="2081820">
+                <a:gridCol w="2080470">
                   <a:extLst>
                     <a:ext uri="{9D8B030D-6E8A-4147-A177-3AD203B41FA5}">
                       <a16:colId xmlns:a16="http://schemas.microsoft.com/office/drawing/2014/main" val="3835679529"/>
                     </a:ext>
                   </a:extLst>
                 </a:gridCol>
-                <a:gridCol w="3151487">
+                <a:gridCol w="2713377">
                   <a:extLst>
                     <a:ext uri="{9D8B030D-6E8A-4147-A177-3AD203B41FA5}">
                       <a16:colId xmlns:a16="http://schemas.microsoft.com/office/drawing/2014/main" val="4264042593"/>
@@ -14559,12 +14653,16 @@
                     <a:p>
                       <a:pPr latinLnBrk="1"/>
                       <a:r>
-                        <a:rPr lang="en-US" altLang="ko-KR" sz="1300" dirty="0" err="1"/>
+                        <a:rPr lang="en-US" altLang="ko-KR" sz="1300" dirty="0"/>
                         <a:t>Avg</a:t>
                       </a:r>
                       <a:r>
                         <a:rPr lang="en-US" altLang="ko-KR" sz="1300" baseline="0" dirty="0"/>
                         <a:t> Value</a:t>
+                      </a:r>
+                      <a:r>
+                        <a:rPr lang="en-US" altLang="ko-KR" sz="1100" baseline="0" dirty="0"/>
+                        <a:t>(interest edges)</a:t>
                       </a:r>
                       <a:endParaRPr lang="ko-KR" altLang="en-US" sz="1300" dirty="0"/>
                     </a:p>
@@ -14705,7 +14803,15 @@
                       <a:pPr latinLnBrk="1"/>
                       <a:r>
                         <a:rPr lang="en-US" altLang="ko-KR" sz="1300" dirty="0"/>
-                        <a:t>Velocity</a:t>
+                        <a:t>Avg Velocity(edge </a:t>
+                      </a:r>
+                      <a:r>
+                        <a:rPr lang="en-US" altLang="ko-KR" sz="1300" dirty="0" err="1"/>
+                        <a:t>veh</a:t>
+                      </a:r>
+                      <a:r>
+                        <a:rPr lang="en-US" altLang="ko-KR" sz="1300" dirty="0"/>
+                        <a:t>)</a:t>
                       </a:r>
                       <a:endParaRPr lang="ko-KR" altLang="en-US" sz="1300" dirty="0"/>
                     </a:p>
@@ -14779,7 +14885,7 @@
                       </a:br>
                       <a:r>
                         <a:rPr lang="en-US" altLang="ko-KR" sz="1300" dirty="0"/>
-                        <a:t>(whole</a:t>
+                        <a:t>(during whole</a:t>
                       </a:r>
                       <a:r>
                         <a:rPr lang="en-US" altLang="ko-KR" sz="1300" baseline="0" dirty="0"/>
@@ -14802,7 +14908,7 @@
                       </a:r>
                       <a:r>
                         <a:rPr lang="en-US" altLang="ko-KR" sz="1300" dirty="0" err="1"/>
-                        <a:t>veh</a:t>
+                        <a:t>edg</a:t>
                       </a:r>
                       <a:endParaRPr lang="ko-KR" altLang="en-US" sz="1300" dirty="0"/>
                     </a:p>
@@ -14821,7 +14927,7 @@
                       </a:r>
                       <a:r>
                         <a:rPr lang="en-US" altLang="ko-KR" sz="1300" dirty="0" err="1"/>
-                        <a:t>veh</a:t>
+                        <a:t>edg</a:t>
                       </a:r>
                       <a:endParaRPr lang="ko-KR" altLang="en-US" sz="1300" dirty="0"/>
                     </a:p>
@@ -14840,7 +14946,7 @@
                       </a:r>
                       <a:r>
                         <a:rPr lang="en-US" altLang="ko-KR" sz="1300" dirty="0" err="1"/>
-                        <a:t>veh</a:t>
+                        <a:t>edg</a:t>
                       </a:r>
                       <a:endParaRPr lang="ko-KR" altLang="en-US" sz="1300" dirty="0"/>
                     </a:p>
@@ -14862,11 +14968,7 @@
                       <a:pPr latinLnBrk="1"/>
                       <a:r>
                         <a:rPr lang="en-US" altLang="ko-KR" sz="1300" dirty="0"/>
-                        <a:t>Arrived </a:t>
-                      </a:r>
-                      <a:r>
-                        <a:rPr lang="en-US" altLang="ko-KR" sz="1300" dirty="0" err="1"/>
-                        <a:t>Num</a:t>
+                        <a:t>Arrived Num (all edge)</a:t>
                       </a:r>
                       <a:endParaRPr lang="ko-KR" altLang="en-US" sz="1300" dirty="0"/>
                     </a:p>
@@ -14928,6 +15030,36 @@
           </a:graphicData>
         </a:graphic>
       </p:graphicFrame>
+      <p:pic>
+        <p:nvPicPr>
+          <p:cNvPr id="13" name="그림 12">
+            <a:extLst>
+              <a:ext uri="{FF2B5EF4-FFF2-40B4-BE49-F238E27FC236}">
+                <a16:creationId xmlns:a16="http://schemas.microsoft.com/office/drawing/2014/main" id="{DD613EE3-CA73-47A9-96F7-1F716EF28768}"/>
+              </a:ext>
+            </a:extLst>
+          </p:cNvPr>
+          <p:cNvPicPr>
+            <a:picLocks noChangeAspect="1"/>
+          </p:cNvPicPr>
+          <p:nvPr/>
+        </p:nvPicPr>
+        <p:blipFill>
+          <a:blip r:embed="rId3"/>
+          <a:stretch>
+            <a:fillRect/>
+          </a:stretch>
+        </p:blipFill>
+        <p:spPr>
+          <a:xfrm>
+            <a:off x="4975668" y="5039400"/>
+            <a:ext cx="4023677" cy="1486152"/>
+          </a:xfrm>
+          <a:prstGeom prst="rect">
+            <a:avLst/>
+          </a:prstGeom>
+        </p:spPr>
+      </p:pic>
     </p:spTree>
     <p:extLst>
       <p:ext uri="{BB962C8B-B14F-4D97-AF65-F5344CB8AC3E}">
@@ -14942,6 +15074,699 @@
 </file>
 
 <file path=ppt/slides/slide14.xml><?xml version="1.0" encoding="utf-8"?>
+<p:sld xmlns:a="http://schemas.openxmlformats.org/drawingml/2006/main" xmlns:r="http://schemas.openxmlformats.org/officeDocument/2006/relationships" xmlns:p="http://schemas.openxmlformats.org/presentationml/2006/main">
+  <p:cSld>
+    <p:spTree>
+      <p:nvGrpSpPr>
+        <p:cNvPr id="1" name=""/>
+        <p:cNvGrpSpPr/>
+        <p:nvPr/>
+      </p:nvGrpSpPr>
+      <p:grpSpPr>
+        <a:xfrm>
+          <a:off x="0" y="0"/>
+          <a:ext cx="0" cy="0"/>
+          <a:chOff x="0" y="0"/>
+          <a:chExt cx="0" cy="0"/>
+        </a:xfrm>
+      </p:grpSpPr>
+      <p:sp>
+        <p:nvSpPr>
+          <p:cNvPr id="2" name="제목 1">
+            <a:extLst>
+              <a:ext uri="{FF2B5EF4-FFF2-40B4-BE49-F238E27FC236}">
+                <a16:creationId xmlns:a16="http://schemas.microsoft.com/office/drawing/2014/main" id="{9312B6DA-AE76-4062-87D6-A41DD448E943}"/>
+              </a:ext>
+            </a:extLst>
+          </p:cNvPr>
+          <p:cNvSpPr>
+            <a:spLocks noGrp="1"/>
+          </p:cNvSpPr>
+          <p:nvPr>
+            <p:ph type="title"/>
+          </p:nvPr>
+        </p:nvSpPr>
+        <p:spPr/>
+        <p:txBody>
+          <a:bodyPr>
+            <a:normAutofit fontScale="90000"/>
+          </a:bodyPr>
+          <a:lstStyle/>
+          <a:p>
+            <a:r>
+              <a:rPr lang="en-US" altLang="ko-KR" dirty="0" err="1"/>
+              <a:t>Dunsan</a:t>
+            </a:r>
+            <a:r>
+              <a:rPr lang="en-US" altLang="ko-KR" dirty="0"/>
+              <a:t> Decentralized CNN/CNN-reduced Model with Practical Constraints</a:t>
+            </a:r>
+            <a:br>
+              <a:rPr lang="en-US" altLang="ko-KR" dirty="0"/>
+            </a:br>
+            <a:endParaRPr lang="ko-KR" altLang="en-US" dirty="0"/>
+          </a:p>
+        </p:txBody>
+      </p:sp>
+      <p:sp>
+        <p:nvSpPr>
+          <p:cNvPr id="3" name="내용 개체 틀 2">
+            <a:extLst>
+              <a:ext uri="{FF2B5EF4-FFF2-40B4-BE49-F238E27FC236}">
+                <a16:creationId xmlns:a16="http://schemas.microsoft.com/office/drawing/2014/main" id="{57710103-37EF-4B69-9A23-8D6C0E8AA37D}"/>
+              </a:ext>
+            </a:extLst>
+          </p:cNvPr>
+          <p:cNvSpPr>
+            <a:spLocks noGrp="1"/>
+          </p:cNvSpPr>
+          <p:nvPr>
+            <p:ph idx="1"/>
+          </p:nvPr>
+        </p:nvSpPr>
+        <p:spPr/>
+        <p:txBody>
+          <a:bodyPr/>
+          <a:lstStyle/>
+          <a:p>
+            <a:r>
+              <a:rPr lang="en-US" altLang="ko-KR" dirty="0"/>
+              <a:t>Avoiding Local Optimum</a:t>
+            </a:r>
+          </a:p>
+          <a:p>
+            <a:pPr lvl="1"/>
+            <a:r>
+              <a:rPr lang="en-US" altLang="ko-KR" dirty="0"/>
+              <a:t>Add Dropout Layer between fully connected layer in super Q Network</a:t>
+            </a:r>
+          </a:p>
+          <a:p>
+            <a:pPr lvl="1"/>
+            <a:r>
+              <a:rPr lang="en-US" altLang="ko-KR" dirty="0"/>
+              <a:t>Apply peak demand(7-10am) to the model learned from free demand(0-3am)</a:t>
+            </a:r>
+          </a:p>
+          <a:p>
+            <a:pPr lvl="1"/>
+            <a:endParaRPr lang="ko-KR" altLang="en-US" dirty="0"/>
+          </a:p>
+        </p:txBody>
+      </p:sp>
+      <p:graphicFrame>
+        <p:nvGraphicFramePr>
+          <p:cNvPr id="8" name="표 7">
+            <a:extLst>
+              <a:ext uri="{FF2B5EF4-FFF2-40B4-BE49-F238E27FC236}">
+                <a16:creationId xmlns:a16="http://schemas.microsoft.com/office/drawing/2014/main" id="{50226140-3FD3-4783-A28A-D8B8C45BDD69}"/>
+              </a:ext>
+            </a:extLst>
+          </p:cNvPr>
+          <p:cNvGraphicFramePr>
+            <a:graphicFrameLocks noGrp="1"/>
+          </p:cNvGraphicFramePr>
+          <p:nvPr>
+            <p:extLst>
+              <p:ext uri="{D42A27DB-BD31-4B8C-83A1-F6EECF244321}">
+                <p14:modId xmlns:p14="http://schemas.microsoft.com/office/powerpoint/2010/main" val="2875041719"/>
+              </p:ext>
+            </p:extLst>
+          </p:nvPr>
+        </p:nvGraphicFramePr>
+        <p:xfrm>
+          <a:off x="781943" y="3511929"/>
+          <a:ext cx="8164454" cy="1990263"/>
+        </p:xfrm>
+        <a:graphic>
+          <a:graphicData uri="http://schemas.openxmlformats.org/drawingml/2006/table">
+            <a:tbl>
+              <a:tblPr firstRow="1" bandRow="1">
+                <a:tableStyleId>{5C22544A-7EE6-4342-B048-85BDC9FD1C3A}</a:tableStyleId>
+              </a:tblPr>
+              <a:tblGrid>
+                <a:gridCol w="1611452">
+                  <a:extLst>
+                    <a:ext uri="{9D8B030D-6E8A-4147-A177-3AD203B41FA5}">
+                      <a16:colId xmlns:a16="http://schemas.microsoft.com/office/drawing/2014/main" val="3455510951"/>
+                    </a:ext>
+                  </a:extLst>
+                </a:gridCol>
+                <a:gridCol w="1440374">
+                  <a:extLst>
+                    <a:ext uri="{9D8B030D-6E8A-4147-A177-3AD203B41FA5}">
+                      <a16:colId xmlns:a16="http://schemas.microsoft.com/office/drawing/2014/main" val="718858861"/>
+                    </a:ext>
+                  </a:extLst>
+                </a:gridCol>
+                <a:gridCol w="2575420">
+                  <a:extLst>
+                    <a:ext uri="{9D8B030D-6E8A-4147-A177-3AD203B41FA5}">
+                      <a16:colId xmlns:a16="http://schemas.microsoft.com/office/drawing/2014/main" val="3835679529"/>
+                    </a:ext>
+                  </a:extLst>
+                </a:gridCol>
+                <a:gridCol w="2537208">
+                  <a:extLst>
+                    <a:ext uri="{9D8B030D-6E8A-4147-A177-3AD203B41FA5}">
+                      <a16:colId xmlns:a16="http://schemas.microsoft.com/office/drawing/2014/main" val="4264042593"/>
+                    </a:ext>
+                  </a:extLst>
+                </a:gridCol>
+              </a:tblGrid>
+              <a:tr h="338301">
+                <a:tc>
+                  <a:txBody>
+                    <a:bodyPr/>
+                    <a:lstStyle/>
+                    <a:p>
+                      <a:pPr latinLnBrk="1"/>
+                      <a:r>
+                        <a:rPr lang="en-US" altLang="ko-KR" sz="1300" dirty="0" err="1"/>
+                        <a:t>Avg</a:t>
+                      </a:r>
+                      <a:r>
+                        <a:rPr lang="en-US" altLang="ko-KR" sz="1300" baseline="0" dirty="0"/>
+                        <a:t> Value</a:t>
+                      </a:r>
+                      <a:endParaRPr lang="ko-KR" altLang="en-US" sz="1300" dirty="0"/>
+                    </a:p>
+                  </a:txBody>
+                  <a:tcPr/>
+                </a:tc>
+                <a:tc>
+                  <a:txBody>
+                    <a:bodyPr/>
+                    <a:lstStyle/>
+                    <a:p>
+                      <a:pPr latinLnBrk="1"/>
+                      <a:r>
+                        <a:rPr lang="en-US" altLang="ko-KR" sz="1300" dirty="0"/>
+                        <a:t>Simulation</a:t>
+                      </a:r>
+                      <a:endParaRPr lang="ko-KR" altLang="en-US" sz="1300" dirty="0"/>
+                    </a:p>
+                  </a:txBody>
+                  <a:tcPr/>
+                </a:tc>
+                <a:tc>
+                  <a:txBody>
+                    <a:bodyPr/>
+                    <a:lstStyle/>
+                    <a:p>
+                      <a:pPr latinLnBrk="1"/>
+                      <a:r>
+                        <a:rPr lang="en-US" altLang="ko-KR" sz="1300" dirty="0"/>
+                        <a:t>Before adding dropout</a:t>
+                      </a:r>
+                      <a:endParaRPr lang="ko-KR" altLang="en-US" sz="1300" dirty="0"/>
+                    </a:p>
+                  </a:txBody>
+                  <a:tcPr/>
+                </a:tc>
+                <a:tc>
+                  <a:txBody>
+                    <a:bodyPr/>
+                    <a:lstStyle/>
+                    <a:p>
+                      <a:pPr latinLnBrk="1"/>
+                      <a:r>
+                        <a:rPr lang="en-US" altLang="ko-KR" sz="1300" dirty="0"/>
+                        <a:t>After adding dropout</a:t>
+                      </a:r>
+                      <a:endParaRPr lang="ko-KR" altLang="en-US" sz="1300" dirty="0"/>
+                    </a:p>
+                  </a:txBody>
+                  <a:tcPr/>
+                </a:tc>
+                <a:extLst>
+                  <a:ext uri="{0D108BD9-81ED-4DB2-BD59-A6C34878D82A}">
+                    <a16:rowId xmlns:a16="http://schemas.microsoft.com/office/drawing/2014/main" val="3290613489"/>
+                  </a:ext>
+                </a:extLst>
+              </a:tr>
+              <a:tr h="411151">
+                <a:tc>
+                  <a:txBody>
+                    <a:bodyPr/>
+                    <a:lstStyle/>
+                    <a:p>
+                      <a:pPr latinLnBrk="1"/>
+                      <a:r>
+                        <a:rPr lang="en-US" altLang="ko-KR" sz="1300" dirty="0"/>
+                        <a:t>Travel Time</a:t>
+                      </a:r>
+                    </a:p>
+                    <a:p>
+                      <a:pPr latinLnBrk="1"/>
+                      <a:r>
+                        <a:rPr lang="en-US" altLang="ko-KR" sz="1300" dirty="0"/>
+                        <a:t>(per edge)</a:t>
+                      </a:r>
+                      <a:endParaRPr lang="ko-KR" altLang="en-US" sz="1300" dirty="0"/>
+                    </a:p>
+                  </a:txBody>
+                  <a:tcPr/>
+                </a:tc>
+                <a:tc>
+                  <a:txBody>
+                    <a:bodyPr/>
+                    <a:lstStyle/>
+                    <a:p>
+                      <a:pPr latinLnBrk="1"/>
+                      <a:r>
+                        <a:rPr lang="en-US" altLang="ko-KR" sz="1300" dirty="0"/>
+                        <a:t>35.942s</a:t>
+                      </a:r>
+                      <a:endParaRPr lang="ko-KR" altLang="en-US" sz="1300" dirty="0"/>
+                    </a:p>
+                  </a:txBody>
+                  <a:tcPr/>
+                </a:tc>
+                <a:tc>
+                  <a:txBody>
+                    <a:bodyPr/>
+                    <a:lstStyle/>
+                    <a:p>
+                      <a:pPr latinLnBrk="1"/>
+                      <a:r>
+                        <a:rPr lang="en-US" altLang="ko-KR" sz="1300" dirty="0"/>
+                        <a:t>39.716s</a:t>
+                      </a:r>
+                      <a:endParaRPr lang="ko-KR" altLang="en-US" sz="1300" dirty="0"/>
+                    </a:p>
+                  </a:txBody>
+                  <a:tcPr/>
+                </a:tc>
+                <a:tc>
+                  <a:txBody>
+                    <a:bodyPr/>
+                    <a:lstStyle/>
+                    <a:p>
+                      <a:pPr latinLnBrk="1"/>
+                      <a:r>
+                        <a:rPr lang="en-US" altLang="ko-KR" sz="1300" dirty="0"/>
+                        <a:t>36.102s</a:t>
+                      </a:r>
+                      <a:endParaRPr lang="ko-KR" altLang="en-US" sz="1300" dirty="0"/>
+                    </a:p>
+                  </a:txBody>
+                  <a:tcPr/>
+                </a:tc>
+                <a:extLst>
+                  <a:ext uri="{0D108BD9-81ED-4DB2-BD59-A6C34878D82A}">
+                    <a16:rowId xmlns:a16="http://schemas.microsoft.com/office/drawing/2014/main" val="3098175826"/>
+                  </a:ext>
+                </a:extLst>
+              </a:tr>
+              <a:tr h="338301">
+                <a:tc>
+                  <a:txBody>
+                    <a:bodyPr/>
+                    <a:lstStyle/>
+                    <a:p>
+                      <a:pPr latinLnBrk="1"/>
+                      <a:r>
+                        <a:rPr lang="en-US" altLang="ko-KR" sz="1300" dirty="0"/>
+                        <a:t>Velocity(edge </a:t>
+                      </a:r>
+                      <a:r>
+                        <a:rPr lang="en-US" altLang="ko-KR" sz="1300" dirty="0" err="1"/>
+                        <a:t>veh</a:t>
+                      </a:r>
+                      <a:r>
+                        <a:rPr lang="en-US" altLang="ko-KR" sz="1300" dirty="0"/>
+                        <a:t>)</a:t>
+                      </a:r>
+                      <a:endParaRPr lang="ko-KR" altLang="en-US" sz="1300" dirty="0"/>
+                    </a:p>
+                  </a:txBody>
+                  <a:tcPr/>
+                </a:tc>
+                <a:tc>
+                  <a:txBody>
+                    <a:bodyPr/>
+                    <a:lstStyle/>
+                    <a:p>
+                      <a:pPr latinLnBrk="1"/>
+                      <a:r>
+                        <a:rPr lang="en-US" altLang="ko-KR" sz="1300" dirty="0"/>
+                        <a:t>5.413m/s</a:t>
+                      </a:r>
+                      <a:endParaRPr lang="ko-KR" altLang="en-US" sz="1300" dirty="0"/>
+                    </a:p>
+                  </a:txBody>
+                  <a:tcPr/>
+                </a:tc>
+                <a:tc>
+                  <a:txBody>
+                    <a:bodyPr/>
+                    <a:lstStyle/>
+                    <a:p>
+                      <a:pPr latinLnBrk="1"/>
+                      <a:r>
+                        <a:rPr lang="en-US" altLang="ko-KR" sz="1300" dirty="0"/>
+                        <a:t>5.187m/s</a:t>
+                      </a:r>
+                      <a:endParaRPr lang="ko-KR" altLang="en-US" sz="1300" dirty="0"/>
+                    </a:p>
+                  </a:txBody>
+                  <a:tcPr/>
+                </a:tc>
+                <a:tc>
+                  <a:txBody>
+                    <a:bodyPr/>
+                    <a:lstStyle/>
+                    <a:p>
+                      <a:pPr latinLnBrk="1"/>
+                      <a:r>
+                        <a:rPr lang="en-US" altLang="ko-KR" sz="1300" dirty="0"/>
+                        <a:t>5.417m/s</a:t>
+                      </a:r>
+                      <a:endParaRPr lang="ko-KR" altLang="en-US" sz="1300" dirty="0"/>
+                    </a:p>
+                  </a:txBody>
+                  <a:tcPr/>
+                </a:tc>
+                <a:extLst>
+                  <a:ext uri="{0D108BD9-81ED-4DB2-BD59-A6C34878D82A}">
+                    <a16:rowId xmlns:a16="http://schemas.microsoft.com/office/drawing/2014/main" val="2603964071"/>
+                  </a:ext>
+                </a:extLst>
+              </a:tr>
+              <a:tr h="411151">
+                <a:tc>
+                  <a:txBody>
+                    <a:bodyPr/>
+                    <a:lstStyle/>
+                    <a:p>
+                      <a:pPr latinLnBrk="1"/>
+                      <a:r>
+                        <a:rPr lang="en-US" altLang="ko-KR" sz="1300" dirty="0"/>
+                        <a:t>Waiting Time</a:t>
+                      </a:r>
+                      <a:br>
+                        <a:rPr lang="en-US" altLang="ko-KR" sz="1300" dirty="0"/>
+                      </a:br>
+                      <a:r>
+                        <a:rPr lang="en-US" altLang="ko-KR" sz="1300" dirty="0"/>
+                        <a:t>(whole</a:t>
+                      </a:r>
+                      <a:r>
+                        <a:rPr lang="en-US" altLang="ko-KR" sz="1300" baseline="0" dirty="0"/>
+                        <a:t> trip)</a:t>
+                      </a:r>
+                      <a:endParaRPr lang="ko-KR" altLang="en-US" sz="1300" dirty="0"/>
+                    </a:p>
+                  </a:txBody>
+                  <a:tcPr/>
+                </a:tc>
+                <a:tc>
+                  <a:txBody>
+                    <a:bodyPr/>
+                    <a:lstStyle/>
+                    <a:p>
+                      <a:pPr latinLnBrk="1"/>
+                      <a:r>
+                        <a:rPr lang="en-US" altLang="ko-KR" sz="1300" dirty="0"/>
+                        <a:t>24.7s/</a:t>
+                      </a:r>
+                      <a:r>
+                        <a:rPr lang="en-US" altLang="ko-KR" sz="1300" dirty="0" err="1"/>
+                        <a:t>veh</a:t>
+                      </a:r>
+                      <a:endParaRPr lang="ko-KR" altLang="en-US" sz="1300" dirty="0"/>
+                    </a:p>
+                  </a:txBody>
+                  <a:tcPr/>
+                </a:tc>
+                <a:tc>
+                  <a:txBody>
+                    <a:bodyPr/>
+                    <a:lstStyle/>
+                    <a:p>
+                      <a:pPr latinLnBrk="1"/>
+                      <a:r>
+                        <a:rPr lang="en-US" altLang="ko-KR" sz="1300" dirty="0"/>
+                        <a:t>27.0s/</a:t>
+                      </a:r>
+                      <a:r>
+                        <a:rPr lang="en-US" altLang="ko-KR" sz="1300" dirty="0" err="1"/>
+                        <a:t>veh</a:t>
+                      </a:r>
+                      <a:endParaRPr lang="ko-KR" altLang="en-US" sz="1300" dirty="0"/>
+                    </a:p>
+                  </a:txBody>
+                  <a:tcPr/>
+                </a:tc>
+                <a:tc>
+                  <a:txBody>
+                    <a:bodyPr/>
+                    <a:lstStyle/>
+                    <a:p>
+                      <a:pPr latinLnBrk="1"/>
+                      <a:r>
+                        <a:rPr lang="en-US" altLang="ko-KR" sz="1300" dirty="0"/>
+                        <a:t>25.2s/</a:t>
+                      </a:r>
+                      <a:r>
+                        <a:rPr lang="en-US" altLang="ko-KR" sz="1300" dirty="0" err="1"/>
+                        <a:t>veh</a:t>
+                      </a:r>
+                      <a:endParaRPr lang="ko-KR" altLang="en-US" sz="1300" dirty="0"/>
+                    </a:p>
+                  </a:txBody>
+                  <a:tcPr/>
+                </a:tc>
+                <a:extLst>
+                  <a:ext uri="{0D108BD9-81ED-4DB2-BD59-A6C34878D82A}">
+                    <a16:rowId xmlns:a16="http://schemas.microsoft.com/office/drawing/2014/main" val="1504317479"/>
+                  </a:ext>
+                </a:extLst>
+              </a:tr>
+              <a:tr h="338301">
+                <a:tc>
+                  <a:txBody>
+                    <a:bodyPr/>
+                    <a:lstStyle/>
+                    <a:p>
+                      <a:pPr latinLnBrk="1"/>
+                      <a:r>
+                        <a:rPr lang="en-US" altLang="ko-KR" sz="1300" dirty="0"/>
+                        <a:t>Arrived </a:t>
+                      </a:r>
+                      <a:r>
+                        <a:rPr lang="en-US" altLang="ko-KR" sz="1300" dirty="0" err="1"/>
+                        <a:t>Num</a:t>
+                      </a:r>
+                      <a:endParaRPr lang="ko-KR" altLang="en-US" sz="1300" dirty="0"/>
+                    </a:p>
+                  </a:txBody>
+                  <a:tcPr/>
+                </a:tc>
+                <a:tc>
+                  <a:txBody>
+                    <a:bodyPr/>
+                    <a:lstStyle/>
+                    <a:p>
+                      <a:pPr latinLnBrk="1"/>
+                      <a:r>
+                        <a:rPr lang="en-US" altLang="ko-KR" sz="1300" dirty="0"/>
+                        <a:t>12111</a:t>
+                      </a:r>
+                      <a:endParaRPr lang="ko-KR" altLang="en-US" sz="1300" dirty="0"/>
+                    </a:p>
+                  </a:txBody>
+                  <a:tcPr/>
+                </a:tc>
+                <a:tc>
+                  <a:txBody>
+                    <a:bodyPr/>
+                    <a:lstStyle/>
+                    <a:p>
+                      <a:pPr latinLnBrk="1"/>
+                      <a:r>
+                        <a:rPr lang="en-US" altLang="ko-KR" sz="1300" dirty="0"/>
+                        <a:t>11873</a:t>
+                      </a:r>
+                      <a:endParaRPr lang="ko-KR" altLang="en-US" sz="1300" dirty="0"/>
+                    </a:p>
+                  </a:txBody>
+                  <a:tcPr/>
+                </a:tc>
+                <a:tc>
+                  <a:txBody>
+                    <a:bodyPr/>
+                    <a:lstStyle/>
+                    <a:p>
+                      <a:pPr latinLnBrk="1"/>
+                      <a:r>
+                        <a:rPr lang="en-US" altLang="ko-KR" sz="1300" dirty="0"/>
+                        <a:t>12179</a:t>
+                      </a:r>
+                      <a:endParaRPr lang="ko-KR" altLang="en-US" sz="1300" dirty="0"/>
+                    </a:p>
+                  </a:txBody>
+                  <a:tcPr/>
+                </a:tc>
+                <a:extLst>
+                  <a:ext uri="{0D108BD9-81ED-4DB2-BD59-A6C34878D82A}">
+                    <a16:rowId xmlns:a16="http://schemas.microsoft.com/office/drawing/2014/main" val="3416629328"/>
+                  </a:ext>
+                </a:extLst>
+              </a:tr>
+            </a:tbl>
+          </a:graphicData>
+        </a:graphic>
+      </p:graphicFrame>
+    </p:spTree>
+    <p:extLst>
+      <p:ext uri="{BB962C8B-B14F-4D97-AF65-F5344CB8AC3E}">
+        <p14:creationId xmlns:p14="http://schemas.microsoft.com/office/powerpoint/2010/main" val="3444359107"/>
+      </p:ext>
+    </p:extLst>
+  </p:cSld>
+  <p:clrMapOvr>
+    <a:masterClrMapping/>
+  </p:clrMapOvr>
+</p:sld>
+</file>
+
+<file path=ppt/slides/slide15.xml><?xml version="1.0" encoding="utf-8"?>
+<p:sld xmlns:a="http://schemas.openxmlformats.org/drawingml/2006/main" xmlns:r="http://schemas.openxmlformats.org/officeDocument/2006/relationships" xmlns:p="http://schemas.openxmlformats.org/presentationml/2006/main">
+  <p:cSld>
+    <p:spTree>
+      <p:nvGrpSpPr>
+        <p:cNvPr id="1" name=""/>
+        <p:cNvGrpSpPr/>
+        <p:nvPr/>
+      </p:nvGrpSpPr>
+      <p:grpSpPr>
+        <a:xfrm>
+          <a:off x="0" y="0"/>
+          <a:ext cx="0" cy="0"/>
+          <a:chOff x="0" y="0"/>
+          <a:chExt cx="0" cy="0"/>
+        </a:xfrm>
+      </p:grpSpPr>
+      <p:sp>
+        <p:nvSpPr>
+          <p:cNvPr id="2" name="제목 1">
+            <a:extLst>
+              <a:ext uri="{FF2B5EF4-FFF2-40B4-BE49-F238E27FC236}">
+                <a16:creationId xmlns:a16="http://schemas.microsoft.com/office/drawing/2014/main" id="{0DF1FFCB-D291-4800-8403-7CE9DC1149AA}"/>
+              </a:ext>
+            </a:extLst>
+          </p:cNvPr>
+          <p:cNvSpPr>
+            <a:spLocks noGrp="1"/>
+          </p:cNvSpPr>
+          <p:nvPr>
+            <p:ph type="title"/>
+          </p:nvPr>
+        </p:nvSpPr>
+        <p:spPr/>
+        <p:txBody>
+          <a:bodyPr>
+            <a:normAutofit fontScale="90000"/>
+          </a:bodyPr>
+          <a:lstStyle/>
+          <a:p>
+            <a:r>
+              <a:rPr lang="en-US" altLang="ko-KR" dirty="0" err="1"/>
+              <a:t>Dunsan</a:t>
+            </a:r>
+            <a:r>
+              <a:rPr lang="en-US" altLang="ko-KR" dirty="0"/>
+              <a:t> Decentralized CNN/CNN-reduced Model with Practical Constraints</a:t>
+            </a:r>
+            <a:br>
+              <a:rPr lang="en-US" altLang="ko-KR" dirty="0"/>
+            </a:br>
+            <a:endParaRPr lang="ko-KR" altLang="en-US" dirty="0"/>
+          </a:p>
+        </p:txBody>
+      </p:sp>
+      <p:sp>
+        <p:nvSpPr>
+          <p:cNvPr id="3" name="내용 개체 틀 2">
+            <a:extLst>
+              <a:ext uri="{FF2B5EF4-FFF2-40B4-BE49-F238E27FC236}">
+                <a16:creationId xmlns:a16="http://schemas.microsoft.com/office/drawing/2014/main" id="{8D42BE15-17B6-4D0A-B98F-95C3F01EB7A4}"/>
+              </a:ext>
+            </a:extLst>
+          </p:cNvPr>
+          <p:cNvSpPr>
+            <a:spLocks noGrp="1"/>
+          </p:cNvSpPr>
+          <p:nvPr>
+            <p:ph idx="1"/>
+          </p:nvPr>
+        </p:nvSpPr>
+        <p:spPr>
+          <a:xfrm>
+            <a:off x="677333" y="2160589"/>
+            <a:ext cx="9053895" cy="3880773"/>
+          </a:xfrm>
+        </p:spPr>
+        <p:txBody>
+          <a:bodyPr/>
+          <a:lstStyle/>
+          <a:p>
+            <a:r>
+              <a:rPr lang="en-US" altLang="ko-KR" dirty="0"/>
+              <a:t>Practical Constraints without minimum of duration condition</a:t>
+            </a:r>
+          </a:p>
+          <a:p>
+            <a:pPr lvl="1"/>
+            <a:r>
+              <a:rPr lang="en-US" altLang="ko-KR" dirty="0"/>
+              <a:t>Removing penalty in action that is less/more than min/maximum length of duration</a:t>
+            </a:r>
+          </a:p>
+          <a:p>
+            <a:pPr lvl="1"/>
+            <a:r>
+              <a:rPr lang="en-US" altLang="ko-KR" dirty="0"/>
+              <a:t>Purpose: Verifying whether regulations lead traffic jam or not</a:t>
+            </a:r>
+          </a:p>
+          <a:p>
+            <a:pPr lvl="1"/>
+            <a:r>
+              <a:rPr lang="en-US" altLang="ko-KR" dirty="0"/>
+              <a:t>Learning process and Reward comparison</a:t>
+            </a:r>
+          </a:p>
+          <a:p>
+            <a:pPr lvl="1"/>
+            <a:endParaRPr lang="en-US" altLang="ko-KR" dirty="0"/>
+          </a:p>
+          <a:p>
+            <a:pPr lvl="1"/>
+            <a:endParaRPr lang="en-US" altLang="ko-KR" dirty="0"/>
+          </a:p>
+          <a:p>
+            <a:pPr lvl="1"/>
+            <a:endParaRPr lang="en-US" altLang="ko-KR" dirty="0"/>
+          </a:p>
+        </p:txBody>
+      </p:sp>
+    </p:spTree>
+    <p:extLst>
+      <p:ext uri="{BB962C8B-B14F-4D97-AF65-F5344CB8AC3E}">
+        <p14:creationId xmlns:p14="http://schemas.microsoft.com/office/powerpoint/2010/main" val="1173889905"/>
+      </p:ext>
+    </p:extLst>
+  </p:cSld>
+  <p:clrMapOvr>
+    <a:masterClrMapping/>
+  </p:clrMapOvr>
+</p:sld>
+</file>
+
+<file path=ppt/slides/slide16.xml><?xml version="1.0" encoding="utf-8"?>
 <p:sld xmlns:a="http://schemas.openxmlformats.org/drawingml/2006/main" xmlns:r="http://schemas.openxmlformats.org/officeDocument/2006/relationships" xmlns:p="http://schemas.openxmlformats.org/presentationml/2006/main">
   <p:cSld>
     <p:spTree>
@@ -15010,12 +15835,52 @@
           <a:p>
             <a:r>
               <a:rPr lang="en-US" altLang="ko-KR" dirty="0"/>
-              <a:t> With </a:t>
-            </a:r>
-            <a:r>
-              <a:rPr lang="en-US" altLang="ko-KR"/>
-              <a:t>Practical Constraints</a:t>
-            </a:r>
+              <a:t> With Practical Constraints</a:t>
+            </a:r>
+          </a:p>
+          <a:p>
+            <a:pPr lvl="1"/>
+            <a:r>
+              <a:rPr lang="en-US" altLang="ko-KR" dirty="0"/>
+              <a:t>Phase length locked action space</a:t>
+            </a:r>
+          </a:p>
+          <a:p>
+            <a:pPr lvl="1"/>
+            <a:r>
+              <a:rPr lang="en-US" altLang="ko-KR" dirty="0"/>
+              <a:t>Phase length unlocked action space</a:t>
+            </a:r>
+          </a:p>
+          <a:p>
+            <a:r>
+              <a:rPr lang="en-US" altLang="ko-KR" dirty="0"/>
+              <a:t>Normalized vs. Pure info</a:t>
+            </a:r>
+          </a:p>
+          <a:p>
+            <a:endParaRPr lang="en-US" altLang="ko-KR" dirty="0"/>
+          </a:p>
+          <a:p>
+            <a:r>
+              <a:rPr lang="en-US" altLang="ko-KR" dirty="0"/>
+              <a:t>Learning Results</a:t>
+            </a:r>
+          </a:p>
+          <a:p>
+            <a:pPr lvl="1"/>
+            <a:r>
+              <a:rPr lang="en-US" altLang="ko-KR" dirty="0"/>
+              <a:t>Similar performance between Validation and Learning results</a:t>
+            </a:r>
+          </a:p>
+          <a:p>
+            <a:pPr lvl="1"/>
+            <a:endParaRPr lang="en-US" altLang="ko-KR" dirty="0"/>
+          </a:p>
+          <a:p>
+            <a:pPr lvl="1"/>
+            <a:endParaRPr lang="en-US" altLang="ko-KR" dirty="0"/>
           </a:p>
           <a:p>
             <a:pPr lvl="1"/>
@@ -15036,7 +15901,123 @@
 </p:sld>
 </file>
 
-<file path=ppt/slides/slide15.xml><?xml version="1.0" encoding="utf-8"?>
+<file path=ppt/slides/slide17.xml><?xml version="1.0" encoding="utf-8"?>
+<p:sld xmlns:a="http://schemas.openxmlformats.org/drawingml/2006/main" xmlns:r="http://schemas.openxmlformats.org/officeDocument/2006/relationships" xmlns:p="http://schemas.openxmlformats.org/presentationml/2006/main">
+  <p:cSld>
+    <p:spTree>
+      <p:nvGrpSpPr>
+        <p:cNvPr id="1" name=""/>
+        <p:cNvGrpSpPr/>
+        <p:nvPr/>
+      </p:nvGrpSpPr>
+      <p:grpSpPr>
+        <a:xfrm>
+          <a:off x="0" y="0"/>
+          <a:ext cx="0" cy="0"/>
+          <a:chOff x="0" y="0"/>
+          <a:chExt cx="0" cy="0"/>
+        </a:xfrm>
+      </p:grpSpPr>
+      <p:sp>
+        <p:nvSpPr>
+          <p:cNvPr id="2" name="제목 1">
+            <a:extLst>
+              <a:ext uri="{FF2B5EF4-FFF2-40B4-BE49-F238E27FC236}">
+                <a16:creationId xmlns:a16="http://schemas.microsoft.com/office/drawing/2014/main" id="{01785FFE-55C3-4E29-8C2B-614503277E01}"/>
+              </a:ext>
+            </a:extLst>
+          </p:cNvPr>
+          <p:cNvSpPr>
+            <a:spLocks noGrp="1"/>
+          </p:cNvSpPr>
+          <p:nvPr>
+            <p:ph type="title"/>
+          </p:nvPr>
+        </p:nvSpPr>
+        <p:spPr/>
+        <p:txBody>
+          <a:bodyPr/>
+          <a:lstStyle/>
+          <a:p>
+            <a:r>
+              <a:rPr lang="en-US" altLang="ko-KR" dirty="0"/>
+              <a:t>Reason for failing experiment</a:t>
+            </a:r>
+            <a:endParaRPr lang="ko-KR" altLang="en-US" dirty="0"/>
+          </a:p>
+        </p:txBody>
+      </p:sp>
+      <p:sp>
+        <p:nvSpPr>
+          <p:cNvPr id="3" name="내용 개체 틀 2">
+            <a:extLst>
+              <a:ext uri="{FF2B5EF4-FFF2-40B4-BE49-F238E27FC236}">
+                <a16:creationId xmlns:a16="http://schemas.microsoft.com/office/drawing/2014/main" id="{02AF741C-283C-46E2-8E6B-546EDD62A938}"/>
+              </a:ext>
+            </a:extLst>
+          </p:cNvPr>
+          <p:cNvSpPr>
+            <a:spLocks noGrp="1"/>
+          </p:cNvSpPr>
+          <p:nvPr>
+            <p:ph idx="1"/>
+          </p:nvPr>
+        </p:nvSpPr>
+        <p:spPr/>
+        <p:txBody>
+          <a:bodyPr/>
+          <a:lstStyle/>
+          <a:p>
+            <a:r>
+              <a:rPr lang="en-US" altLang="ko-KR" dirty="0"/>
+              <a:t>Actual data biased for fixed time signal control</a:t>
+            </a:r>
+          </a:p>
+          <a:p>
+            <a:r>
+              <a:rPr lang="en-US" altLang="ko-KR" dirty="0"/>
+              <a:t>Congested road conditions not being reflected by scaled data</a:t>
+            </a:r>
+            <a:br>
+              <a:rPr lang="en-US" altLang="ko-KR" dirty="0"/>
+            </a:br>
+            <a:r>
+              <a:rPr lang="en-US" altLang="ko-KR" dirty="0">
+                <a:sym typeface="Wingdings" panose="05000000000000000000" pitchFamily="2" charset="2"/>
+              </a:rPr>
+              <a:t> Using 7-10am demand instead of 0-3am</a:t>
+            </a:r>
+          </a:p>
+          <a:p>
+            <a:r>
+              <a:rPr lang="en-US" altLang="ko-KR" dirty="0">
+                <a:sym typeface="Wingdings" panose="05000000000000000000" pitchFamily="2" charset="2"/>
+              </a:rPr>
+              <a:t>Fixed offset value</a:t>
+            </a:r>
+          </a:p>
+          <a:p>
+            <a:endParaRPr lang="en-US" altLang="ko-KR" dirty="0"/>
+          </a:p>
+          <a:p>
+            <a:endParaRPr lang="ko-KR" altLang="en-US" dirty="0"/>
+          </a:p>
+        </p:txBody>
+      </p:sp>
+    </p:spTree>
+    <p:extLst>
+      <p:ext uri="{BB962C8B-B14F-4D97-AF65-F5344CB8AC3E}">
+        <p14:creationId xmlns:p14="http://schemas.microsoft.com/office/powerpoint/2010/main" val="550871464"/>
+      </p:ext>
+    </p:extLst>
+  </p:cSld>
+  <p:clrMapOvr>
+    <a:masterClrMapping/>
+  </p:clrMapOvr>
+</p:sld>
+</file>
+
+<file path=ppt/slides/slide18.xml><?xml version="1.0" encoding="utf-8"?>
 <p:sld xmlns:a="http://schemas.openxmlformats.org/drawingml/2006/main" xmlns:r="http://schemas.openxmlformats.org/officeDocument/2006/relationships" xmlns:p="http://schemas.openxmlformats.org/presentationml/2006/main">
   <p:cSld>
     <p:spTree>
@@ -15072,7 +16053,7 @@
           <a:p>
             <a:r>
               <a:rPr lang="en-US" altLang="ko-KR" dirty="0"/>
-              <a:t>Continuous Action Model with Practical Restraints</a:t>
+              <a:t>Continuous Action Model with Practical Constraints</a:t>
             </a:r>
             <a:br>
               <a:rPr lang="en-US" altLang="ko-KR" dirty="0"/>
@@ -15202,7 +16183,7 @@
                   <a:rPr lang="en-US" altLang="ko-KR" dirty="0">
                     <a:sym typeface="Wingdings" panose="05000000000000000000" pitchFamily="2" charset="2"/>
                   </a:rPr>
-                  <a:t> function =1  Easy to distribute length of phase</a:t>
+                  <a:t> function = 1  Easy to distribute length of phase</a:t>
                 </a:r>
               </a:p>
               <a:p>
@@ -17047,7 +18028,7 @@
 </p:sld>
 </file>
 
-<file path=ppt/slides/slide16.xml><?xml version="1.0" encoding="utf-8"?>
+<file path=ppt/slides/slide19.xml><?xml version="1.0" encoding="utf-8"?>
 <p:sld xmlns:a="http://schemas.openxmlformats.org/drawingml/2006/main" xmlns:r="http://schemas.openxmlformats.org/officeDocument/2006/relationships" xmlns:p="http://schemas.openxmlformats.org/presentationml/2006/main">
   <p:cSld>
     <p:spTree>
@@ -17210,7 +18191,7 @@
             <a:pPr lvl="1"/>
             <a:r>
               <a:rPr lang="en-US" altLang="ko-KR" dirty="0"/>
-              <a:t>3x3Grid Single-Agent Model without Restraints(Depreciated)</a:t>
+              <a:t>3x3Grid Single-Agent Model without Constraints(Depreciated)</a:t>
             </a:r>
           </a:p>
           <a:p>
@@ -17225,7 +18206,7 @@
             </a:r>
             <a:r>
               <a:rPr lang="en-US" altLang="ko-KR" dirty="0"/>
-              <a:t>without Restraints(Depreciated)</a:t>
+              <a:t>without Constraints(Depreciated)</a:t>
             </a:r>
           </a:p>
           <a:p>
@@ -17264,7 +18245,7 @@
             </a:r>
             <a:r>
               <a:rPr lang="en-US" altLang="ko-KR" dirty="0"/>
-              <a:t>Restraints</a:t>
+              <a:t>Constraints</a:t>
             </a:r>
           </a:p>
           <a:p>
@@ -17275,7 +18256,7 @@
             </a:r>
             <a:r>
               <a:rPr lang="en-US" altLang="ko-KR" dirty="0"/>
-              <a:t> Decentralized CNN/CNN-reduced Model with Practical Restraints</a:t>
+              <a:t> Decentralized CNN/CNN-reduced Model with Practical Constraints</a:t>
             </a:r>
           </a:p>
           <a:p>
@@ -17300,7 +18281,7 @@
             <a:pPr lvl="1"/>
             <a:r>
               <a:rPr lang="en-US" altLang="ko-KR" dirty="0"/>
-              <a:t>Continuous Action Model with Practical Restraints</a:t>
+              <a:t>Continuous Action Model with Practical Constraints</a:t>
             </a:r>
             <a:endParaRPr lang="ko-KR" altLang="en-US" dirty="0"/>
           </a:p>
@@ -17368,7 +18349,7 @@
             </a:br>
             <a:r>
               <a:rPr lang="en-US" altLang="ko-KR" dirty="0"/>
-              <a:t>without Restraints(Depreciated)</a:t>
+              <a:t>without Constraints(Depreciated)</a:t>
             </a:r>
           </a:p>
         </p:txBody>
@@ -18233,7 +19214,7 @@
             </a:r>
             <a:r>
               <a:rPr lang="en-US" altLang="ko-KR" dirty="0"/>
-              <a:t>Restraints</a:t>
+              <a:t>Constraints</a:t>
             </a:r>
             <a:br>
               <a:rPr lang="en-US" altLang="ko-KR" dirty="0"/>
@@ -18415,7 +19396,7 @@
             </a:r>
             <a:r>
               <a:rPr lang="en-US" altLang="ko-KR" dirty="0"/>
-              <a:t>Restraints</a:t>
+              <a:t>Constraints</a:t>
             </a:r>
             <a:br>
               <a:rPr lang="en-US" altLang="ko-KR" dirty="0"/>
@@ -18834,7 +19815,12 @@
             <p:ph type="title"/>
           </p:nvPr>
         </p:nvSpPr>
-        <p:spPr/>
+        <p:spPr>
+          <a:xfrm>
+            <a:off x="677333" y="609600"/>
+            <a:ext cx="8986783" cy="1320800"/>
+          </a:xfrm>
+        </p:spPr>
         <p:txBody>
           <a:bodyPr>
             <a:normAutofit fontScale="90000"/>
@@ -18843,7 +19829,7 @@
           <a:p>
             <a:r>
               <a:rPr lang="en-US" altLang="ko-KR" dirty="0"/>
-              <a:t>3x3Grid Decentralized</a:t>
+              <a:t>Decentralized</a:t>
             </a:r>
             <a:r>
               <a:rPr lang="ko-KR" altLang="en-US" dirty="0"/>
@@ -18867,7 +19853,7 @@
             </a:r>
             <a:r>
               <a:rPr lang="en-US" altLang="ko-KR" dirty="0"/>
-              <a:t>Restraints</a:t>
+              <a:t>Constraints</a:t>
             </a:r>
             <a:br>
               <a:rPr lang="en-US" altLang="ko-KR" dirty="0"/>
@@ -20169,7 +21155,12 @@
             <p:ph type="title"/>
           </p:nvPr>
         </p:nvSpPr>
-        <p:spPr/>
+        <p:spPr>
+          <a:xfrm>
+            <a:off x="677333" y="609600"/>
+            <a:ext cx="8827393" cy="1320800"/>
+          </a:xfrm>
+        </p:spPr>
         <p:txBody>
           <a:bodyPr>
             <a:normAutofit fontScale="90000"/>
@@ -20178,7 +21169,7 @@
           <a:p>
             <a:r>
               <a:rPr lang="en-US" altLang="ko-KR" dirty="0"/>
-              <a:t>3x3Grid Decentralized</a:t>
+              <a:t>Decentralized</a:t>
             </a:r>
             <a:r>
               <a:rPr lang="ko-KR" altLang="en-US" dirty="0"/>
@@ -20202,7 +21193,7 @@
             </a:r>
             <a:r>
               <a:rPr lang="en-US" altLang="ko-KR" dirty="0"/>
-              <a:t>Restraints</a:t>
+              <a:t>Constraints</a:t>
             </a:r>
             <a:br>
               <a:rPr lang="en-US" altLang="ko-KR" dirty="0"/>
@@ -26468,6 +27459,121 @@
           </a:graphicData>
         </a:graphic>
       </p:graphicFrame>
+      <p:sp>
+        <p:nvSpPr>
+          <p:cNvPr id="155" name="아래쪽 화살표 167">
+            <a:extLst>
+              <a:ext uri="{FF2B5EF4-FFF2-40B4-BE49-F238E27FC236}">
+                <a16:creationId xmlns:a16="http://schemas.microsoft.com/office/drawing/2014/main" id="{164DC918-C12D-47C0-A74C-859C1B0CF70C}"/>
+              </a:ext>
+            </a:extLst>
+          </p:cNvPr>
+          <p:cNvSpPr/>
+          <p:nvPr/>
+        </p:nvSpPr>
+        <p:spPr>
+          <a:xfrm rot="19258669">
+            <a:off x="5679972" y="5124146"/>
+            <a:ext cx="873664" cy="1091320"/>
+          </a:xfrm>
+          <a:prstGeom prst="downArrow">
+            <a:avLst>
+              <a:gd name="adj1" fmla="val 23446"/>
+              <a:gd name="adj2" fmla="val 50000"/>
+            </a:avLst>
+          </a:prstGeom>
+        </p:spPr>
+        <p:style>
+          <a:lnRef idx="2">
+            <a:schemeClr val="accent4">
+              <a:shade val="50000"/>
+            </a:schemeClr>
+          </a:lnRef>
+          <a:fillRef idx="1">
+            <a:schemeClr val="accent4"/>
+          </a:fillRef>
+          <a:effectRef idx="0">
+            <a:schemeClr val="accent4"/>
+          </a:effectRef>
+          <a:fontRef idx="minor">
+            <a:schemeClr val="lt1"/>
+          </a:fontRef>
+        </p:style>
+        <p:txBody>
+          <a:bodyPr rtlCol="0" anchor="ctr"/>
+          <a:lstStyle/>
+          <a:p>
+            <a:pPr algn="ctr"/>
+            <a:endParaRPr lang="ko-KR" altLang="en-US"/>
+          </a:p>
+        </p:txBody>
+      </p:sp>
+      <p:sp>
+        <p:nvSpPr>
+          <p:cNvPr id="156" name="직사각형 155">
+            <a:extLst>
+              <a:ext uri="{FF2B5EF4-FFF2-40B4-BE49-F238E27FC236}">
+                <a16:creationId xmlns:a16="http://schemas.microsoft.com/office/drawing/2014/main" id="{A61525FD-929E-4F60-ABF2-A0A2D9CD0881}"/>
+              </a:ext>
+            </a:extLst>
+          </p:cNvPr>
+          <p:cNvSpPr/>
+          <p:nvPr/>
+        </p:nvSpPr>
+        <p:spPr>
+          <a:xfrm>
+            <a:off x="5884670" y="6166508"/>
+            <a:ext cx="1428427" cy="432658"/>
+          </a:xfrm>
+          <a:prstGeom prst="rect">
+            <a:avLst/>
+          </a:prstGeom>
+          <a:solidFill>
+            <a:schemeClr val="bg1"/>
+          </a:solidFill>
+          <a:ln>
+            <a:solidFill>
+              <a:schemeClr val="tx1"/>
+            </a:solidFill>
+          </a:ln>
+        </p:spPr>
+        <p:style>
+          <a:lnRef idx="2">
+            <a:schemeClr val="accent1">
+              <a:shade val="50000"/>
+            </a:schemeClr>
+          </a:lnRef>
+          <a:fillRef idx="1">
+            <a:schemeClr val="accent1"/>
+          </a:fillRef>
+          <a:effectRef idx="0">
+            <a:schemeClr val="accent1"/>
+          </a:effectRef>
+          <a:fontRef idx="minor">
+            <a:schemeClr val="lt1"/>
+          </a:fontRef>
+        </p:style>
+        <p:txBody>
+          <a:bodyPr rtlCol="0" anchor="ctr"/>
+          <a:lstStyle/>
+          <a:p>
+            <a:pPr algn="ctr"/>
+            <a:r>
+              <a:rPr lang="en-US" altLang="ko-KR" sz="1400" dirty="0">
+                <a:solidFill>
+                  <a:schemeClr val="tx1"/>
+                </a:solidFill>
+              </a:rPr>
+              <a:t>Other Agents</a:t>
+            </a:r>
+            <a:endParaRPr lang="ko-KR" altLang="en-US" sz="1400" dirty="0">
+              <a:solidFill>
+                <a:schemeClr val="tx1"/>
+              </a:solidFill>
+            </a:endParaRPr>
+          </a:p>
+        </p:txBody>
+      </p:sp>
     </p:spTree>
     <p:extLst>
       <p:ext uri="{BB962C8B-B14F-4D97-AF65-F5344CB8AC3E}">

</xml_diff>